<commit_message>
updates to agenda and ppt
</commit_message>
<xml_diff>
--- a/docs/Reproducible research in R.pptx
+++ b/docs/Reproducible research in R.pptx
@@ -5,30 +5,31 @@
     <p:sldMasterId id="2147483648" r:id="rId1"/>
   </p:sldMasterIdLst>
   <p:notesMasterIdLst>
-    <p:notesMasterId r:id="rId23"/>
+    <p:notesMasterId r:id="rId24"/>
   </p:notesMasterIdLst>
   <p:sldIdLst>
     <p:sldId id="256" r:id="rId2"/>
     <p:sldId id="257" r:id="rId3"/>
     <p:sldId id="260" r:id="rId4"/>
     <p:sldId id="258" r:id="rId5"/>
-    <p:sldId id="259" r:id="rId6"/>
-    <p:sldId id="276" r:id="rId7"/>
-    <p:sldId id="277" r:id="rId8"/>
-    <p:sldId id="278" r:id="rId9"/>
-    <p:sldId id="261" r:id="rId10"/>
-    <p:sldId id="262" r:id="rId11"/>
-    <p:sldId id="263" r:id="rId12"/>
-    <p:sldId id="268" r:id="rId13"/>
-    <p:sldId id="270" r:id="rId14"/>
-    <p:sldId id="264" r:id="rId15"/>
-    <p:sldId id="267" r:id="rId16"/>
-    <p:sldId id="266" r:id="rId17"/>
-    <p:sldId id="265" r:id="rId18"/>
-    <p:sldId id="271" r:id="rId19"/>
-    <p:sldId id="272" r:id="rId20"/>
-    <p:sldId id="273" r:id="rId21"/>
-    <p:sldId id="274" r:id="rId22"/>
+    <p:sldId id="261" r:id="rId6"/>
+    <p:sldId id="262" r:id="rId7"/>
+    <p:sldId id="263" r:id="rId8"/>
+    <p:sldId id="268" r:id="rId9"/>
+    <p:sldId id="270" r:id="rId10"/>
+    <p:sldId id="264" r:id="rId11"/>
+    <p:sldId id="267" r:id="rId12"/>
+    <p:sldId id="266" r:id="rId13"/>
+    <p:sldId id="265" r:id="rId14"/>
+    <p:sldId id="271" r:id="rId15"/>
+    <p:sldId id="272" r:id="rId16"/>
+    <p:sldId id="273" r:id="rId17"/>
+    <p:sldId id="279" r:id="rId18"/>
+    <p:sldId id="259" r:id="rId19"/>
+    <p:sldId id="276" r:id="rId20"/>
+    <p:sldId id="277" r:id="rId21"/>
+    <p:sldId id="278" r:id="rId22"/>
+    <p:sldId id="274" r:id="rId23"/>
   </p:sldIdLst>
   <p:sldSz cx="12192000" cy="6858000"/>
   <p:notesSz cx="6858000" cy="9144000"/>
@@ -6114,7 +6115,7 @@
           <a:p>
             <a:fld id="{37496C56-F9E7-8A4C-85EB-B40E19913C19}" type="slidenum">
               <a:rPr lang="en-US" smtClean="0"/>
-              <a:t>9</a:t>
+              <a:t>5</a:t>
             </a:fld>
             <a:endParaRPr lang="en-US"/>
           </a:p>
@@ -7028,7 +7029,7 @@
           <a:p>
             <a:fld id="{37496C56-F9E7-8A4C-85EB-B40E19913C19}" type="slidenum">
               <a:rPr lang="en-US" smtClean="0"/>
-              <a:t>10</a:t>
+              <a:t>6</a:t>
             </a:fld>
             <a:endParaRPr lang="en-US"/>
           </a:p>
@@ -7115,7 +7116,7 @@
           <a:p>
             <a:fld id="{37496C56-F9E7-8A4C-85EB-B40E19913C19}" type="slidenum">
               <a:rPr lang="en-US" smtClean="0"/>
-              <a:t>11</a:t>
+              <a:t>7</a:t>
             </a:fld>
             <a:endParaRPr lang="en-US"/>
           </a:p>
@@ -7199,7 +7200,7 @@
           <a:p>
             <a:fld id="{37496C56-F9E7-8A4C-85EB-B40E19913C19}" type="slidenum">
               <a:rPr lang="en-US" smtClean="0"/>
-              <a:t>13</a:t>
+              <a:t>9</a:t>
             </a:fld>
             <a:endParaRPr lang="en-US"/>
           </a:p>
@@ -7283,7 +7284,7 @@
           <a:p>
             <a:fld id="{37496C56-F9E7-8A4C-85EB-B40E19913C19}" type="slidenum">
               <a:rPr lang="en-US" smtClean="0"/>
-              <a:t>14</a:t>
+              <a:t>10</a:t>
             </a:fld>
             <a:endParaRPr lang="en-US"/>
           </a:p>
@@ -7370,7 +7371,7 @@
           <a:p>
             <a:fld id="{37496C56-F9E7-8A4C-85EB-B40E19913C19}" type="slidenum">
               <a:rPr lang="en-US" smtClean="0"/>
-              <a:t>17</a:t>
+              <a:t>13</a:t>
             </a:fld>
             <a:endParaRPr lang="en-US"/>
           </a:p>
@@ -7380,6 +7381,101 @@
     <p:extLst>
       <p:ext uri="{BB962C8B-B14F-4D97-AF65-F5344CB8AC3E}">
         <p14:creationId xmlns:p14="http://schemas.microsoft.com/office/powerpoint/2010/main" val="3652481914"/>
+      </p:ext>
+    </p:extLst>
+  </p:cSld>
+  <p:clrMapOvr>
+    <a:masterClrMapping/>
+  </p:clrMapOvr>
+</p:notes>
+</file>
+
+<file path=ppt/notesSlides/notesSlide7.xml><?xml version="1.0" encoding="utf-8"?>
+<p:notes xmlns:a="http://schemas.openxmlformats.org/drawingml/2006/main" xmlns:r="http://schemas.openxmlformats.org/officeDocument/2006/relationships" xmlns:p="http://schemas.openxmlformats.org/presentationml/2006/main">
+  <p:cSld>
+    <p:spTree>
+      <p:nvGrpSpPr>
+        <p:cNvPr id="1" name=""/>
+        <p:cNvGrpSpPr/>
+        <p:nvPr/>
+      </p:nvGrpSpPr>
+      <p:grpSpPr>
+        <a:xfrm>
+          <a:off x="0" y="0"/>
+          <a:ext cx="0" cy="0"/>
+          <a:chOff x="0" y="0"/>
+          <a:chExt cx="0" cy="0"/>
+        </a:xfrm>
+      </p:grpSpPr>
+      <p:sp>
+        <p:nvSpPr>
+          <p:cNvPr id="2" name="Slide Image Placeholder 1"/>
+          <p:cNvSpPr>
+            <a:spLocks noGrp="1" noRot="1" noChangeAspect="1"/>
+          </p:cNvSpPr>
+          <p:nvPr>
+            <p:ph type="sldImg"/>
+          </p:nvPr>
+        </p:nvSpPr>
+        <p:spPr/>
+      </p:sp>
+      <p:sp>
+        <p:nvSpPr>
+          <p:cNvPr id="3" name="Notes Placeholder 2"/>
+          <p:cNvSpPr>
+            <a:spLocks noGrp="1"/>
+          </p:cNvSpPr>
+          <p:nvPr>
+            <p:ph type="body" idx="1"/>
+          </p:nvPr>
+        </p:nvSpPr>
+        <p:spPr/>
+        <p:txBody>
+          <a:bodyPr/>
+          <a:lstStyle/>
+          <a:p>
+            <a:r>
+              <a:rPr lang="en-US" dirty="0"/>
+              <a:t>One of the biggest learning curves with coding is that you will never be taught everything you need to know in a course AND even if you have been taught or given code for something every dataset is different and you will need to make changes even if the code has worked before. So rather than covering examples of specific thigs and then having you practice those things in your own R Markdown file, we are going to have you practice generating an R Markdown from scratch without covering everything explicitly. You have a </a:t>
+            </a:r>
+            <a:r>
+              <a:rPr lang="en-US" dirty="0" err="1"/>
+              <a:t>cheatsheet</a:t>
+            </a:r>
+            <a:r>
+              <a:rPr lang="en-US" dirty="0"/>
+              <a:t>, example files, us, and the internet to help you accomplish these tasks which is what you’ll have in a real-world setting. </a:t>
+            </a:r>
+          </a:p>
+        </p:txBody>
+      </p:sp>
+      <p:sp>
+        <p:nvSpPr>
+          <p:cNvPr id="4" name="Slide Number Placeholder 3"/>
+          <p:cNvSpPr>
+            <a:spLocks noGrp="1"/>
+          </p:cNvSpPr>
+          <p:nvPr>
+            <p:ph type="sldNum" sz="quarter" idx="5"/>
+          </p:nvPr>
+        </p:nvSpPr>
+        <p:spPr/>
+        <p:txBody>
+          <a:bodyPr/>
+          <a:lstStyle/>
+          <a:p>
+            <a:fld id="{37496C56-F9E7-8A4C-85EB-B40E19913C19}" type="slidenum">
+              <a:rPr lang="en-US" smtClean="0"/>
+              <a:t>17</a:t>
+            </a:fld>
+            <a:endParaRPr lang="en-US"/>
+          </a:p>
+        </p:txBody>
+      </p:sp>
+    </p:spTree>
+    <p:extLst>
+      <p:ext uri="{BB962C8B-B14F-4D97-AF65-F5344CB8AC3E}">
+        <p14:creationId xmlns:p14="http://schemas.microsoft.com/office/powerpoint/2010/main" val="2038615325"/>
       </p:ext>
     </p:extLst>
   </p:cSld>
@@ -10701,553 +10797,6 @@
           <p:cNvPr id="2" name="Title 1">
             <a:extLst>
               <a:ext uri="{FF2B5EF4-FFF2-40B4-BE49-F238E27FC236}">
-                <a16:creationId xmlns:a16="http://schemas.microsoft.com/office/drawing/2014/main" id="{11EC0683-F7D3-1235-B856-038D12121D96}"/>
-              </a:ext>
-            </a:extLst>
-          </p:cNvPr>
-          <p:cNvSpPr>
-            <a:spLocks noGrp="1"/>
-          </p:cNvSpPr>
-          <p:nvPr>
-            <p:ph type="title"/>
-          </p:nvPr>
-        </p:nvSpPr>
-        <p:spPr/>
-        <p:txBody>
-          <a:bodyPr/>
-          <a:lstStyle/>
-          <a:p>
-            <a:pPr algn="ctr"/>
-            <a:r>
-              <a:rPr lang="en-US" dirty="0"/>
-              <a:t>RStudio Layout</a:t>
-            </a:r>
-          </a:p>
-        </p:txBody>
-      </p:sp>
-      <p:pic>
-        <p:nvPicPr>
-          <p:cNvPr id="5" name="Content Placeholder 4" descr="A screenshot of a computer&#10;&#10;AI-generated content may be incorrect.">
-            <a:extLst>
-              <a:ext uri="{FF2B5EF4-FFF2-40B4-BE49-F238E27FC236}">
-                <a16:creationId xmlns:a16="http://schemas.microsoft.com/office/drawing/2014/main" id="{1A4A2778-38C5-8070-FA97-247AAFDE9185}"/>
-              </a:ext>
-            </a:extLst>
-          </p:cNvPr>
-          <p:cNvPicPr>
-            <a:picLocks noGrp="1" noChangeAspect="1"/>
-          </p:cNvPicPr>
-          <p:nvPr>
-            <p:ph idx="1"/>
-          </p:nvPr>
-        </p:nvPicPr>
-        <p:blipFill>
-          <a:blip r:embed="rId3"/>
-          <a:stretch>
-            <a:fillRect/>
-          </a:stretch>
-        </p:blipFill>
-        <p:spPr>
-          <a:xfrm>
-            <a:off x="4303644" y="1586751"/>
-            <a:ext cx="6778652" cy="5087169"/>
-          </a:xfrm>
-        </p:spPr>
-      </p:pic>
-      <p:sp>
-        <p:nvSpPr>
-          <p:cNvPr id="6" name="TextBox 5">
-            <a:extLst>
-              <a:ext uri="{FF2B5EF4-FFF2-40B4-BE49-F238E27FC236}">
-                <a16:creationId xmlns:a16="http://schemas.microsoft.com/office/drawing/2014/main" id="{F2457307-1BC6-0145-AFFD-2317D3044C64}"/>
-              </a:ext>
-            </a:extLst>
-          </p:cNvPr>
-          <p:cNvSpPr txBox="1"/>
-          <p:nvPr/>
-        </p:nvSpPr>
-        <p:spPr>
-          <a:xfrm>
-            <a:off x="407505" y="1690688"/>
-            <a:ext cx="3478696" cy="4401205"/>
-          </a:xfrm>
-          <a:prstGeom prst="rect">
-            <a:avLst/>
-          </a:prstGeom>
-          <a:noFill/>
-        </p:spPr>
-        <p:txBody>
-          <a:bodyPr wrap="square" rtlCol="0">
-            <a:spAutoFit/>
-          </a:bodyPr>
-          <a:lstStyle/>
-          <a:p>
-            <a:r>
-              <a:rPr lang="en-US" sz="2800" dirty="0"/>
-              <a:t>*Open RStudio on your device to follow along</a:t>
-            </a:r>
-          </a:p>
-          <a:p>
-            <a:endParaRPr lang="en-US" sz="2800" dirty="0"/>
-          </a:p>
-          <a:p>
-            <a:endParaRPr lang="en-US" sz="2800" dirty="0"/>
-          </a:p>
-          <a:p>
-            <a:endParaRPr lang="en-US" sz="2800" dirty="0"/>
-          </a:p>
-          <a:p>
-            <a:endParaRPr lang="en-US" sz="2800" dirty="0">
-              <a:hlinkClick r:id="rId4"/>
-            </a:endParaRPr>
-          </a:p>
-          <a:p>
-            <a:endParaRPr lang="en-US" sz="2800" dirty="0">
-              <a:hlinkClick r:id="rId4"/>
-            </a:endParaRPr>
-          </a:p>
-          <a:p>
-            <a:r>
-              <a:rPr lang="en-US" sz="2800" dirty="0">
-                <a:hlinkClick r:id="rId4"/>
-              </a:rPr>
-              <a:t>Link to RStudio IDE Cheatsheet</a:t>
-            </a:r>
-            <a:endParaRPr lang="en-US" sz="2800" dirty="0"/>
-          </a:p>
-        </p:txBody>
-      </p:sp>
-    </p:spTree>
-    <p:extLst>
-      <p:ext uri="{BB962C8B-B14F-4D97-AF65-F5344CB8AC3E}">
-        <p14:creationId xmlns:p14="http://schemas.microsoft.com/office/powerpoint/2010/main" val="2496282167"/>
-      </p:ext>
-    </p:extLst>
-  </p:cSld>
-  <p:clrMapOvr>
-    <a:masterClrMapping/>
-  </p:clrMapOvr>
-</p:sld>
-</file>
-
-<file path=ppt/slides/slide11.xml><?xml version="1.0" encoding="utf-8"?>
-<p:sld xmlns:a="http://schemas.openxmlformats.org/drawingml/2006/main" xmlns:r="http://schemas.openxmlformats.org/officeDocument/2006/relationships" xmlns:p="http://schemas.openxmlformats.org/presentationml/2006/main">
-  <p:cSld>
-    <p:spTree>
-      <p:nvGrpSpPr>
-        <p:cNvPr id="1" name=""/>
-        <p:cNvGrpSpPr/>
-        <p:nvPr/>
-      </p:nvGrpSpPr>
-      <p:grpSpPr>
-        <a:xfrm>
-          <a:off x="0" y="0"/>
-          <a:ext cx="0" cy="0"/>
-          <a:chOff x="0" y="0"/>
-          <a:chExt cx="0" cy="0"/>
-        </a:xfrm>
-      </p:grpSpPr>
-      <p:sp>
-        <p:nvSpPr>
-          <p:cNvPr id="2" name="Title 1">
-            <a:extLst>
-              <a:ext uri="{FF2B5EF4-FFF2-40B4-BE49-F238E27FC236}">
-                <a16:creationId xmlns:a16="http://schemas.microsoft.com/office/drawing/2014/main" id="{C34D917C-0352-4070-5A59-B74559D3A563}"/>
-              </a:ext>
-            </a:extLst>
-          </p:cNvPr>
-          <p:cNvSpPr>
-            <a:spLocks noGrp="1"/>
-          </p:cNvSpPr>
-          <p:nvPr>
-            <p:ph type="title"/>
-          </p:nvPr>
-        </p:nvSpPr>
-        <p:spPr/>
-        <p:txBody>
-          <a:bodyPr/>
-          <a:lstStyle/>
-          <a:p>
-            <a:pPr algn="ctr"/>
-            <a:r>
-              <a:rPr lang="en-US" dirty="0"/>
-              <a:t>How R Integrates with Your System</a:t>
-            </a:r>
-          </a:p>
-        </p:txBody>
-      </p:sp>
-      <p:sp>
-        <p:nvSpPr>
-          <p:cNvPr id="3" name="Content Placeholder 2">
-            <a:extLst>
-              <a:ext uri="{FF2B5EF4-FFF2-40B4-BE49-F238E27FC236}">
-                <a16:creationId xmlns:a16="http://schemas.microsoft.com/office/drawing/2014/main" id="{B390F8D3-C090-74C2-4B06-0193B5299946}"/>
-              </a:ext>
-            </a:extLst>
-          </p:cNvPr>
-          <p:cNvSpPr>
-            <a:spLocks noGrp="1"/>
-          </p:cNvSpPr>
-          <p:nvPr>
-            <p:ph idx="1"/>
-          </p:nvPr>
-        </p:nvSpPr>
-        <p:spPr/>
-        <p:txBody>
-          <a:bodyPr/>
-          <a:lstStyle/>
-          <a:p>
-            <a:r>
-              <a:rPr lang="en-US" b="1" dirty="0"/>
-              <a:t>Working directory</a:t>
-            </a:r>
-            <a:r>
-              <a:rPr lang="en-US" dirty="0"/>
-              <a:t> - The file path on your computer that you are working out of. This is where R will look (unless you tell it otherwise) for data and will save any objects you export from R to this destination.</a:t>
-            </a:r>
-          </a:p>
-          <a:p>
-            <a:endParaRPr lang="en-US" dirty="0"/>
-          </a:p>
-          <a:p>
-            <a:r>
-              <a:rPr lang="en-US" b="1" dirty="0"/>
-              <a:t>RStudio project</a:t>
-            </a:r>
-            <a:r>
-              <a:rPr lang="en-US" dirty="0"/>
-              <a:t> - Enables your work to be bundled in a self-contained folder. When you open a project your directory will automatically be set to the location where the project is saved. Allows you to easily share code.</a:t>
-            </a:r>
-          </a:p>
-        </p:txBody>
-      </p:sp>
-    </p:spTree>
-    <p:extLst>
-      <p:ext uri="{BB962C8B-B14F-4D97-AF65-F5344CB8AC3E}">
-        <p14:creationId xmlns:p14="http://schemas.microsoft.com/office/powerpoint/2010/main" val="994330739"/>
-      </p:ext>
-    </p:extLst>
-  </p:cSld>
-  <p:clrMapOvr>
-    <a:masterClrMapping/>
-  </p:clrMapOvr>
-</p:sld>
-</file>
-
-<file path=ppt/slides/slide12.xml><?xml version="1.0" encoding="utf-8"?>
-<p:sld xmlns:a="http://schemas.openxmlformats.org/drawingml/2006/main" xmlns:r="http://schemas.openxmlformats.org/officeDocument/2006/relationships" xmlns:p="http://schemas.openxmlformats.org/presentationml/2006/main">
-  <p:cSld>
-    <p:spTree>
-      <p:nvGrpSpPr>
-        <p:cNvPr id="1" name=""/>
-        <p:cNvGrpSpPr/>
-        <p:nvPr/>
-      </p:nvGrpSpPr>
-      <p:grpSpPr>
-        <a:xfrm>
-          <a:off x="0" y="0"/>
-          <a:ext cx="0" cy="0"/>
-          <a:chOff x="0" y="0"/>
-          <a:chExt cx="0" cy="0"/>
-        </a:xfrm>
-      </p:grpSpPr>
-      <p:sp>
-        <p:nvSpPr>
-          <p:cNvPr id="2" name="Title 1">
-            <a:extLst>
-              <a:ext uri="{FF2B5EF4-FFF2-40B4-BE49-F238E27FC236}">
-                <a16:creationId xmlns:a16="http://schemas.microsoft.com/office/drawing/2014/main" id="{0C98B4D3-7085-DDB0-2B5F-25F40165C0DC}"/>
-              </a:ext>
-            </a:extLst>
-          </p:cNvPr>
-          <p:cNvSpPr>
-            <a:spLocks noGrp="1"/>
-          </p:cNvSpPr>
-          <p:nvPr>
-            <p:ph type="title"/>
-          </p:nvPr>
-        </p:nvSpPr>
-        <p:spPr/>
-        <p:txBody>
-          <a:bodyPr/>
-          <a:lstStyle/>
-          <a:p>
-            <a:pPr algn="ctr"/>
-            <a:r>
-              <a:rPr lang="en-US" dirty="0"/>
-              <a:t>Folder/File Structure</a:t>
-            </a:r>
-          </a:p>
-        </p:txBody>
-      </p:sp>
-      <p:sp>
-        <p:nvSpPr>
-          <p:cNvPr id="3" name="Content Placeholder 2">
-            <a:extLst>
-              <a:ext uri="{FF2B5EF4-FFF2-40B4-BE49-F238E27FC236}">
-                <a16:creationId xmlns:a16="http://schemas.microsoft.com/office/drawing/2014/main" id="{48217470-1D47-46BA-580F-97D8C5B70191}"/>
-              </a:ext>
-            </a:extLst>
-          </p:cNvPr>
-          <p:cNvSpPr>
-            <a:spLocks noGrp="1"/>
-          </p:cNvSpPr>
-          <p:nvPr>
-            <p:ph idx="1"/>
-          </p:nvPr>
-        </p:nvSpPr>
-        <p:spPr/>
-        <p:txBody>
-          <a:bodyPr/>
-          <a:lstStyle/>
-          <a:p>
-            <a:pPr marL="0" indent="0">
-              <a:buNone/>
-            </a:pPr>
-            <a:r>
-              <a:rPr lang="en-US" dirty="0"/>
-              <a:t>When creating a folder structure for a project you want to aim for these things to increase reproducibility</a:t>
-            </a:r>
-          </a:p>
-          <a:p>
-            <a:pPr marL="0" indent="0">
-              <a:buNone/>
-            </a:pPr>
-            <a:endParaRPr lang="en-US" dirty="0"/>
-          </a:p>
-          <a:p>
-            <a:pPr marL="971550" lvl="1" indent="-514350">
-              <a:buFont typeface="+mj-lt"/>
-              <a:buAutoNum type="arabicPeriod"/>
-            </a:pPr>
-            <a:r>
-              <a:rPr lang="en-US" dirty="0"/>
-              <a:t>Well defined README</a:t>
-            </a:r>
-          </a:p>
-          <a:p>
-            <a:pPr marL="971550" lvl="1" indent="-514350">
-              <a:buFont typeface="+mj-lt"/>
-              <a:buAutoNum type="arabicPeriod"/>
-            </a:pPr>
-            <a:r>
-              <a:rPr lang="en-US" dirty="0"/>
-              <a:t>Easily understood by someone from any field</a:t>
-            </a:r>
-          </a:p>
-          <a:p>
-            <a:pPr marL="971550" lvl="1" indent="-514350">
-              <a:buFont typeface="+mj-lt"/>
-              <a:buAutoNum type="arabicPeriod"/>
-            </a:pPr>
-            <a:r>
-              <a:rPr lang="en-US" dirty="0"/>
-              <a:t>Short names, all lowercase, use _ for spaces</a:t>
-            </a:r>
-          </a:p>
-          <a:p>
-            <a:pPr marL="971550" lvl="1" indent="-514350">
-              <a:buFont typeface="+mj-lt"/>
-              <a:buAutoNum type="arabicPeriod"/>
-            </a:pPr>
-            <a:r>
-              <a:rPr lang="en-US" dirty="0"/>
-              <a:t>Only include nested folders when absolutely necessary</a:t>
-            </a:r>
-          </a:p>
-          <a:p>
-            <a:pPr marL="971550" lvl="1" indent="-514350">
-              <a:buFont typeface="+mj-lt"/>
-              <a:buAutoNum type="arabicPeriod"/>
-            </a:pPr>
-            <a:endParaRPr lang="en-US" dirty="0"/>
-          </a:p>
-        </p:txBody>
-      </p:sp>
-    </p:spTree>
-    <p:extLst>
-      <p:ext uri="{BB962C8B-B14F-4D97-AF65-F5344CB8AC3E}">
-        <p14:creationId xmlns:p14="http://schemas.microsoft.com/office/powerpoint/2010/main" val="1736784994"/>
-      </p:ext>
-    </p:extLst>
-  </p:cSld>
-  <p:clrMapOvr>
-    <a:masterClrMapping/>
-  </p:clrMapOvr>
-</p:sld>
-</file>
-
-<file path=ppt/slides/slide13.xml><?xml version="1.0" encoding="utf-8"?>
-<p:sld xmlns:a="http://schemas.openxmlformats.org/drawingml/2006/main" xmlns:r="http://schemas.openxmlformats.org/officeDocument/2006/relationships" xmlns:p="http://schemas.openxmlformats.org/presentationml/2006/main">
-  <p:cSld>
-    <p:spTree>
-      <p:nvGrpSpPr>
-        <p:cNvPr id="1" name=""/>
-        <p:cNvGrpSpPr/>
-        <p:nvPr/>
-      </p:nvGrpSpPr>
-      <p:grpSpPr>
-        <a:xfrm>
-          <a:off x="0" y="0"/>
-          <a:ext cx="0" cy="0"/>
-          <a:chOff x="0" y="0"/>
-          <a:chExt cx="0" cy="0"/>
-        </a:xfrm>
-      </p:grpSpPr>
-      <p:graphicFrame>
-        <p:nvGraphicFramePr>
-          <p:cNvPr id="4" name="Diagram 3">
-            <a:extLst>
-              <a:ext uri="{FF2B5EF4-FFF2-40B4-BE49-F238E27FC236}">
-                <a16:creationId xmlns:a16="http://schemas.microsoft.com/office/drawing/2014/main" id="{A2CEE108-F9FC-EB8D-E4AA-767615973A49}"/>
-              </a:ext>
-            </a:extLst>
-          </p:cNvPr>
-          <p:cNvGraphicFramePr/>
-          <p:nvPr>
-            <p:extLst>
-              <p:ext uri="{D42A27DB-BD31-4B8C-83A1-F6EECF244321}">
-                <p14:modId xmlns:p14="http://schemas.microsoft.com/office/powerpoint/2010/main" val="536154786"/>
-              </p:ext>
-            </p:extLst>
-          </p:nvPr>
-        </p:nvGraphicFramePr>
-        <p:xfrm>
-          <a:off x="0" y="995680"/>
-          <a:ext cx="12192000" cy="6858000"/>
-        </p:xfrm>
-        <a:graphic>
-          <a:graphicData uri="http://schemas.openxmlformats.org/drawingml/2006/diagram">
-            <dgm:relIds xmlns:dgm="http://schemas.openxmlformats.org/drawingml/2006/diagram" xmlns:r="http://schemas.openxmlformats.org/officeDocument/2006/relationships" r:dm="rId3" r:lo="rId4" r:qs="rId5" r:cs="rId6"/>
-          </a:graphicData>
-        </a:graphic>
-      </p:graphicFrame>
-      <p:pic>
-        <p:nvPicPr>
-          <p:cNvPr id="6" name="Graphic 5" descr="Star with solid fill">
-            <a:extLst>
-              <a:ext uri="{FF2B5EF4-FFF2-40B4-BE49-F238E27FC236}">
-                <a16:creationId xmlns:a16="http://schemas.microsoft.com/office/drawing/2014/main" id="{9E621567-6D02-2C18-8D1F-0F8C098138C9}"/>
-              </a:ext>
-            </a:extLst>
-          </p:cNvPr>
-          <p:cNvPicPr>
-            <a:picLocks noChangeAspect="1"/>
-          </p:cNvPicPr>
-          <p:nvPr/>
-        </p:nvPicPr>
-        <p:blipFill>
-          <a:blip r:embed="rId8">
-            <a:extLst>
-              <a:ext uri="{96DAC541-7B7A-43D3-8B79-37D633B846F1}">
-                <asvg:svgBlip xmlns:asvg="http://schemas.microsoft.com/office/drawing/2016/SVG/main" r:embed="rId9"/>
-              </a:ext>
-            </a:extLst>
-          </a:blip>
-          <a:stretch>
-            <a:fillRect/>
-          </a:stretch>
-        </p:blipFill>
-        <p:spPr>
-          <a:xfrm rot="487079">
-            <a:off x="11413780" y="3329135"/>
-            <a:ext cx="914400" cy="914400"/>
-          </a:xfrm>
-          <a:prstGeom prst="rect">
-            <a:avLst/>
-          </a:prstGeom>
-        </p:spPr>
-      </p:pic>
-      <p:sp>
-        <p:nvSpPr>
-          <p:cNvPr id="2" name="Title 1">
-            <a:extLst>
-              <a:ext uri="{FF2B5EF4-FFF2-40B4-BE49-F238E27FC236}">
-                <a16:creationId xmlns:a16="http://schemas.microsoft.com/office/drawing/2014/main" id="{7C88257F-397B-A219-A527-1A746326E421}"/>
-              </a:ext>
-            </a:extLst>
-          </p:cNvPr>
-          <p:cNvSpPr txBox="1">
-            <a:spLocks/>
-          </p:cNvSpPr>
-          <p:nvPr/>
-        </p:nvSpPr>
-        <p:spPr>
-          <a:xfrm>
-            <a:off x="838200" y="0"/>
-            <a:ext cx="10515600" cy="1325563"/>
-          </a:xfrm>
-          <a:prstGeom prst="rect">
-            <a:avLst/>
-          </a:prstGeom>
-        </p:spPr>
-        <p:txBody>
-          <a:bodyPr vert="horz" lIns="91440" tIns="45720" rIns="91440" bIns="45720" rtlCol="0" anchor="b">
-            <a:normAutofit/>
-          </a:bodyPr>
-          <a:lstStyle>
-            <a:lvl1pPr algn="ctr" defTabSz="914400" rtl="0" eaLnBrk="1" latinLnBrk="0" hangingPunct="1">
-              <a:lnSpc>
-                <a:spcPct val="90000"/>
-              </a:lnSpc>
-              <a:spcBef>
-                <a:spcPct val="0"/>
-              </a:spcBef>
-              <a:buNone/>
-              <a:defRPr sz="6000" kern="1200">
-                <a:solidFill>
-                  <a:schemeClr val="tx1"/>
-                </a:solidFill>
-                <a:latin typeface="+mj-lt"/>
-                <a:ea typeface="+mj-ea"/>
-                <a:cs typeface="+mj-cs"/>
-              </a:defRPr>
-            </a:lvl1pPr>
-          </a:lstStyle>
-          <a:p>
-            <a:r>
-              <a:rPr lang="en-US"/>
-              <a:t>Example Starting Folder Structure</a:t>
-            </a:r>
-            <a:endParaRPr lang="en-US" dirty="0"/>
-          </a:p>
-        </p:txBody>
-      </p:sp>
-    </p:spTree>
-    <p:extLst>
-      <p:ext uri="{BB962C8B-B14F-4D97-AF65-F5344CB8AC3E}">
-        <p14:creationId xmlns:p14="http://schemas.microsoft.com/office/powerpoint/2010/main" val="3412106931"/>
-      </p:ext>
-    </p:extLst>
-  </p:cSld>
-  <p:clrMapOvr>
-    <a:masterClrMapping/>
-  </p:clrMapOvr>
-</p:sld>
-</file>
-
-<file path=ppt/slides/slide14.xml><?xml version="1.0" encoding="utf-8"?>
-<p:sld xmlns:a="http://schemas.openxmlformats.org/drawingml/2006/main" xmlns:r="http://schemas.openxmlformats.org/officeDocument/2006/relationships" xmlns:p="http://schemas.openxmlformats.org/presentationml/2006/main">
-  <p:cSld>
-    <p:spTree>
-      <p:nvGrpSpPr>
-        <p:cNvPr id="1" name=""/>
-        <p:cNvGrpSpPr/>
-        <p:nvPr/>
-      </p:nvGrpSpPr>
-      <p:grpSpPr>
-        <a:xfrm>
-          <a:off x="0" y="0"/>
-          <a:ext cx="0" cy="0"/>
-          <a:chOff x="0" y="0"/>
-          <a:chExt cx="0" cy="0"/>
-        </a:xfrm>
-      </p:grpSpPr>
-      <p:sp>
-        <p:nvSpPr>
-          <p:cNvPr id="2" name="Title 1">
-            <a:extLst>
-              <a:ext uri="{FF2B5EF4-FFF2-40B4-BE49-F238E27FC236}">
                 <a16:creationId xmlns:a16="http://schemas.microsoft.com/office/drawing/2014/main" id="{B9582E79-B4CF-399D-9B52-04955BE73183}"/>
               </a:ext>
             </a:extLst>
@@ -11418,7 +10967,7 @@
 </p:sld>
 </file>
 
-<file path=ppt/slides/slide15.xml><?xml version="1.0" encoding="utf-8"?>
+<file path=ppt/slides/slide11.xml><?xml version="1.0" encoding="utf-8"?>
 <p:sld xmlns:a="http://schemas.openxmlformats.org/drawingml/2006/main" xmlns:r="http://schemas.openxmlformats.org/officeDocument/2006/relationships" xmlns:p="http://schemas.openxmlformats.org/presentationml/2006/main">
   <p:cSld>
     <p:spTree>
@@ -11526,7 +11075,7 @@
 </p:sld>
 </file>
 
-<file path=ppt/slides/slide16.xml><?xml version="1.0" encoding="utf-8"?>
+<file path=ppt/slides/slide12.xml><?xml version="1.0" encoding="utf-8"?>
 <p:sld xmlns:a="http://schemas.openxmlformats.org/drawingml/2006/main" xmlns:r="http://schemas.openxmlformats.org/officeDocument/2006/relationships" xmlns:p="http://schemas.openxmlformats.org/presentationml/2006/main">
   <p:cSld>
     <p:spTree>
@@ -11585,7 +11134,7 @@
 </p:sld>
 </file>
 
-<file path=ppt/slides/slide17.xml><?xml version="1.0" encoding="utf-8"?>
+<file path=ppt/slides/slide13.xml><?xml version="1.0" encoding="utf-8"?>
 <p:sld xmlns:a="http://schemas.openxmlformats.org/drawingml/2006/main" xmlns:r="http://schemas.openxmlformats.org/officeDocument/2006/relationships" xmlns:p="http://schemas.openxmlformats.org/presentationml/2006/main">
   <p:cSld>
     <p:spTree>
@@ -11644,7 +11193,7 @@
 </p:sld>
 </file>
 
-<file path=ppt/slides/slide18.xml><?xml version="1.0" encoding="utf-8"?>
+<file path=ppt/slides/slide14.xml><?xml version="1.0" encoding="utf-8"?>
 <p:sld xmlns:a="http://schemas.openxmlformats.org/drawingml/2006/main" xmlns:r="http://schemas.openxmlformats.org/officeDocument/2006/relationships" xmlns:p="http://schemas.openxmlformats.org/presentationml/2006/main">
   <p:cSld>
     <p:spTree>
@@ -11866,7 +11415,7 @@
 </p:sld>
 </file>
 
-<file path=ppt/slides/slide19.xml><?xml version="1.0" encoding="utf-8"?>
+<file path=ppt/slides/slide15.xml><?xml version="1.0" encoding="utf-8"?>
 <p:sld xmlns:a="http://schemas.openxmlformats.org/drawingml/2006/main" xmlns:r="http://schemas.openxmlformats.org/officeDocument/2006/relationships" xmlns:p="http://schemas.openxmlformats.org/presentationml/2006/main">
   <p:cSld>
     <p:spTree>
@@ -12001,251 +11550,7 @@
 </p:sld>
 </file>
 
-<file path=ppt/slides/slide2.xml><?xml version="1.0" encoding="utf-8"?>
-<p:sld xmlns:a="http://schemas.openxmlformats.org/drawingml/2006/main" xmlns:r="http://schemas.openxmlformats.org/officeDocument/2006/relationships" xmlns:p="http://schemas.openxmlformats.org/presentationml/2006/main">
-  <p:cSld>
-    <p:spTree>
-      <p:nvGrpSpPr>
-        <p:cNvPr id="1" name=""/>
-        <p:cNvGrpSpPr/>
-        <p:nvPr/>
-      </p:nvGrpSpPr>
-      <p:grpSpPr>
-        <a:xfrm>
-          <a:off x="0" y="0"/>
-          <a:ext cx="0" cy="0"/>
-          <a:chOff x="0" y="0"/>
-          <a:chExt cx="0" cy="0"/>
-        </a:xfrm>
-      </p:grpSpPr>
-      <p:sp>
-        <p:nvSpPr>
-          <p:cNvPr id="2" name="Title 1">
-            <a:extLst>
-              <a:ext uri="{FF2B5EF4-FFF2-40B4-BE49-F238E27FC236}">
-                <a16:creationId xmlns:a16="http://schemas.microsoft.com/office/drawing/2014/main" id="{C502AA43-05D2-9F91-20E3-7EF6EAD8D125}"/>
-              </a:ext>
-            </a:extLst>
-          </p:cNvPr>
-          <p:cNvSpPr>
-            <a:spLocks noGrp="1"/>
-          </p:cNvSpPr>
-          <p:nvPr>
-            <p:ph type="title"/>
-          </p:nvPr>
-        </p:nvSpPr>
-        <p:spPr>
-          <a:xfrm>
-            <a:off x="838200" y="134865"/>
-            <a:ext cx="10515600" cy="704268"/>
-          </a:xfrm>
-        </p:spPr>
-        <p:txBody>
-          <a:bodyPr/>
-          <a:lstStyle/>
-          <a:p>
-            <a:pPr algn="ctr"/>
-            <a:r>
-              <a:rPr lang="en-US" dirty="0"/>
-              <a:t>Instructors</a:t>
-            </a:r>
-          </a:p>
-        </p:txBody>
-      </p:sp>
-      <p:sp>
-        <p:nvSpPr>
-          <p:cNvPr id="3" name="Content Placeholder 2">
-            <a:extLst>
-              <a:ext uri="{FF2B5EF4-FFF2-40B4-BE49-F238E27FC236}">
-                <a16:creationId xmlns:a16="http://schemas.microsoft.com/office/drawing/2014/main" id="{FA668741-CD59-72EE-0171-3F1515385326}"/>
-              </a:ext>
-            </a:extLst>
-          </p:cNvPr>
-          <p:cNvSpPr>
-            <a:spLocks noGrp="1"/>
-          </p:cNvSpPr>
-          <p:nvPr>
-            <p:ph idx="1"/>
-          </p:nvPr>
-        </p:nvSpPr>
-        <p:spPr>
-          <a:xfrm>
-            <a:off x="339632" y="1282912"/>
-            <a:ext cx="9483990" cy="4351338"/>
-          </a:xfrm>
-        </p:spPr>
-        <p:txBody>
-          <a:bodyPr/>
-          <a:lstStyle/>
-          <a:p>
-            <a:r>
-              <a:rPr lang="en-US" dirty="0"/>
-              <a:t>Dr. Marissa Dyck (she/her) – </a:t>
-            </a:r>
-            <a:r>
-              <a:rPr lang="en-US" dirty="0">
-                <a:hlinkClick r:id="rId2"/>
-              </a:rPr>
-              <a:t>marissadyck17@gmail.com</a:t>
-            </a:r>
-            <a:endParaRPr lang="en-US" dirty="0"/>
-          </a:p>
-          <a:p>
-            <a:pPr marL="457200" lvl="1" indent="0">
-              <a:buNone/>
-            </a:pPr>
-            <a:r>
-              <a:rPr lang="en-US" dirty="0"/>
-              <a:t>Postdoctoral Research Fellow</a:t>
-            </a:r>
-          </a:p>
-          <a:p>
-            <a:pPr marL="457200" lvl="1" indent="0">
-              <a:buNone/>
-            </a:pPr>
-            <a:r>
-              <a:rPr lang="en-US" dirty="0"/>
-              <a:t>University of Victoria</a:t>
-            </a:r>
-          </a:p>
-          <a:p>
-            <a:pPr marL="457200" lvl="1" indent="0">
-              <a:buNone/>
-            </a:pPr>
-            <a:r>
-              <a:rPr lang="en-US" dirty="0"/>
-              <a:t>Victoria, BC, Canada</a:t>
-            </a:r>
-          </a:p>
-          <a:p>
-            <a:pPr marL="457200" lvl="1" indent="0">
-              <a:buNone/>
-            </a:pPr>
-            <a:endParaRPr lang="en-US" dirty="0"/>
-          </a:p>
-          <a:p>
-            <a:r>
-              <a:rPr lang="en-US" dirty="0"/>
-              <a:t>Dr. Erika Barthelmess (she/her) – </a:t>
-            </a:r>
-            <a:r>
-              <a:rPr lang="en-US" dirty="0" err="1"/>
-              <a:t>b</a:t>
-            </a:r>
-            <a:r>
-              <a:rPr lang="en-US" dirty="0" err="1">
-                <a:hlinkClick r:id="rId3"/>
-              </a:rPr>
-              <a:t>arthelmess@stlawu.edu</a:t>
-            </a:r>
-            <a:r>
-              <a:rPr lang="en-US" dirty="0"/>
-              <a:t> </a:t>
-            </a:r>
-          </a:p>
-          <a:p>
-            <a:pPr marL="457200" lvl="1" indent="0">
-              <a:buNone/>
-            </a:pPr>
-            <a:r>
-              <a:rPr lang="en-US" dirty="0"/>
-              <a:t>Professor of Biology</a:t>
-            </a:r>
-          </a:p>
-          <a:p>
-            <a:pPr marL="457200" lvl="1" indent="0">
-              <a:buNone/>
-            </a:pPr>
-            <a:r>
-              <a:rPr lang="en-US" dirty="0"/>
-              <a:t>St. Lawrence University</a:t>
-            </a:r>
-          </a:p>
-          <a:p>
-            <a:pPr marL="457200" lvl="1" indent="0">
-              <a:buNone/>
-            </a:pPr>
-            <a:r>
-              <a:rPr lang="en-US" dirty="0"/>
-              <a:t>Canton, NY, USA</a:t>
-            </a:r>
-          </a:p>
-        </p:txBody>
-      </p:sp>
-      <p:pic>
-        <p:nvPicPr>
-          <p:cNvPr id="5" name="Picture 4" descr="A person wearing a hat and a jacket&#10;&#10;AI-generated content may be incorrect.">
-            <a:extLst>
-              <a:ext uri="{FF2B5EF4-FFF2-40B4-BE49-F238E27FC236}">
-                <a16:creationId xmlns:a16="http://schemas.microsoft.com/office/drawing/2014/main" id="{9E00D801-AE36-DBA5-810B-9435260862E8}"/>
-              </a:ext>
-            </a:extLst>
-          </p:cNvPr>
-          <p:cNvPicPr>
-            <a:picLocks noChangeAspect="1"/>
-          </p:cNvPicPr>
-          <p:nvPr/>
-        </p:nvPicPr>
-        <p:blipFill>
-          <a:blip r:embed="rId4"/>
-          <a:stretch>
-            <a:fillRect/>
-          </a:stretch>
-        </p:blipFill>
-        <p:spPr>
-          <a:xfrm>
-            <a:off x="9553303" y="1112466"/>
-            <a:ext cx="2143526" cy="2145762"/>
-          </a:xfrm>
-          <a:prstGeom prst="rect">
-            <a:avLst/>
-          </a:prstGeom>
-        </p:spPr>
-      </p:pic>
-      <p:pic>
-        <p:nvPicPr>
-          <p:cNvPr id="6" name="Picture 5" descr="A person wearing a hat and sunglasses&#10;&#10;AI-generated content may be incorrect.">
-            <a:extLst>
-              <a:ext uri="{FF2B5EF4-FFF2-40B4-BE49-F238E27FC236}">
-                <a16:creationId xmlns:a16="http://schemas.microsoft.com/office/drawing/2014/main" id="{933DE1D7-3726-9AED-D9AB-26F0E87F4FE7}"/>
-              </a:ext>
-            </a:extLst>
-          </p:cNvPr>
-          <p:cNvPicPr>
-            <a:picLocks noChangeAspect="1"/>
-          </p:cNvPicPr>
-          <p:nvPr/>
-        </p:nvPicPr>
-        <p:blipFill>
-          <a:blip r:embed="rId5"/>
-          <a:stretch>
-            <a:fillRect/>
-          </a:stretch>
-        </p:blipFill>
-        <p:spPr>
-          <a:xfrm>
-            <a:off x="9553303" y="3939337"/>
-            <a:ext cx="2145762" cy="2145762"/>
-          </a:xfrm>
-          <a:prstGeom prst="rect">
-            <a:avLst/>
-          </a:prstGeom>
-        </p:spPr>
-      </p:pic>
-    </p:spTree>
-    <p:extLst>
-      <p:ext uri="{BB962C8B-B14F-4D97-AF65-F5344CB8AC3E}">
-        <p14:creationId xmlns:p14="http://schemas.microsoft.com/office/powerpoint/2010/main" val="2081615761"/>
-      </p:ext>
-    </p:extLst>
-  </p:cSld>
-  <p:clrMapOvr>
-    <a:masterClrMapping/>
-  </p:clrMapOvr>
-</p:sld>
-</file>
-
-<file path=ppt/slides/slide20.xml><?xml version="1.0" encoding="utf-8"?>
+<file path=ppt/slides/slide16.xml><?xml version="1.0" encoding="utf-8"?>
 <p:sld xmlns:a="http://schemas.openxmlformats.org/drawingml/2006/main" xmlns:r="http://schemas.openxmlformats.org/officeDocument/2006/relationships" xmlns:p="http://schemas.openxmlformats.org/presentationml/2006/main">
   <p:cSld>
     <p:spTree>
@@ -12416,7 +11721,7 @@
 </p:sld>
 </file>
 
-<file path=ppt/slides/slide21.xml><?xml version="1.0" encoding="utf-8"?>
+<file path=ppt/slides/slide17.xml><?xml version="1.0" encoding="utf-8"?>
 <p:sld xmlns:a="http://schemas.openxmlformats.org/drawingml/2006/main" xmlns:r="http://schemas.openxmlformats.org/officeDocument/2006/relationships" xmlns:p="http://schemas.openxmlformats.org/presentationml/2006/main">
   <p:cSld>
     <p:spTree>
@@ -12438,7 +11743,7 @@
           <p:cNvPr id="2" name="Title 1">
             <a:extLst>
               <a:ext uri="{FF2B5EF4-FFF2-40B4-BE49-F238E27FC236}">
-                <a16:creationId xmlns:a16="http://schemas.microsoft.com/office/drawing/2014/main" id="{D4B90E71-48FE-6891-CBCF-6077A083D75E}"/>
+                <a16:creationId xmlns:a16="http://schemas.microsoft.com/office/drawing/2014/main" id="{0C625785-D25C-AE61-E9C4-48E61606F69F}"/>
               </a:ext>
             </a:extLst>
           </p:cNvPr>
@@ -12457,7 +11762,7 @@
             <a:pPr algn="ctr"/>
             <a:r>
               <a:rPr lang="en-US" dirty="0"/>
-              <a:t>Tidy Data</a:t>
+              <a:t>Practice with R Markdown</a:t>
             </a:r>
           </a:p>
         </p:txBody>
@@ -12467,7 +11772,7 @@
           <p:cNvPr id="3" name="Content Placeholder 2">
             <a:extLst>
               <a:ext uri="{FF2B5EF4-FFF2-40B4-BE49-F238E27FC236}">
-                <a16:creationId xmlns:a16="http://schemas.microsoft.com/office/drawing/2014/main" id="{0280FA68-37CF-3C33-BDCF-FE09125952D1}"/>
+                <a16:creationId xmlns:a16="http://schemas.microsoft.com/office/drawing/2014/main" id="{2F9A8A6C-26E1-F702-7DE5-448F72D2784B}"/>
               </a:ext>
             </a:extLst>
           </p:cNvPr>
@@ -12478,22 +11783,89 @@
             <p:ph idx="1"/>
           </p:nvPr>
         </p:nvSpPr>
-        <p:spPr/>
+        <p:spPr>
+          <a:xfrm>
+            <a:off x="838200" y="1321904"/>
+            <a:ext cx="10515600" cy="5416826"/>
+          </a:xfrm>
+        </p:spPr>
         <p:txBody>
           <a:bodyPr/>
           <a:lstStyle/>
           <a:p>
             <a:r>
               <a:rPr lang="en-US" dirty="0"/>
-              <a:t>Erika fill in</a:t>
-            </a:r>
+              <a:t>In RStudio open a new R Markdown file</a:t>
+            </a:r>
+          </a:p>
+          <a:p>
+            <a:r>
+              <a:rPr lang="en-US" dirty="0"/>
+              <a:t>Modify the YAML – title, name, date</a:t>
+            </a:r>
+          </a:p>
+          <a:p>
+            <a:r>
+              <a:rPr lang="en-US" dirty="0"/>
+              <a:t>Remove existing comments and code chunks</a:t>
+            </a:r>
+          </a:p>
+          <a:p>
+            <a:r>
+              <a:rPr lang="en-US" dirty="0"/>
+              <a:t>Add the following elements to your R Markdown with headers for each section and following coding best practices</a:t>
+            </a:r>
+          </a:p>
+          <a:p>
+            <a:pPr lvl="1"/>
+            <a:r>
+              <a:rPr lang="en-US" dirty="0"/>
+              <a:t>Personal info: name, pronouns, email (included as link), and why you chose this workshop</a:t>
+            </a:r>
+          </a:p>
+          <a:p>
+            <a:pPr lvl="1"/>
+            <a:r>
+              <a:rPr lang="en-US" dirty="0"/>
+              <a:t>Insert a fun image of your choice and resize it</a:t>
+            </a:r>
+          </a:p>
+          <a:p>
+            <a:pPr lvl="1"/>
+            <a:r>
+              <a:rPr lang="en-US" dirty="0"/>
+              <a:t>Code chunk that won’t be run when knit that installs packages (</a:t>
+            </a:r>
+            <a:r>
+              <a:rPr lang="en-US" dirty="0" err="1"/>
+              <a:t>tidyverse</a:t>
+            </a:r>
+            <a:r>
+              <a:rPr lang="en-US" dirty="0"/>
+              <a:t>, )</a:t>
+            </a:r>
+          </a:p>
+          <a:p>
+            <a:pPr lvl="1"/>
+            <a:r>
+              <a:rPr lang="en-US" dirty="0"/>
+              <a:t>Code chunk that won’t display messages when knit that loads the installed libraries</a:t>
+            </a:r>
+          </a:p>
+          <a:p>
+            <a:pPr lvl="1"/>
+            <a:endParaRPr lang="en-US" dirty="0"/>
+          </a:p>
+          <a:p>
+            <a:pPr lvl="1"/>
+            <a:endParaRPr lang="en-US" dirty="0"/>
           </a:p>
         </p:txBody>
       </p:sp>
     </p:spTree>
     <p:extLst>
       <p:ext uri="{BB962C8B-B14F-4D97-AF65-F5344CB8AC3E}">
-        <p14:creationId xmlns:p14="http://schemas.microsoft.com/office/powerpoint/2010/main" val="1619483221"/>
+        <p14:creationId xmlns:p14="http://schemas.microsoft.com/office/powerpoint/2010/main" val="2854229411"/>
       </p:ext>
     </p:extLst>
   </p:cSld>
@@ -12503,301 +11875,7 @@
 </p:sld>
 </file>
 
-<file path=ppt/slides/slide3.xml><?xml version="1.0" encoding="utf-8"?>
-<p:sld xmlns:a="http://schemas.openxmlformats.org/drawingml/2006/main" xmlns:r="http://schemas.openxmlformats.org/officeDocument/2006/relationships" xmlns:p="http://schemas.openxmlformats.org/presentationml/2006/main">
-  <p:cSld>
-    <p:spTree>
-      <p:nvGrpSpPr>
-        <p:cNvPr id="1" name=""/>
-        <p:cNvGrpSpPr/>
-        <p:nvPr/>
-      </p:nvGrpSpPr>
-      <p:grpSpPr>
-        <a:xfrm>
-          <a:off x="0" y="0"/>
-          <a:ext cx="0" cy="0"/>
-          <a:chOff x="0" y="0"/>
-          <a:chExt cx="0" cy="0"/>
-        </a:xfrm>
-      </p:grpSpPr>
-      <p:sp>
-        <p:nvSpPr>
-          <p:cNvPr id="2" name="Title 1">
-            <a:extLst>
-              <a:ext uri="{FF2B5EF4-FFF2-40B4-BE49-F238E27FC236}">
-                <a16:creationId xmlns:a16="http://schemas.microsoft.com/office/drawing/2014/main" id="{3F79B21A-F1F7-1CA5-C645-5D2A5E3FA2D8}"/>
-              </a:ext>
-            </a:extLst>
-          </p:cNvPr>
-          <p:cNvSpPr>
-            <a:spLocks noGrp="1"/>
-          </p:cNvSpPr>
-          <p:nvPr>
-            <p:ph type="title"/>
-          </p:nvPr>
-        </p:nvSpPr>
-        <p:spPr/>
-        <p:txBody>
-          <a:bodyPr/>
-          <a:lstStyle/>
-          <a:p>
-            <a:pPr algn="ctr"/>
-            <a:r>
-              <a:rPr lang="en-US" dirty="0"/>
-              <a:t>Free Intro to R Workshop</a:t>
-            </a:r>
-          </a:p>
-        </p:txBody>
-      </p:sp>
-      <p:pic>
-        <p:nvPicPr>
-          <p:cNvPr id="5" name="Content Placeholder 4" descr="A screenshot of a computer&#10;&#10;AI-generated content may be incorrect.">
-            <a:extLst>
-              <a:ext uri="{FF2B5EF4-FFF2-40B4-BE49-F238E27FC236}">
-                <a16:creationId xmlns:a16="http://schemas.microsoft.com/office/drawing/2014/main" id="{827F1506-1EE9-8B88-F560-BBFFBA4DA69F}"/>
-              </a:ext>
-            </a:extLst>
-          </p:cNvPr>
-          <p:cNvPicPr>
-            <a:picLocks noGrp="1" noChangeAspect="1"/>
-          </p:cNvPicPr>
-          <p:nvPr>
-            <p:ph idx="1"/>
-          </p:nvPr>
-        </p:nvPicPr>
-        <p:blipFill>
-          <a:blip r:embed="rId2"/>
-          <a:stretch>
-            <a:fillRect/>
-          </a:stretch>
-        </p:blipFill>
-        <p:spPr>
-          <a:xfrm>
-            <a:off x="1441194" y="1825625"/>
-            <a:ext cx="9309611" cy="4351338"/>
-          </a:xfrm>
-        </p:spPr>
-      </p:pic>
-      <p:sp>
-        <p:nvSpPr>
-          <p:cNvPr id="6" name="TextBox 5">
-            <a:extLst>
-              <a:ext uri="{FF2B5EF4-FFF2-40B4-BE49-F238E27FC236}">
-                <a16:creationId xmlns:a16="http://schemas.microsoft.com/office/drawing/2014/main" id="{57967576-7FCE-D75D-7AE6-456EAB67DB97}"/>
-              </a:ext>
-            </a:extLst>
-          </p:cNvPr>
-          <p:cNvSpPr txBox="1"/>
-          <p:nvPr/>
-        </p:nvSpPr>
-        <p:spPr>
-          <a:xfrm>
-            <a:off x="115707" y="6311900"/>
-            <a:ext cx="3099816" cy="369332"/>
-          </a:xfrm>
-          <a:prstGeom prst="rect">
-            <a:avLst/>
-          </a:prstGeom>
-          <a:noFill/>
-        </p:spPr>
-        <p:txBody>
-          <a:bodyPr wrap="square" rtlCol="0">
-            <a:spAutoFit/>
-          </a:bodyPr>
-          <a:lstStyle/>
-          <a:p>
-            <a:r>
-              <a:rPr lang="en-US" dirty="0">
-                <a:hlinkClick r:id="rId3"/>
-              </a:rPr>
-              <a:t>R Crash Course GitHub Link</a:t>
-            </a:r>
-            <a:endParaRPr lang="en-US" dirty="0"/>
-          </a:p>
-        </p:txBody>
-      </p:sp>
-      <p:pic>
-        <p:nvPicPr>
-          <p:cNvPr id="8" name="Picture 7" descr="A cartoon of a person with two animals&#10;&#10;AI-generated content may be incorrect.">
-            <a:extLst>
-              <a:ext uri="{FF2B5EF4-FFF2-40B4-BE49-F238E27FC236}">
-                <a16:creationId xmlns:a16="http://schemas.microsoft.com/office/drawing/2014/main" id="{DA3F16ED-CA57-193D-1E29-08AE95AB9B7C}"/>
-              </a:ext>
-            </a:extLst>
-          </p:cNvPr>
-          <p:cNvPicPr>
-            <a:picLocks noChangeAspect="1"/>
-          </p:cNvPicPr>
-          <p:nvPr/>
-        </p:nvPicPr>
-        <p:blipFill>
-          <a:blip r:embed="rId4"/>
-          <a:stretch>
-            <a:fillRect/>
-          </a:stretch>
-        </p:blipFill>
-        <p:spPr>
-          <a:xfrm>
-            <a:off x="499958" y="4441978"/>
-            <a:ext cx="1882471" cy="1869922"/>
-          </a:xfrm>
-          <a:prstGeom prst="ellipse">
-            <a:avLst/>
-          </a:prstGeom>
-          <a:ln>
-            <a:noFill/>
-          </a:ln>
-          <a:effectLst>
-            <a:softEdge rad="112500"/>
-          </a:effectLst>
-        </p:spPr>
-      </p:pic>
-    </p:spTree>
-    <p:extLst>
-      <p:ext uri="{BB962C8B-B14F-4D97-AF65-F5344CB8AC3E}">
-        <p14:creationId xmlns:p14="http://schemas.microsoft.com/office/powerpoint/2010/main" val="1877543471"/>
-      </p:ext>
-    </p:extLst>
-  </p:cSld>
-  <p:clrMapOvr>
-    <a:masterClrMapping/>
-  </p:clrMapOvr>
-</p:sld>
-</file>
-
-<file path=ppt/slides/slide4.xml><?xml version="1.0" encoding="utf-8"?>
-<p:sld xmlns:a="http://schemas.openxmlformats.org/drawingml/2006/main" xmlns:r="http://schemas.openxmlformats.org/officeDocument/2006/relationships" xmlns:p="http://schemas.openxmlformats.org/presentationml/2006/main">
-  <p:cSld>
-    <p:spTree>
-      <p:nvGrpSpPr>
-        <p:cNvPr id="1" name=""/>
-        <p:cNvGrpSpPr/>
-        <p:nvPr/>
-      </p:nvGrpSpPr>
-      <p:grpSpPr>
-        <a:xfrm>
-          <a:off x="0" y="0"/>
-          <a:ext cx="0" cy="0"/>
-          <a:chOff x="0" y="0"/>
-          <a:chExt cx="0" cy="0"/>
-        </a:xfrm>
-      </p:grpSpPr>
-      <p:sp>
-        <p:nvSpPr>
-          <p:cNvPr id="2" name="Title 1">
-            <a:extLst>
-              <a:ext uri="{FF2B5EF4-FFF2-40B4-BE49-F238E27FC236}">
-                <a16:creationId xmlns:a16="http://schemas.microsoft.com/office/drawing/2014/main" id="{7DDD590C-E632-2CE9-1F11-984741E24571}"/>
-              </a:ext>
-            </a:extLst>
-          </p:cNvPr>
-          <p:cNvSpPr>
-            <a:spLocks noGrp="1"/>
-          </p:cNvSpPr>
-          <p:nvPr>
-            <p:ph type="title"/>
-          </p:nvPr>
-        </p:nvSpPr>
-        <p:spPr/>
-        <p:txBody>
-          <a:bodyPr/>
-          <a:lstStyle/>
-          <a:p>
-            <a:pPr algn="ctr"/>
-            <a:r>
-              <a:rPr lang="en-US" dirty="0"/>
-              <a:t>Agenda</a:t>
-            </a:r>
-          </a:p>
-        </p:txBody>
-      </p:sp>
-      <p:sp>
-        <p:nvSpPr>
-          <p:cNvPr id="3" name="Content Placeholder 2">
-            <a:extLst>
-              <a:ext uri="{FF2B5EF4-FFF2-40B4-BE49-F238E27FC236}">
-                <a16:creationId xmlns:a16="http://schemas.microsoft.com/office/drawing/2014/main" id="{8817B3E3-A203-3400-73A8-852C404CAE71}"/>
-              </a:ext>
-            </a:extLst>
-          </p:cNvPr>
-          <p:cNvSpPr>
-            <a:spLocks noGrp="1"/>
-          </p:cNvSpPr>
-          <p:nvPr>
-            <p:ph idx="1"/>
-          </p:nvPr>
-        </p:nvSpPr>
-        <p:spPr/>
-        <p:txBody>
-          <a:bodyPr/>
-          <a:lstStyle/>
-          <a:p>
-            <a:pPr marL="571500" indent="-571500">
-              <a:buFont typeface="+mj-lt"/>
-              <a:buAutoNum type="romanUcPeriod"/>
-            </a:pPr>
-            <a:r>
-              <a:rPr lang="en-US" dirty="0"/>
-              <a:t>Git/GitHub</a:t>
-            </a:r>
-          </a:p>
-          <a:p>
-            <a:pPr lvl="1"/>
-            <a:endParaRPr lang="en-US" dirty="0"/>
-          </a:p>
-          <a:p>
-            <a:pPr marL="571500" indent="-571500">
-              <a:buFont typeface="+mj-lt"/>
-              <a:buAutoNum type="romanUcPeriod"/>
-            </a:pPr>
-            <a:r>
-              <a:rPr lang="en-US" dirty="0"/>
-              <a:t>R Overview</a:t>
-            </a:r>
-          </a:p>
-          <a:p>
-            <a:pPr marL="571500" indent="-571500">
-              <a:buFont typeface="+mj-lt"/>
-              <a:buAutoNum type="romanUcPeriod"/>
-            </a:pPr>
-            <a:r>
-              <a:rPr lang="en-US" dirty="0"/>
-              <a:t>R Markdown</a:t>
-            </a:r>
-          </a:p>
-          <a:p>
-            <a:pPr marL="571500" indent="-571500">
-              <a:buFont typeface="+mj-lt"/>
-              <a:buAutoNum type="romanUcPeriod"/>
-            </a:pPr>
-            <a:r>
-              <a:rPr lang="en-US" dirty="0"/>
-              <a:t>Tidy data </a:t>
-            </a:r>
-          </a:p>
-          <a:p>
-            <a:pPr marL="571500" indent="-571500">
-              <a:buFont typeface="+mj-lt"/>
-              <a:buAutoNum type="romanUcPeriod"/>
-            </a:pPr>
-            <a:endParaRPr lang="en-US" dirty="0"/>
-          </a:p>
-        </p:txBody>
-      </p:sp>
-    </p:spTree>
-    <p:extLst>
-      <p:ext uri="{BB962C8B-B14F-4D97-AF65-F5344CB8AC3E}">
-        <p14:creationId xmlns:p14="http://schemas.microsoft.com/office/powerpoint/2010/main" val="3678490627"/>
-      </p:ext>
-    </p:extLst>
-  </p:cSld>
-  <p:clrMapOvr>
-    <a:masterClrMapping/>
-  </p:clrMapOvr>
-</p:sld>
-</file>
-
-<file path=ppt/slides/slide5.xml><?xml version="1.0" encoding="utf-8"?>
+<file path=ppt/slides/slide18.xml><?xml version="1.0" encoding="utf-8"?>
 <p:sld xmlns:a="http://schemas.openxmlformats.org/drawingml/2006/main" xmlns:r="http://schemas.openxmlformats.org/officeDocument/2006/relationships" xmlns:p="http://schemas.openxmlformats.org/presentationml/2006/main">
   <p:cSld>
     <p:spTree>
@@ -12890,7 +11968,7 @@
     </p:spTree>
     <p:extLst>
       <p:ext uri="{BB962C8B-B14F-4D97-AF65-F5344CB8AC3E}">
-        <p14:creationId xmlns:p14="http://schemas.microsoft.com/office/powerpoint/2010/main" val="4073995806"/>
+        <p14:creationId xmlns:p14="http://schemas.microsoft.com/office/powerpoint/2010/main" val="3324382596"/>
       </p:ext>
     </p:extLst>
   </p:cSld>
@@ -12900,7 +11978,7 @@
 </p:sld>
 </file>
 
-<file path=ppt/slides/slide6.xml><?xml version="1.0" encoding="utf-8"?>
+<file path=ppt/slides/slide19.xml><?xml version="1.0" encoding="utf-8"?>
 <p:sld xmlns:a="http://schemas.openxmlformats.org/drawingml/2006/main" xmlns:r="http://schemas.openxmlformats.org/officeDocument/2006/relationships" xmlns:p="http://schemas.openxmlformats.org/presentationml/2006/main">
   <p:cSld>
     <p:spTree>
@@ -13761,7 +12839,7 @@
     </p:spTree>
     <p:extLst>
       <p:ext uri="{BB962C8B-B14F-4D97-AF65-F5344CB8AC3E}">
-        <p14:creationId xmlns:p14="http://schemas.microsoft.com/office/powerpoint/2010/main" val="1561373863"/>
+        <p14:creationId xmlns:p14="http://schemas.microsoft.com/office/powerpoint/2010/main" val="303959582"/>
       </p:ext>
     </p:extLst>
   </p:cSld>
@@ -14168,7 +13246,251 @@
 </p:sld>
 </file>
 
-<file path=ppt/slides/slide7.xml><?xml version="1.0" encoding="utf-8"?>
+<file path=ppt/slides/slide2.xml><?xml version="1.0" encoding="utf-8"?>
+<p:sld xmlns:a="http://schemas.openxmlformats.org/drawingml/2006/main" xmlns:r="http://schemas.openxmlformats.org/officeDocument/2006/relationships" xmlns:p="http://schemas.openxmlformats.org/presentationml/2006/main">
+  <p:cSld>
+    <p:spTree>
+      <p:nvGrpSpPr>
+        <p:cNvPr id="1" name=""/>
+        <p:cNvGrpSpPr/>
+        <p:nvPr/>
+      </p:nvGrpSpPr>
+      <p:grpSpPr>
+        <a:xfrm>
+          <a:off x="0" y="0"/>
+          <a:ext cx="0" cy="0"/>
+          <a:chOff x="0" y="0"/>
+          <a:chExt cx="0" cy="0"/>
+        </a:xfrm>
+      </p:grpSpPr>
+      <p:sp>
+        <p:nvSpPr>
+          <p:cNvPr id="2" name="Title 1">
+            <a:extLst>
+              <a:ext uri="{FF2B5EF4-FFF2-40B4-BE49-F238E27FC236}">
+                <a16:creationId xmlns:a16="http://schemas.microsoft.com/office/drawing/2014/main" id="{C502AA43-05D2-9F91-20E3-7EF6EAD8D125}"/>
+              </a:ext>
+            </a:extLst>
+          </p:cNvPr>
+          <p:cNvSpPr>
+            <a:spLocks noGrp="1"/>
+          </p:cNvSpPr>
+          <p:nvPr>
+            <p:ph type="title"/>
+          </p:nvPr>
+        </p:nvSpPr>
+        <p:spPr>
+          <a:xfrm>
+            <a:off x="838200" y="134865"/>
+            <a:ext cx="10515600" cy="704268"/>
+          </a:xfrm>
+        </p:spPr>
+        <p:txBody>
+          <a:bodyPr/>
+          <a:lstStyle/>
+          <a:p>
+            <a:pPr algn="ctr"/>
+            <a:r>
+              <a:rPr lang="en-US" dirty="0"/>
+              <a:t>Instructors</a:t>
+            </a:r>
+          </a:p>
+        </p:txBody>
+      </p:sp>
+      <p:sp>
+        <p:nvSpPr>
+          <p:cNvPr id="3" name="Content Placeholder 2">
+            <a:extLst>
+              <a:ext uri="{FF2B5EF4-FFF2-40B4-BE49-F238E27FC236}">
+                <a16:creationId xmlns:a16="http://schemas.microsoft.com/office/drawing/2014/main" id="{FA668741-CD59-72EE-0171-3F1515385326}"/>
+              </a:ext>
+            </a:extLst>
+          </p:cNvPr>
+          <p:cNvSpPr>
+            <a:spLocks noGrp="1"/>
+          </p:cNvSpPr>
+          <p:nvPr>
+            <p:ph idx="1"/>
+          </p:nvPr>
+        </p:nvSpPr>
+        <p:spPr>
+          <a:xfrm>
+            <a:off x="339632" y="1282912"/>
+            <a:ext cx="9483990" cy="4351338"/>
+          </a:xfrm>
+        </p:spPr>
+        <p:txBody>
+          <a:bodyPr/>
+          <a:lstStyle/>
+          <a:p>
+            <a:r>
+              <a:rPr lang="en-US" dirty="0"/>
+              <a:t>Dr. Marissa Dyck (she/her) – </a:t>
+            </a:r>
+            <a:r>
+              <a:rPr lang="en-US" dirty="0">
+                <a:hlinkClick r:id="rId2"/>
+              </a:rPr>
+              <a:t>marissadyck17@gmail.com</a:t>
+            </a:r>
+            <a:endParaRPr lang="en-US" dirty="0"/>
+          </a:p>
+          <a:p>
+            <a:pPr marL="457200" lvl="1" indent="0">
+              <a:buNone/>
+            </a:pPr>
+            <a:r>
+              <a:rPr lang="en-US" dirty="0"/>
+              <a:t>Postdoctoral Research Fellow</a:t>
+            </a:r>
+          </a:p>
+          <a:p>
+            <a:pPr marL="457200" lvl="1" indent="0">
+              <a:buNone/>
+            </a:pPr>
+            <a:r>
+              <a:rPr lang="en-US" dirty="0"/>
+              <a:t>University of Victoria</a:t>
+            </a:r>
+          </a:p>
+          <a:p>
+            <a:pPr marL="457200" lvl="1" indent="0">
+              <a:buNone/>
+            </a:pPr>
+            <a:r>
+              <a:rPr lang="en-US" dirty="0"/>
+              <a:t>Victoria, BC, Canada</a:t>
+            </a:r>
+          </a:p>
+          <a:p>
+            <a:pPr marL="457200" lvl="1" indent="0">
+              <a:buNone/>
+            </a:pPr>
+            <a:endParaRPr lang="en-US" dirty="0"/>
+          </a:p>
+          <a:p>
+            <a:r>
+              <a:rPr lang="en-US" dirty="0"/>
+              <a:t>Dr. Erika Barthelmess (she/her) – </a:t>
+            </a:r>
+            <a:r>
+              <a:rPr lang="en-US" dirty="0" err="1"/>
+              <a:t>b</a:t>
+            </a:r>
+            <a:r>
+              <a:rPr lang="en-US" dirty="0" err="1">
+                <a:hlinkClick r:id="rId3"/>
+              </a:rPr>
+              <a:t>arthelmess@stlawu.edu</a:t>
+            </a:r>
+            <a:r>
+              <a:rPr lang="en-US" dirty="0"/>
+              <a:t> </a:t>
+            </a:r>
+          </a:p>
+          <a:p>
+            <a:pPr marL="457200" lvl="1" indent="0">
+              <a:buNone/>
+            </a:pPr>
+            <a:r>
+              <a:rPr lang="en-US" dirty="0"/>
+              <a:t>Professor of Biology</a:t>
+            </a:r>
+          </a:p>
+          <a:p>
+            <a:pPr marL="457200" lvl="1" indent="0">
+              <a:buNone/>
+            </a:pPr>
+            <a:r>
+              <a:rPr lang="en-US" dirty="0"/>
+              <a:t>St. Lawrence University</a:t>
+            </a:r>
+          </a:p>
+          <a:p>
+            <a:pPr marL="457200" lvl="1" indent="0">
+              <a:buNone/>
+            </a:pPr>
+            <a:r>
+              <a:rPr lang="en-US" dirty="0"/>
+              <a:t>Canton, NY, USA</a:t>
+            </a:r>
+          </a:p>
+        </p:txBody>
+      </p:sp>
+      <p:pic>
+        <p:nvPicPr>
+          <p:cNvPr id="5" name="Picture 4" descr="A person wearing a hat and a jacket&#10;&#10;AI-generated content may be incorrect.">
+            <a:extLst>
+              <a:ext uri="{FF2B5EF4-FFF2-40B4-BE49-F238E27FC236}">
+                <a16:creationId xmlns:a16="http://schemas.microsoft.com/office/drawing/2014/main" id="{9E00D801-AE36-DBA5-810B-9435260862E8}"/>
+              </a:ext>
+            </a:extLst>
+          </p:cNvPr>
+          <p:cNvPicPr>
+            <a:picLocks noChangeAspect="1"/>
+          </p:cNvPicPr>
+          <p:nvPr/>
+        </p:nvPicPr>
+        <p:blipFill>
+          <a:blip r:embed="rId4"/>
+          <a:stretch>
+            <a:fillRect/>
+          </a:stretch>
+        </p:blipFill>
+        <p:spPr>
+          <a:xfrm>
+            <a:off x="9553303" y="1112466"/>
+            <a:ext cx="2143526" cy="2145762"/>
+          </a:xfrm>
+          <a:prstGeom prst="rect">
+            <a:avLst/>
+          </a:prstGeom>
+        </p:spPr>
+      </p:pic>
+      <p:pic>
+        <p:nvPicPr>
+          <p:cNvPr id="6" name="Picture 5" descr="A person wearing a hat and sunglasses&#10;&#10;AI-generated content may be incorrect.">
+            <a:extLst>
+              <a:ext uri="{FF2B5EF4-FFF2-40B4-BE49-F238E27FC236}">
+                <a16:creationId xmlns:a16="http://schemas.microsoft.com/office/drawing/2014/main" id="{933DE1D7-3726-9AED-D9AB-26F0E87F4FE7}"/>
+              </a:ext>
+            </a:extLst>
+          </p:cNvPr>
+          <p:cNvPicPr>
+            <a:picLocks noChangeAspect="1"/>
+          </p:cNvPicPr>
+          <p:nvPr/>
+        </p:nvPicPr>
+        <p:blipFill>
+          <a:blip r:embed="rId5"/>
+          <a:stretch>
+            <a:fillRect/>
+          </a:stretch>
+        </p:blipFill>
+        <p:spPr>
+          <a:xfrm>
+            <a:off x="9553303" y="3939337"/>
+            <a:ext cx="2145762" cy="2145762"/>
+          </a:xfrm>
+          <a:prstGeom prst="rect">
+            <a:avLst/>
+          </a:prstGeom>
+        </p:spPr>
+      </p:pic>
+    </p:spTree>
+    <p:extLst>
+      <p:ext uri="{BB962C8B-B14F-4D97-AF65-F5344CB8AC3E}">
+        <p14:creationId xmlns:p14="http://schemas.microsoft.com/office/powerpoint/2010/main" val="2081615761"/>
+      </p:ext>
+    </p:extLst>
+  </p:cSld>
+  <p:clrMapOvr>
+    <a:masterClrMapping/>
+  </p:clrMapOvr>
+</p:sld>
+</file>
+
+<file path=ppt/slides/slide20.xml><?xml version="1.0" encoding="utf-8"?>
 <p:sld xmlns:a="http://schemas.openxmlformats.org/drawingml/2006/main" xmlns:r="http://schemas.openxmlformats.org/officeDocument/2006/relationships" xmlns:p="http://schemas.openxmlformats.org/presentationml/2006/main">
   <p:cSld>
     <p:spTree>
@@ -15070,7 +14392,7 @@
     </p:spTree>
     <p:extLst>
       <p:ext uri="{BB962C8B-B14F-4D97-AF65-F5344CB8AC3E}">
-        <p14:creationId xmlns:p14="http://schemas.microsoft.com/office/powerpoint/2010/main" val="2566216467"/>
+        <p14:creationId xmlns:p14="http://schemas.microsoft.com/office/powerpoint/2010/main" val="3305492185"/>
       </p:ext>
     </p:extLst>
   </p:cSld>
@@ -15080,7 +14402,7 @@
 </p:sld>
 </file>
 
-<file path=ppt/slides/slide8.xml><?xml version="1.0" encoding="utf-8"?>
+<file path=ppt/slides/slide21.xml><?xml version="1.0" encoding="utf-8"?>
 <p:sld xmlns:a="http://schemas.openxmlformats.org/drawingml/2006/main" xmlns:r="http://schemas.openxmlformats.org/officeDocument/2006/relationships" xmlns:p="http://schemas.openxmlformats.org/presentationml/2006/main">
   <p:cSld>
     <p:spTree>
@@ -16146,7 +15468,7 @@
     </p:spTree>
     <p:extLst>
       <p:ext uri="{BB962C8B-B14F-4D97-AF65-F5344CB8AC3E}">
-        <p14:creationId xmlns:p14="http://schemas.microsoft.com/office/powerpoint/2010/main" val="2707863712"/>
+        <p14:creationId xmlns:p14="http://schemas.microsoft.com/office/powerpoint/2010/main" val="3945925858"/>
       </p:ext>
     </p:extLst>
   </p:cSld>
@@ -16156,7 +15478,388 @@
 </p:sld>
 </file>
 
-<file path=ppt/slides/slide9.xml><?xml version="1.0" encoding="utf-8"?>
+<file path=ppt/slides/slide22.xml><?xml version="1.0" encoding="utf-8"?>
+<p:sld xmlns:a="http://schemas.openxmlformats.org/drawingml/2006/main" xmlns:r="http://schemas.openxmlformats.org/officeDocument/2006/relationships" xmlns:p="http://schemas.openxmlformats.org/presentationml/2006/main">
+  <p:cSld>
+    <p:spTree>
+      <p:nvGrpSpPr>
+        <p:cNvPr id="1" name=""/>
+        <p:cNvGrpSpPr/>
+        <p:nvPr/>
+      </p:nvGrpSpPr>
+      <p:grpSpPr>
+        <a:xfrm>
+          <a:off x="0" y="0"/>
+          <a:ext cx="0" cy="0"/>
+          <a:chOff x="0" y="0"/>
+          <a:chExt cx="0" cy="0"/>
+        </a:xfrm>
+      </p:grpSpPr>
+      <p:sp>
+        <p:nvSpPr>
+          <p:cNvPr id="2" name="Title 1">
+            <a:extLst>
+              <a:ext uri="{FF2B5EF4-FFF2-40B4-BE49-F238E27FC236}">
+                <a16:creationId xmlns:a16="http://schemas.microsoft.com/office/drawing/2014/main" id="{D4B90E71-48FE-6891-CBCF-6077A083D75E}"/>
+              </a:ext>
+            </a:extLst>
+          </p:cNvPr>
+          <p:cNvSpPr>
+            <a:spLocks noGrp="1"/>
+          </p:cNvSpPr>
+          <p:nvPr>
+            <p:ph type="title"/>
+          </p:nvPr>
+        </p:nvSpPr>
+        <p:spPr/>
+        <p:txBody>
+          <a:bodyPr/>
+          <a:lstStyle/>
+          <a:p>
+            <a:pPr algn="ctr"/>
+            <a:r>
+              <a:rPr lang="en-US" dirty="0"/>
+              <a:t>Tidy Data</a:t>
+            </a:r>
+          </a:p>
+        </p:txBody>
+      </p:sp>
+      <p:sp>
+        <p:nvSpPr>
+          <p:cNvPr id="3" name="Content Placeholder 2">
+            <a:extLst>
+              <a:ext uri="{FF2B5EF4-FFF2-40B4-BE49-F238E27FC236}">
+                <a16:creationId xmlns:a16="http://schemas.microsoft.com/office/drawing/2014/main" id="{0280FA68-37CF-3C33-BDCF-FE09125952D1}"/>
+              </a:ext>
+            </a:extLst>
+          </p:cNvPr>
+          <p:cNvSpPr>
+            <a:spLocks noGrp="1"/>
+          </p:cNvSpPr>
+          <p:nvPr>
+            <p:ph idx="1"/>
+          </p:nvPr>
+        </p:nvSpPr>
+        <p:spPr/>
+        <p:txBody>
+          <a:bodyPr/>
+          <a:lstStyle/>
+          <a:p>
+            <a:r>
+              <a:rPr lang="en-US" dirty="0"/>
+              <a:t>Erika fill in</a:t>
+            </a:r>
+          </a:p>
+        </p:txBody>
+      </p:sp>
+    </p:spTree>
+    <p:extLst>
+      <p:ext uri="{BB962C8B-B14F-4D97-AF65-F5344CB8AC3E}">
+        <p14:creationId xmlns:p14="http://schemas.microsoft.com/office/powerpoint/2010/main" val="1619483221"/>
+      </p:ext>
+    </p:extLst>
+  </p:cSld>
+  <p:clrMapOvr>
+    <a:masterClrMapping/>
+  </p:clrMapOvr>
+</p:sld>
+</file>
+
+<file path=ppt/slides/slide3.xml><?xml version="1.0" encoding="utf-8"?>
+<p:sld xmlns:a="http://schemas.openxmlformats.org/drawingml/2006/main" xmlns:r="http://schemas.openxmlformats.org/officeDocument/2006/relationships" xmlns:p="http://schemas.openxmlformats.org/presentationml/2006/main">
+  <p:cSld>
+    <p:spTree>
+      <p:nvGrpSpPr>
+        <p:cNvPr id="1" name=""/>
+        <p:cNvGrpSpPr/>
+        <p:nvPr/>
+      </p:nvGrpSpPr>
+      <p:grpSpPr>
+        <a:xfrm>
+          <a:off x="0" y="0"/>
+          <a:ext cx="0" cy="0"/>
+          <a:chOff x="0" y="0"/>
+          <a:chExt cx="0" cy="0"/>
+        </a:xfrm>
+      </p:grpSpPr>
+      <p:sp>
+        <p:nvSpPr>
+          <p:cNvPr id="2" name="Title 1">
+            <a:extLst>
+              <a:ext uri="{FF2B5EF4-FFF2-40B4-BE49-F238E27FC236}">
+                <a16:creationId xmlns:a16="http://schemas.microsoft.com/office/drawing/2014/main" id="{3F79B21A-F1F7-1CA5-C645-5D2A5E3FA2D8}"/>
+              </a:ext>
+            </a:extLst>
+          </p:cNvPr>
+          <p:cNvSpPr>
+            <a:spLocks noGrp="1"/>
+          </p:cNvSpPr>
+          <p:nvPr>
+            <p:ph type="title"/>
+          </p:nvPr>
+        </p:nvSpPr>
+        <p:spPr/>
+        <p:txBody>
+          <a:bodyPr/>
+          <a:lstStyle/>
+          <a:p>
+            <a:pPr algn="ctr"/>
+            <a:r>
+              <a:rPr lang="en-US" dirty="0"/>
+              <a:t>Free Intro to R Workshop</a:t>
+            </a:r>
+          </a:p>
+        </p:txBody>
+      </p:sp>
+      <p:pic>
+        <p:nvPicPr>
+          <p:cNvPr id="5" name="Content Placeholder 4" descr="A screenshot of a computer&#10;&#10;AI-generated content may be incorrect.">
+            <a:extLst>
+              <a:ext uri="{FF2B5EF4-FFF2-40B4-BE49-F238E27FC236}">
+                <a16:creationId xmlns:a16="http://schemas.microsoft.com/office/drawing/2014/main" id="{827F1506-1EE9-8B88-F560-BBFFBA4DA69F}"/>
+              </a:ext>
+            </a:extLst>
+          </p:cNvPr>
+          <p:cNvPicPr>
+            <a:picLocks noGrp="1" noChangeAspect="1"/>
+          </p:cNvPicPr>
+          <p:nvPr>
+            <p:ph idx="1"/>
+          </p:nvPr>
+        </p:nvPicPr>
+        <p:blipFill>
+          <a:blip r:embed="rId2"/>
+          <a:stretch>
+            <a:fillRect/>
+          </a:stretch>
+        </p:blipFill>
+        <p:spPr>
+          <a:xfrm>
+            <a:off x="1441194" y="1825625"/>
+            <a:ext cx="9309611" cy="4351338"/>
+          </a:xfrm>
+        </p:spPr>
+      </p:pic>
+      <p:sp>
+        <p:nvSpPr>
+          <p:cNvPr id="6" name="TextBox 5">
+            <a:extLst>
+              <a:ext uri="{FF2B5EF4-FFF2-40B4-BE49-F238E27FC236}">
+                <a16:creationId xmlns:a16="http://schemas.microsoft.com/office/drawing/2014/main" id="{57967576-7FCE-D75D-7AE6-456EAB67DB97}"/>
+              </a:ext>
+            </a:extLst>
+          </p:cNvPr>
+          <p:cNvSpPr txBox="1"/>
+          <p:nvPr/>
+        </p:nvSpPr>
+        <p:spPr>
+          <a:xfrm>
+            <a:off x="115707" y="6311900"/>
+            <a:ext cx="3099816" cy="369332"/>
+          </a:xfrm>
+          <a:prstGeom prst="rect">
+            <a:avLst/>
+          </a:prstGeom>
+          <a:noFill/>
+        </p:spPr>
+        <p:txBody>
+          <a:bodyPr wrap="square" rtlCol="0">
+            <a:spAutoFit/>
+          </a:bodyPr>
+          <a:lstStyle/>
+          <a:p>
+            <a:r>
+              <a:rPr lang="en-US" dirty="0">
+                <a:hlinkClick r:id="rId3"/>
+              </a:rPr>
+              <a:t>R Crash Course GitHub Link</a:t>
+            </a:r>
+            <a:endParaRPr lang="en-US" dirty="0"/>
+          </a:p>
+        </p:txBody>
+      </p:sp>
+      <p:pic>
+        <p:nvPicPr>
+          <p:cNvPr id="8" name="Picture 7" descr="A cartoon of a person with two animals&#10;&#10;AI-generated content may be incorrect.">
+            <a:extLst>
+              <a:ext uri="{FF2B5EF4-FFF2-40B4-BE49-F238E27FC236}">
+                <a16:creationId xmlns:a16="http://schemas.microsoft.com/office/drawing/2014/main" id="{DA3F16ED-CA57-193D-1E29-08AE95AB9B7C}"/>
+              </a:ext>
+            </a:extLst>
+          </p:cNvPr>
+          <p:cNvPicPr>
+            <a:picLocks noChangeAspect="1"/>
+          </p:cNvPicPr>
+          <p:nvPr/>
+        </p:nvPicPr>
+        <p:blipFill>
+          <a:blip r:embed="rId4"/>
+          <a:stretch>
+            <a:fillRect/>
+          </a:stretch>
+        </p:blipFill>
+        <p:spPr>
+          <a:xfrm>
+            <a:off x="499958" y="4441978"/>
+            <a:ext cx="1882471" cy="1869922"/>
+          </a:xfrm>
+          <a:prstGeom prst="ellipse">
+            <a:avLst/>
+          </a:prstGeom>
+          <a:ln>
+            <a:noFill/>
+          </a:ln>
+          <a:effectLst>
+            <a:softEdge rad="112500"/>
+          </a:effectLst>
+        </p:spPr>
+      </p:pic>
+    </p:spTree>
+    <p:extLst>
+      <p:ext uri="{BB962C8B-B14F-4D97-AF65-F5344CB8AC3E}">
+        <p14:creationId xmlns:p14="http://schemas.microsoft.com/office/powerpoint/2010/main" val="1877543471"/>
+      </p:ext>
+    </p:extLst>
+  </p:cSld>
+  <p:clrMapOvr>
+    <a:masterClrMapping/>
+  </p:clrMapOvr>
+</p:sld>
+</file>
+
+<file path=ppt/slides/slide4.xml><?xml version="1.0" encoding="utf-8"?>
+<p:sld xmlns:a="http://schemas.openxmlformats.org/drawingml/2006/main" xmlns:r="http://schemas.openxmlformats.org/officeDocument/2006/relationships" xmlns:p="http://schemas.openxmlformats.org/presentationml/2006/main">
+  <p:cSld>
+    <p:spTree>
+      <p:nvGrpSpPr>
+        <p:cNvPr id="1" name=""/>
+        <p:cNvGrpSpPr/>
+        <p:nvPr/>
+      </p:nvGrpSpPr>
+      <p:grpSpPr>
+        <a:xfrm>
+          <a:off x="0" y="0"/>
+          <a:ext cx="0" cy="0"/>
+          <a:chOff x="0" y="0"/>
+          <a:chExt cx="0" cy="0"/>
+        </a:xfrm>
+      </p:grpSpPr>
+      <p:sp>
+        <p:nvSpPr>
+          <p:cNvPr id="2" name="Title 1">
+            <a:extLst>
+              <a:ext uri="{FF2B5EF4-FFF2-40B4-BE49-F238E27FC236}">
+                <a16:creationId xmlns:a16="http://schemas.microsoft.com/office/drawing/2014/main" id="{7DDD590C-E632-2CE9-1F11-984741E24571}"/>
+              </a:ext>
+            </a:extLst>
+          </p:cNvPr>
+          <p:cNvSpPr>
+            <a:spLocks noGrp="1"/>
+          </p:cNvSpPr>
+          <p:nvPr>
+            <p:ph type="title"/>
+          </p:nvPr>
+        </p:nvSpPr>
+        <p:spPr/>
+        <p:txBody>
+          <a:bodyPr/>
+          <a:lstStyle/>
+          <a:p>
+            <a:pPr algn="ctr"/>
+            <a:r>
+              <a:rPr lang="en-US" dirty="0"/>
+              <a:t>Agenda</a:t>
+            </a:r>
+          </a:p>
+        </p:txBody>
+      </p:sp>
+      <p:sp>
+        <p:nvSpPr>
+          <p:cNvPr id="3" name="Content Placeholder 2">
+            <a:extLst>
+              <a:ext uri="{FF2B5EF4-FFF2-40B4-BE49-F238E27FC236}">
+                <a16:creationId xmlns:a16="http://schemas.microsoft.com/office/drawing/2014/main" id="{8817B3E3-A203-3400-73A8-852C404CAE71}"/>
+              </a:ext>
+            </a:extLst>
+          </p:cNvPr>
+          <p:cNvSpPr>
+            <a:spLocks noGrp="1"/>
+          </p:cNvSpPr>
+          <p:nvPr>
+            <p:ph idx="1"/>
+          </p:nvPr>
+        </p:nvSpPr>
+        <p:spPr/>
+        <p:txBody>
+          <a:bodyPr/>
+          <a:lstStyle/>
+          <a:p>
+            <a:pPr lvl="1"/>
+            <a:endParaRPr lang="en-US" dirty="0"/>
+          </a:p>
+          <a:p>
+            <a:pPr marL="571500" indent="-571500">
+              <a:buFont typeface="+mj-lt"/>
+              <a:buAutoNum type="romanUcPeriod"/>
+            </a:pPr>
+            <a:r>
+              <a:rPr lang="en-US" dirty="0"/>
+              <a:t>R Overview</a:t>
+            </a:r>
+          </a:p>
+          <a:p>
+            <a:pPr marL="571500" indent="-571500">
+              <a:buFont typeface="+mj-lt"/>
+              <a:buAutoNum type="romanUcPeriod"/>
+            </a:pPr>
+            <a:r>
+              <a:rPr lang="en-US" dirty="0"/>
+              <a:t>R Markdown</a:t>
+            </a:r>
+          </a:p>
+          <a:p>
+            <a:pPr marL="571500" indent="-571500">
+              <a:buFont typeface="+mj-lt"/>
+              <a:buAutoNum type="romanUcPeriod"/>
+            </a:pPr>
+            <a:r>
+              <a:rPr lang="en-US" dirty="0"/>
+              <a:t>Git/GitHub</a:t>
+            </a:r>
+          </a:p>
+          <a:p>
+            <a:pPr marL="571500" indent="-571500">
+              <a:buFont typeface="+mj-lt"/>
+              <a:buAutoNum type="romanUcPeriod"/>
+            </a:pPr>
+            <a:r>
+              <a:rPr lang="en-US" dirty="0"/>
+              <a:t>Tidy data </a:t>
+            </a:r>
+          </a:p>
+          <a:p>
+            <a:pPr marL="571500" indent="-571500">
+              <a:buFont typeface="+mj-lt"/>
+              <a:buAutoNum type="romanUcPeriod"/>
+            </a:pPr>
+            <a:endParaRPr lang="en-US" dirty="0"/>
+          </a:p>
+        </p:txBody>
+      </p:sp>
+    </p:spTree>
+    <p:extLst>
+      <p:ext uri="{BB962C8B-B14F-4D97-AF65-F5344CB8AC3E}">
+        <p14:creationId xmlns:p14="http://schemas.microsoft.com/office/powerpoint/2010/main" val="3678490627"/>
+      </p:ext>
+    </p:extLst>
+  </p:cSld>
+  <p:clrMapOvr>
+    <a:masterClrMapping/>
+  </p:clrMapOvr>
+</p:sld>
+</file>
+
+<file path=ppt/slides/slide5.xml><?xml version="1.0" encoding="utf-8"?>
 <p:sld xmlns:a="http://schemas.openxmlformats.org/drawingml/2006/main" xmlns:r="http://schemas.openxmlformats.org/officeDocument/2006/relationships" xmlns:p="http://schemas.openxmlformats.org/presentationml/2006/main">
   <p:cSld>
     <p:spTree>
@@ -16370,6 +16073,553 @@
     <p:extLst>
       <p:ext uri="{BB962C8B-B14F-4D97-AF65-F5344CB8AC3E}">
         <p14:creationId xmlns:p14="http://schemas.microsoft.com/office/powerpoint/2010/main" val="1132508629"/>
+      </p:ext>
+    </p:extLst>
+  </p:cSld>
+  <p:clrMapOvr>
+    <a:masterClrMapping/>
+  </p:clrMapOvr>
+</p:sld>
+</file>
+
+<file path=ppt/slides/slide6.xml><?xml version="1.0" encoding="utf-8"?>
+<p:sld xmlns:a="http://schemas.openxmlformats.org/drawingml/2006/main" xmlns:r="http://schemas.openxmlformats.org/officeDocument/2006/relationships" xmlns:p="http://schemas.openxmlformats.org/presentationml/2006/main">
+  <p:cSld>
+    <p:spTree>
+      <p:nvGrpSpPr>
+        <p:cNvPr id="1" name=""/>
+        <p:cNvGrpSpPr/>
+        <p:nvPr/>
+      </p:nvGrpSpPr>
+      <p:grpSpPr>
+        <a:xfrm>
+          <a:off x="0" y="0"/>
+          <a:ext cx="0" cy="0"/>
+          <a:chOff x="0" y="0"/>
+          <a:chExt cx="0" cy="0"/>
+        </a:xfrm>
+      </p:grpSpPr>
+      <p:sp>
+        <p:nvSpPr>
+          <p:cNvPr id="2" name="Title 1">
+            <a:extLst>
+              <a:ext uri="{FF2B5EF4-FFF2-40B4-BE49-F238E27FC236}">
+                <a16:creationId xmlns:a16="http://schemas.microsoft.com/office/drawing/2014/main" id="{11EC0683-F7D3-1235-B856-038D12121D96}"/>
+              </a:ext>
+            </a:extLst>
+          </p:cNvPr>
+          <p:cNvSpPr>
+            <a:spLocks noGrp="1"/>
+          </p:cNvSpPr>
+          <p:nvPr>
+            <p:ph type="title"/>
+          </p:nvPr>
+        </p:nvSpPr>
+        <p:spPr/>
+        <p:txBody>
+          <a:bodyPr/>
+          <a:lstStyle/>
+          <a:p>
+            <a:pPr algn="ctr"/>
+            <a:r>
+              <a:rPr lang="en-US" dirty="0"/>
+              <a:t>RStudio Layout</a:t>
+            </a:r>
+          </a:p>
+        </p:txBody>
+      </p:sp>
+      <p:pic>
+        <p:nvPicPr>
+          <p:cNvPr id="5" name="Content Placeholder 4" descr="A screenshot of a computer&#10;&#10;AI-generated content may be incorrect.">
+            <a:extLst>
+              <a:ext uri="{FF2B5EF4-FFF2-40B4-BE49-F238E27FC236}">
+                <a16:creationId xmlns:a16="http://schemas.microsoft.com/office/drawing/2014/main" id="{1A4A2778-38C5-8070-FA97-247AAFDE9185}"/>
+              </a:ext>
+            </a:extLst>
+          </p:cNvPr>
+          <p:cNvPicPr>
+            <a:picLocks noGrp="1" noChangeAspect="1"/>
+          </p:cNvPicPr>
+          <p:nvPr>
+            <p:ph idx="1"/>
+          </p:nvPr>
+        </p:nvPicPr>
+        <p:blipFill>
+          <a:blip r:embed="rId3"/>
+          <a:stretch>
+            <a:fillRect/>
+          </a:stretch>
+        </p:blipFill>
+        <p:spPr>
+          <a:xfrm>
+            <a:off x="4303644" y="1586751"/>
+            <a:ext cx="6778652" cy="5087169"/>
+          </a:xfrm>
+        </p:spPr>
+      </p:pic>
+      <p:sp>
+        <p:nvSpPr>
+          <p:cNvPr id="6" name="TextBox 5">
+            <a:extLst>
+              <a:ext uri="{FF2B5EF4-FFF2-40B4-BE49-F238E27FC236}">
+                <a16:creationId xmlns:a16="http://schemas.microsoft.com/office/drawing/2014/main" id="{F2457307-1BC6-0145-AFFD-2317D3044C64}"/>
+              </a:ext>
+            </a:extLst>
+          </p:cNvPr>
+          <p:cNvSpPr txBox="1"/>
+          <p:nvPr/>
+        </p:nvSpPr>
+        <p:spPr>
+          <a:xfrm>
+            <a:off x="407505" y="1690688"/>
+            <a:ext cx="3478696" cy="4401205"/>
+          </a:xfrm>
+          <a:prstGeom prst="rect">
+            <a:avLst/>
+          </a:prstGeom>
+          <a:noFill/>
+        </p:spPr>
+        <p:txBody>
+          <a:bodyPr wrap="square" rtlCol="0">
+            <a:spAutoFit/>
+          </a:bodyPr>
+          <a:lstStyle/>
+          <a:p>
+            <a:r>
+              <a:rPr lang="en-US" sz="2800" dirty="0"/>
+              <a:t>*Open RStudio on your device to follow along</a:t>
+            </a:r>
+          </a:p>
+          <a:p>
+            <a:endParaRPr lang="en-US" sz="2800" dirty="0"/>
+          </a:p>
+          <a:p>
+            <a:endParaRPr lang="en-US" sz="2800" dirty="0"/>
+          </a:p>
+          <a:p>
+            <a:endParaRPr lang="en-US" sz="2800" dirty="0"/>
+          </a:p>
+          <a:p>
+            <a:endParaRPr lang="en-US" sz="2800" dirty="0">
+              <a:hlinkClick r:id="rId4"/>
+            </a:endParaRPr>
+          </a:p>
+          <a:p>
+            <a:endParaRPr lang="en-US" sz="2800" dirty="0">
+              <a:hlinkClick r:id="rId4"/>
+            </a:endParaRPr>
+          </a:p>
+          <a:p>
+            <a:r>
+              <a:rPr lang="en-US" sz="2800" dirty="0">
+                <a:hlinkClick r:id="rId4"/>
+              </a:rPr>
+              <a:t>Link to RStudio IDE Cheatsheet</a:t>
+            </a:r>
+            <a:endParaRPr lang="en-US" sz="2800" dirty="0"/>
+          </a:p>
+        </p:txBody>
+      </p:sp>
+    </p:spTree>
+    <p:extLst>
+      <p:ext uri="{BB962C8B-B14F-4D97-AF65-F5344CB8AC3E}">
+        <p14:creationId xmlns:p14="http://schemas.microsoft.com/office/powerpoint/2010/main" val="2496282167"/>
+      </p:ext>
+    </p:extLst>
+  </p:cSld>
+  <p:clrMapOvr>
+    <a:masterClrMapping/>
+  </p:clrMapOvr>
+</p:sld>
+</file>
+
+<file path=ppt/slides/slide7.xml><?xml version="1.0" encoding="utf-8"?>
+<p:sld xmlns:a="http://schemas.openxmlformats.org/drawingml/2006/main" xmlns:r="http://schemas.openxmlformats.org/officeDocument/2006/relationships" xmlns:p="http://schemas.openxmlformats.org/presentationml/2006/main">
+  <p:cSld>
+    <p:spTree>
+      <p:nvGrpSpPr>
+        <p:cNvPr id="1" name=""/>
+        <p:cNvGrpSpPr/>
+        <p:nvPr/>
+      </p:nvGrpSpPr>
+      <p:grpSpPr>
+        <a:xfrm>
+          <a:off x="0" y="0"/>
+          <a:ext cx="0" cy="0"/>
+          <a:chOff x="0" y="0"/>
+          <a:chExt cx="0" cy="0"/>
+        </a:xfrm>
+      </p:grpSpPr>
+      <p:sp>
+        <p:nvSpPr>
+          <p:cNvPr id="2" name="Title 1">
+            <a:extLst>
+              <a:ext uri="{FF2B5EF4-FFF2-40B4-BE49-F238E27FC236}">
+                <a16:creationId xmlns:a16="http://schemas.microsoft.com/office/drawing/2014/main" id="{C34D917C-0352-4070-5A59-B74559D3A563}"/>
+              </a:ext>
+            </a:extLst>
+          </p:cNvPr>
+          <p:cNvSpPr>
+            <a:spLocks noGrp="1"/>
+          </p:cNvSpPr>
+          <p:nvPr>
+            <p:ph type="title"/>
+          </p:nvPr>
+        </p:nvSpPr>
+        <p:spPr/>
+        <p:txBody>
+          <a:bodyPr/>
+          <a:lstStyle/>
+          <a:p>
+            <a:pPr algn="ctr"/>
+            <a:r>
+              <a:rPr lang="en-US" dirty="0"/>
+              <a:t>How R Integrates with Your System</a:t>
+            </a:r>
+          </a:p>
+        </p:txBody>
+      </p:sp>
+      <p:sp>
+        <p:nvSpPr>
+          <p:cNvPr id="3" name="Content Placeholder 2">
+            <a:extLst>
+              <a:ext uri="{FF2B5EF4-FFF2-40B4-BE49-F238E27FC236}">
+                <a16:creationId xmlns:a16="http://schemas.microsoft.com/office/drawing/2014/main" id="{B390F8D3-C090-74C2-4B06-0193B5299946}"/>
+              </a:ext>
+            </a:extLst>
+          </p:cNvPr>
+          <p:cNvSpPr>
+            <a:spLocks noGrp="1"/>
+          </p:cNvSpPr>
+          <p:nvPr>
+            <p:ph idx="1"/>
+          </p:nvPr>
+        </p:nvSpPr>
+        <p:spPr/>
+        <p:txBody>
+          <a:bodyPr/>
+          <a:lstStyle/>
+          <a:p>
+            <a:r>
+              <a:rPr lang="en-US" b="1" dirty="0"/>
+              <a:t>Working directory</a:t>
+            </a:r>
+            <a:r>
+              <a:rPr lang="en-US" dirty="0"/>
+              <a:t> - The file path on your computer that you are working out of. This is where R will look (unless you tell it otherwise) for data and will save any objects you export from R to this destination.</a:t>
+            </a:r>
+          </a:p>
+          <a:p>
+            <a:endParaRPr lang="en-US" dirty="0"/>
+          </a:p>
+          <a:p>
+            <a:r>
+              <a:rPr lang="en-US" b="1" dirty="0"/>
+              <a:t>RStudio project</a:t>
+            </a:r>
+            <a:r>
+              <a:rPr lang="en-US" dirty="0"/>
+              <a:t> - Enables your work to be bundled in a self-contained folder. When you open a project your directory will automatically be set to the location where the project is saved. Allows you to easily share code.</a:t>
+            </a:r>
+          </a:p>
+        </p:txBody>
+      </p:sp>
+    </p:spTree>
+    <p:extLst>
+      <p:ext uri="{BB962C8B-B14F-4D97-AF65-F5344CB8AC3E}">
+        <p14:creationId xmlns:p14="http://schemas.microsoft.com/office/powerpoint/2010/main" val="994330739"/>
+      </p:ext>
+    </p:extLst>
+  </p:cSld>
+  <p:clrMapOvr>
+    <a:masterClrMapping/>
+  </p:clrMapOvr>
+</p:sld>
+</file>
+
+<file path=ppt/slides/slide8.xml><?xml version="1.0" encoding="utf-8"?>
+<p:sld xmlns:a="http://schemas.openxmlformats.org/drawingml/2006/main" xmlns:r="http://schemas.openxmlformats.org/officeDocument/2006/relationships" xmlns:p="http://schemas.openxmlformats.org/presentationml/2006/main">
+  <p:cSld>
+    <p:spTree>
+      <p:nvGrpSpPr>
+        <p:cNvPr id="1" name=""/>
+        <p:cNvGrpSpPr/>
+        <p:nvPr/>
+      </p:nvGrpSpPr>
+      <p:grpSpPr>
+        <a:xfrm>
+          <a:off x="0" y="0"/>
+          <a:ext cx="0" cy="0"/>
+          <a:chOff x="0" y="0"/>
+          <a:chExt cx="0" cy="0"/>
+        </a:xfrm>
+      </p:grpSpPr>
+      <p:sp>
+        <p:nvSpPr>
+          <p:cNvPr id="2" name="Title 1">
+            <a:extLst>
+              <a:ext uri="{FF2B5EF4-FFF2-40B4-BE49-F238E27FC236}">
+                <a16:creationId xmlns:a16="http://schemas.microsoft.com/office/drawing/2014/main" id="{0C98B4D3-7085-DDB0-2B5F-25F40165C0DC}"/>
+              </a:ext>
+            </a:extLst>
+          </p:cNvPr>
+          <p:cNvSpPr>
+            <a:spLocks noGrp="1"/>
+          </p:cNvSpPr>
+          <p:nvPr>
+            <p:ph type="title"/>
+          </p:nvPr>
+        </p:nvSpPr>
+        <p:spPr/>
+        <p:txBody>
+          <a:bodyPr/>
+          <a:lstStyle/>
+          <a:p>
+            <a:pPr algn="ctr"/>
+            <a:r>
+              <a:rPr lang="en-US" dirty="0"/>
+              <a:t>Folder/File Structure</a:t>
+            </a:r>
+          </a:p>
+        </p:txBody>
+      </p:sp>
+      <p:sp>
+        <p:nvSpPr>
+          <p:cNvPr id="3" name="Content Placeholder 2">
+            <a:extLst>
+              <a:ext uri="{FF2B5EF4-FFF2-40B4-BE49-F238E27FC236}">
+                <a16:creationId xmlns:a16="http://schemas.microsoft.com/office/drawing/2014/main" id="{48217470-1D47-46BA-580F-97D8C5B70191}"/>
+              </a:ext>
+            </a:extLst>
+          </p:cNvPr>
+          <p:cNvSpPr>
+            <a:spLocks noGrp="1"/>
+          </p:cNvSpPr>
+          <p:nvPr>
+            <p:ph idx="1"/>
+          </p:nvPr>
+        </p:nvSpPr>
+        <p:spPr/>
+        <p:txBody>
+          <a:bodyPr/>
+          <a:lstStyle/>
+          <a:p>
+            <a:pPr marL="0" indent="0">
+              <a:buNone/>
+            </a:pPr>
+            <a:r>
+              <a:rPr lang="en-US" dirty="0"/>
+              <a:t>When creating a folder structure for a project you want to aim for these things to increase reproducibility</a:t>
+            </a:r>
+          </a:p>
+          <a:p>
+            <a:pPr marL="0" indent="0">
+              <a:buNone/>
+            </a:pPr>
+            <a:endParaRPr lang="en-US" dirty="0"/>
+          </a:p>
+          <a:p>
+            <a:pPr marL="971550" lvl="1" indent="-514350">
+              <a:buFont typeface="+mj-lt"/>
+              <a:buAutoNum type="arabicPeriod"/>
+            </a:pPr>
+            <a:r>
+              <a:rPr lang="en-US" dirty="0"/>
+              <a:t>Well defined README</a:t>
+            </a:r>
+          </a:p>
+          <a:p>
+            <a:pPr marL="971550" lvl="1" indent="-514350">
+              <a:buFont typeface="+mj-lt"/>
+              <a:buAutoNum type="arabicPeriod"/>
+            </a:pPr>
+            <a:r>
+              <a:rPr lang="en-US" dirty="0"/>
+              <a:t>Easily understood by someone from any field</a:t>
+            </a:r>
+          </a:p>
+          <a:p>
+            <a:pPr marL="971550" lvl="1" indent="-514350">
+              <a:buFont typeface="+mj-lt"/>
+              <a:buAutoNum type="arabicPeriod"/>
+            </a:pPr>
+            <a:r>
+              <a:rPr lang="en-US" dirty="0"/>
+              <a:t>Short names, all lowercase, use _ for spaces</a:t>
+            </a:r>
+          </a:p>
+          <a:p>
+            <a:pPr marL="971550" lvl="1" indent="-514350">
+              <a:buFont typeface="+mj-lt"/>
+              <a:buAutoNum type="arabicPeriod"/>
+            </a:pPr>
+            <a:r>
+              <a:rPr lang="en-US" dirty="0"/>
+              <a:t>Only include nested folders when absolutely necessary</a:t>
+            </a:r>
+          </a:p>
+          <a:p>
+            <a:pPr marL="971550" lvl="1" indent="-514350">
+              <a:buFont typeface="+mj-lt"/>
+              <a:buAutoNum type="arabicPeriod"/>
+            </a:pPr>
+            <a:endParaRPr lang="en-US" dirty="0"/>
+          </a:p>
+        </p:txBody>
+      </p:sp>
+    </p:spTree>
+    <p:extLst>
+      <p:ext uri="{BB962C8B-B14F-4D97-AF65-F5344CB8AC3E}">
+        <p14:creationId xmlns:p14="http://schemas.microsoft.com/office/powerpoint/2010/main" val="1736784994"/>
+      </p:ext>
+    </p:extLst>
+  </p:cSld>
+  <p:clrMapOvr>
+    <a:masterClrMapping/>
+  </p:clrMapOvr>
+</p:sld>
+</file>
+
+<file path=ppt/slides/slide9.xml><?xml version="1.0" encoding="utf-8"?>
+<p:sld xmlns:a="http://schemas.openxmlformats.org/drawingml/2006/main" xmlns:r="http://schemas.openxmlformats.org/officeDocument/2006/relationships" xmlns:p="http://schemas.openxmlformats.org/presentationml/2006/main">
+  <p:cSld>
+    <p:spTree>
+      <p:nvGrpSpPr>
+        <p:cNvPr id="1" name=""/>
+        <p:cNvGrpSpPr/>
+        <p:nvPr/>
+      </p:nvGrpSpPr>
+      <p:grpSpPr>
+        <a:xfrm>
+          <a:off x="0" y="0"/>
+          <a:ext cx="0" cy="0"/>
+          <a:chOff x="0" y="0"/>
+          <a:chExt cx="0" cy="0"/>
+        </a:xfrm>
+      </p:grpSpPr>
+      <p:graphicFrame>
+        <p:nvGraphicFramePr>
+          <p:cNvPr id="4" name="Diagram 3">
+            <a:extLst>
+              <a:ext uri="{FF2B5EF4-FFF2-40B4-BE49-F238E27FC236}">
+                <a16:creationId xmlns:a16="http://schemas.microsoft.com/office/drawing/2014/main" id="{A2CEE108-F9FC-EB8D-E4AA-767615973A49}"/>
+              </a:ext>
+            </a:extLst>
+          </p:cNvPr>
+          <p:cNvGraphicFramePr/>
+          <p:nvPr>
+            <p:extLst>
+              <p:ext uri="{D42A27DB-BD31-4B8C-83A1-F6EECF244321}">
+                <p14:modId xmlns:p14="http://schemas.microsoft.com/office/powerpoint/2010/main" val="536154786"/>
+              </p:ext>
+            </p:extLst>
+          </p:nvPr>
+        </p:nvGraphicFramePr>
+        <p:xfrm>
+          <a:off x="0" y="995680"/>
+          <a:ext cx="12192000" cy="6858000"/>
+        </p:xfrm>
+        <a:graphic>
+          <a:graphicData uri="http://schemas.openxmlformats.org/drawingml/2006/diagram">
+            <dgm:relIds xmlns:dgm="http://schemas.openxmlformats.org/drawingml/2006/diagram" xmlns:r="http://schemas.openxmlformats.org/officeDocument/2006/relationships" r:dm="rId3" r:lo="rId4" r:qs="rId5" r:cs="rId6"/>
+          </a:graphicData>
+        </a:graphic>
+      </p:graphicFrame>
+      <p:pic>
+        <p:nvPicPr>
+          <p:cNvPr id="6" name="Graphic 5" descr="Star with solid fill">
+            <a:extLst>
+              <a:ext uri="{FF2B5EF4-FFF2-40B4-BE49-F238E27FC236}">
+                <a16:creationId xmlns:a16="http://schemas.microsoft.com/office/drawing/2014/main" id="{9E621567-6D02-2C18-8D1F-0F8C098138C9}"/>
+              </a:ext>
+            </a:extLst>
+          </p:cNvPr>
+          <p:cNvPicPr>
+            <a:picLocks noChangeAspect="1"/>
+          </p:cNvPicPr>
+          <p:nvPr/>
+        </p:nvPicPr>
+        <p:blipFill>
+          <a:blip r:embed="rId8">
+            <a:extLst>
+              <a:ext uri="{96DAC541-7B7A-43D3-8B79-37D633B846F1}">
+                <asvg:svgBlip xmlns:asvg="http://schemas.microsoft.com/office/drawing/2016/SVG/main" r:embed="rId9"/>
+              </a:ext>
+            </a:extLst>
+          </a:blip>
+          <a:stretch>
+            <a:fillRect/>
+          </a:stretch>
+        </p:blipFill>
+        <p:spPr>
+          <a:xfrm rot="487079">
+            <a:off x="11413780" y="3329135"/>
+            <a:ext cx="914400" cy="914400"/>
+          </a:xfrm>
+          <a:prstGeom prst="rect">
+            <a:avLst/>
+          </a:prstGeom>
+        </p:spPr>
+      </p:pic>
+      <p:sp>
+        <p:nvSpPr>
+          <p:cNvPr id="2" name="Title 1">
+            <a:extLst>
+              <a:ext uri="{FF2B5EF4-FFF2-40B4-BE49-F238E27FC236}">
+                <a16:creationId xmlns:a16="http://schemas.microsoft.com/office/drawing/2014/main" id="{7C88257F-397B-A219-A527-1A746326E421}"/>
+              </a:ext>
+            </a:extLst>
+          </p:cNvPr>
+          <p:cNvSpPr txBox="1">
+            <a:spLocks/>
+          </p:cNvSpPr>
+          <p:nvPr/>
+        </p:nvSpPr>
+        <p:spPr>
+          <a:xfrm>
+            <a:off x="838200" y="0"/>
+            <a:ext cx="10515600" cy="1325563"/>
+          </a:xfrm>
+          <a:prstGeom prst="rect">
+            <a:avLst/>
+          </a:prstGeom>
+        </p:spPr>
+        <p:txBody>
+          <a:bodyPr vert="horz" lIns="91440" tIns="45720" rIns="91440" bIns="45720" rtlCol="0" anchor="b">
+            <a:normAutofit/>
+          </a:bodyPr>
+          <a:lstStyle>
+            <a:lvl1pPr algn="ctr" defTabSz="914400" rtl="0" eaLnBrk="1" latinLnBrk="0" hangingPunct="1">
+              <a:lnSpc>
+                <a:spcPct val="90000"/>
+              </a:lnSpc>
+              <a:spcBef>
+                <a:spcPct val="0"/>
+              </a:spcBef>
+              <a:buNone/>
+              <a:defRPr sz="6000" kern="1200">
+                <a:solidFill>
+                  <a:schemeClr val="tx1"/>
+                </a:solidFill>
+                <a:latin typeface="+mj-lt"/>
+                <a:ea typeface="+mj-ea"/>
+                <a:cs typeface="+mj-cs"/>
+              </a:defRPr>
+            </a:lvl1pPr>
+          </a:lstStyle>
+          <a:p>
+            <a:r>
+              <a:rPr lang="en-US"/>
+              <a:t>Example Starting Folder Structure</a:t>
+            </a:r>
+            <a:endParaRPr lang="en-US" dirty="0"/>
+          </a:p>
+        </p:txBody>
+      </p:sp>
+    </p:spTree>
+    <p:extLst>
+      <p:ext uri="{BB962C8B-B14F-4D97-AF65-F5344CB8AC3E}">
+        <p14:creationId xmlns:p14="http://schemas.microsoft.com/office/powerpoint/2010/main" val="3412106931"/>
       </p:ext>
     </p:extLst>
   </p:cSld>

</xml_diff>

<commit_message>
Ms updates to pres, agenda, and code
</commit_message>
<xml_diff>
--- a/docs/Reproducible research in R.pptx
+++ b/docs/Reproducible research in R.pptx
@@ -5,7 +5,7 @@
     <p:sldMasterId id="2147483648" r:id="rId1"/>
   </p:sldMasterIdLst>
   <p:notesMasterIdLst>
-    <p:notesMasterId r:id="rId24"/>
+    <p:notesMasterId r:id="rId25"/>
   </p:notesMasterIdLst>
   <p:sldIdLst>
     <p:sldId id="256" r:id="rId2"/>
@@ -25,11 +25,12 @@
     <p:sldId id="272" r:id="rId16"/>
     <p:sldId id="273" r:id="rId17"/>
     <p:sldId id="279" r:id="rId18"/>
-    <p:sldId id="259" r:id="rId19"/>
-    <p:sldId id="276" r:id="rId20"/>
-    <p:sldId id="277" r:id="rId21"/>
-    <p:sldId id="278" r:id="rId22"/>
-    <p:sldId id="274" r:id="rId23"/>
+    <p:sldId id="280" r:id="rId19"/>
+    <p:sldId id="259" r:id="rId20"/>
+    <p:sldId id="276" r:id="rId21"/>
+    <p:sldId id="277" r:id="rId22"/>
+    <p:sldId id="278" r:id="rId23"/>
+    <p:sldId id="274" r:id="rId24"/>
   </p:sldIdLst>
   <p:sldSz cx="12192000" cy="6858000"/>
   <p:notesSz cx="6858000" cy="9144000"/>
@@ -5728,7 +5729,7 @@
           <a:p>
             <a:fld id="{6435B03D-516F-5A44-9365-C1C2D3DF7245}" type="datetimeFigureOut">
               <a:rPr lang="en-US" smtClean="0"/>
-              <a:t>6/10/25</a:t>
+              <a:t>6/22/25</a:t>
             </a:fld>
             <a:endParaRPr lang="en-US"/>
           </a:p>
@@ -7576,6 +7577,90 @@
 </p:notes>
 </file>
 
+<file path=ppt/notesSlides/notesSlide9.xml><?xml version="1.0" encoding="utf-8"?>
+<p:notes xmlns:a="http://schemas.openxmlformats.org/drawingml/2006/main" xmlns:r="http://schemas.openxmlformats.org/officeDocument/2006/relationships" xmlns:p="http://schemas.openxmlformats.org/presentationml/2006/main">
+  <p:cSld>
+    <p:spTree>
+      <p:nvGrpSpPr>
+        <p:cNvPr id="1" name=""/>
+        <p:cNvGrpSpPr/>
+        <p:nvPr/>
+      </p:nvGrpSpPr>
+      <p:grpSpPr>
+        <a:xfrm>
+          <a:off x="0" y="0"/>
+          <a:ext cx="0" cy="0"/>
+          <a:chOff x="0" y="0"/>
+          <a:chExt cx="0" cy="0"/>
+        </a:xfrm>
+      </p:grpSpPr>
+      <p:sp>
+        <p:nvSpPr>
+          <p:cNvPr id="2" name="Slide Image Placeholder 1"/>
+          <p:cNvSpPr>
+            <a:spLocks noGrp="1" noRot="1" noChangeAspect="1"/>
+          </p:cNvSpPr>
+          <p:nvPr>
+            <p:ph type="sldImg"/>
+          </p:nvPr>
+        </p:nvSpPr>
+        <p:spPr/>
+      </p:sp>
+      <p:sp>
+        <p:nvSpPr>
+          <p:cNvPr id="3" name="Notes Placeholder 2"/>
+          <p:cNvSpPr>
+            <a:spLocks noGrp="1"/>
+          </p:cNvSpPr>
+          <p:nvPr>
+            <p:ph type="body" idx="1"/>
+          </p:nvPr>
+        </p:nvSpPr>
+        <p:spPr/>
+        <p:txBody>
+          <a:bodyPr/>
+          <a:lstStyle/>
+          <a:p>
+            <a:endParaRPr lang="en-US" dirty="0"/>
+          </a:p>
+        </p:txBody>
+      </p:sp>
+      <p:sp>
+        <p:nvSpPr>
+          <p:cNvPr id="4" name="Slide Number Placeholder 3"/>
+          <p:cNvSpPr>
+            <a:spLocks noGrp="1"/>
+          </p:cNvSpPr>
+          <p:nvPr>
+            <p:ph type="sldNum" sz="quarter" idx="5"/>
+          </p:nvPr>
+        </p:nvSpPr>
+        <p:spPr/>
+        <p:txBody>
+          <a:bodyPr/>
+          <a:lstStyle/>
+          <a:p>
+            <a:fld id="{37496C56-F9E7-8A4C-85EB-B40E19913C19}" type="slidenum">
+              <a:rPr lang="en-US" smtClean="0"/>
+              <a:t>18</a:t>
+            </a:fld>
+            <a:endParaRPr lang="en-US"/>
+          </a:p>
+        </p:txBody>
+      </p:sp>
+    </p:spTree>
+    <p:extLst>
+      <p:ext uri="{BB962C8B-B14F-4D97-AF65-F5344CB8AC3E}">
+        <p14:creationId xmlns:p14="http://schemas.microsoft.com/office/powerpoint/2010/main" val="3733849931"/>
+      </p:ext>
+    </p:extLst>
+  </p:cSld>
+  <p:clrMapOvr>
+    <a:masterClrMapping/>
+  </p:clrMapOvr>
+</p:notes>
+</file>
+
 <file path=ppt/slideLayouts/slideLayout1.xml><?xml version="1.0" encoding="utf-8"?>
 <p:sldLayout xmlns:a="http://schemas.openxmlformats.org/drawingml/2006/main" xmlns:r="http://schemas.openxmlformats.org/officeDocument/2006/relationships" xmlns:p="http://schemas.openxmlformats.org/presentationml/2006/main" type="title" preserve="1">
   <p:cSld name="Title Slide">
@@ -7723,7 +7808,7 @@
           <a:p>
             <a:fld id="{3DFC7523-4903-EA42-A253-0F84EF8D8793}" type="datetimeFigureOut">
               <a:rPr lang="en-US" smtClean="0"/>
-              <a:t>6/10/25</a:t>
+              <a:t>6/22/25</a:t>
             </a:fld>
             <a:endParaRPr lang="en-US"/>
           </a:p>
@@ -7921,7 +8006,7 @@
           <a:p>
             <a:fld id="{3DFC7523-4903-EA42-A253-0F84EF8D8793}" type="datetimeFigureOut">
               <a:rPr lang="en-US" smtClean="0"/>
-              <a:t>6/10/25</a:t>
+              <a:t>6/22/25</a:t>
             </a:fld>
             <a:endParaRPr lang="en-US"/>
           </a:p>
@@ -8129,7 +8214,7 @@
           <a:p>
             <a:fld id="{3DFC7523-4903-EA42-A253-0F84EF8D8793}" type="datetimeFigureOut">
               <a:rPr lang="en-US" smtClean="0"/>
-              <a:t>6/10/25</a:t>
+              <a:t>6/22/25</a:t>
             </a:fld>
             <a:endParaRPr lang="en-US"/>
           </a:p>
@@ -8327,7 +8412,7 @@
           <a:p>
             <a:fld id="{3DFC7523-4903-EA42-A253-0F84EF8D8793}" type="datetimeFigureOut">
               <a:rPr lang="en-US" smtClean="0"/>
-              <a:t>6/10/25</a:t>
+              <a:t>6/22/25</a:t>
             </a:fld>
             <a:endParaRPr lang="en-US"/>
           </a:p>
@@ -8602,7 +8687,7 @@
           <a:p>
             <a:fld id="{3DFC7523-4903-EA42-A253-0F84EF8D8793}" type="datetimeFigureOut">
               <a:rPr lang="en-US" smtClean="0"/>
-              <a:t>6/10/25</a:t>
+              <a:t>6/22/25</a:t>
             </a:fld>
             <a:endParaRPr lang="en-US"/>
           </a:p>
@@ -8867,7 +8952,7 @@
           <a:p>
             <a:fld id="{3DFC7523-4903-EA42-A253-0F84EF8D8793}" type="datetimeFigureOut">
               <a:rPr lang="en-US" smtClean="0"/>
-              <a:t>6/10/25</a:t>
+              <a:t>6/22/25</a:t>
             </a:fld>
             <a:endParaRPr lang="en-US"/>
           </a:p>
@@ -9279,7 +9364,7 @@
           <a:p>
             <a:fld id="{3DFC7523-4903-EA42-A253-0F84EF8D8793}" type="datetimeFigureOut">
               <a:rPr lang="en-US" smtClean="0"/>
-              <a:t>6/10/25</a:t>
+              <a:t>6/22/25</a:t>
             </a:fld>
             <a:endParaRPr lang="en-US"/>
           </a:p>
@@ -9420,7 +9505,7 @@
           <a:p>
             <a:fld id="{3DFC7523-4903-EA42-A253-0F84EF8D8793}" type="datetimeFigureOut">
               <a:rPr lang="en-US" smtClean="0"/>
-              <a:t>6/10/25</a:t>
+              <a:t>6/22/25</a:t>
             </a:fld>
             <a:endParaRPr lang="en-US"/>
           </a:p>
@@ -9533,7 +9618,7 @@
           <a:p>
             <a:fld id="{3DFC7523-4903-EA42-A253-0F84EF8D8793}" type="datetimeFigureOut">
               <a:rPr lang="en-US" smtClean="0"/>
-              <a:t>6/10/25</a:t>
+              <a:t>6/22/25</a:t>
             </a:fld>
             <a:endParaRPr lang="en-US"/>
           </a:p>
@@ -9844,7 +9929,7 @@
           <a:p>
             <a:fld id="{3DFC7523-4903-EA42-A253-0F84EF8D8793}" type="datetimeFigureOut">
               <a:rPr lang="en-US" smtClean="0"/>
-              <a:t>6/10/25</a:t>
+              <a:t>6/22/25</a:t>
             </a:fld>
             <a:endParaRPr lang="en-US"/>
           </a:p>
@@ -10132,7 +10217,7 @@
           <a:p>
             <a:fld id="{3DFC7523-4903-EA42-A253-0F84EF8D8793}" type="datetimeFigureOut">
               <a:rPr lang="en-US" smtClean="0"/>
-              <a:t>6/10/25</a:t>
+              <a:t>6/22/25</a:t>
             </a:fld>
             <a:endParaRPr lang="en-US"/>
           </a:p>
@@ -10373,7 +10458,7 @@
           <a:p>
             <a:fld id="{3DFC7523-4903-EA42-A253-0F84EF8D8793}" type="datetimeFigureOut">
               <a:rPr lang="en-US" smtClean="0"/>
-              <a:t>6/10/25</a:t>
+              <a:t>6/22/25</a:t>
             </a:fld>
             <a:endParaRPr lang="en-US"/>
           </a:p>
@@ -11271,6 +11356,110 @@
           </a:xfrm>
         </p:spPr>
       </p:pic>
+      <p:sp>
+        <p:nvSpPr>
+          <p:cNvPr id="2" name="Rectangle 1">
+            <a:extLst>
+              <a:ext uri="{FF2B5EF4-FFF2-40B4-BE49-F238E27FC236}">
+                <a16:creationId xmlns:a16="http://schemas.microsoft.com/office/drawing/2014/main" id="{EEEC0D5E-4F7B-F45B-F762-17D947100293}"/>
+              </a:ext>
+            </a:extLst>
+          </p:cNvPr>
+          <p:cNvSpPr/>
+          <p:nvPr/>
+        </p:nvSpPr>
+        <p:spPr>
+          <a:xfrm>
+            <a:off x="3339548" y="3349487"/>
+            <a:ext cx="178904" cy="188843"/>
+          </a:xfrm>
+          <a:prstGeom prst="rect">
+            <a:avLst/>
+          </a:prstGeom>
+          <a:solidFill>
+            <a:srgbClr val="F6F5F5"/>
+          </a:solidFill>
+          <a:ln>
+            <a:noFill/>
+          </a:ln>
+        </p:spPr>
+        <p:style>
+          <a:lnRef idx="2">
+            <a:schemeClr val="accent1">
+              <a:shade val="15000"/>
+            </a:schemeClr>
+          </a:lnRef>
+          <a:fillRef idx="1">
+            <a:schemeClr val="accent1"/>
+          </a:fillRef>
+          <a:effectRef idx="0">
+            <a:schemeClr val="accent1"/>
+          </a:effectRef>
+          <a:fontRef idx="minor">
+            <a:schemeClr val="lt1"/>
+          </a:fontRef>
+        </p:style>
+        <p:txBody>
+          <a:bodyPr rtlCol="0" anchor="ctr"/>
+          <a:lstStyle/>
+          <a:p>
+            <a:pPr algn="ctr"/>
+            <a:endParaRPr lang="en-US"/>
+          </a:p>
+        </p:txBody>
+      </p:sp>
+      <p:sp>
+        <p:nvSpPr>
+          <p:cNvPr id="3" name="Rectangle 2">
+            <a:extLst>
+              <a:ext uri="{FF2B5EF4-FFF2-40B4-BE49-F238E27FC236}">
+                <a16:creationId xmlns:a16="http://schemas.microsoft.com/office/drawing/2014/main" id="{4D8DF5A4-E733-7E3E-1B1C-807915F658F3}"/>
+              </a:ext>
+            </a:extLst>
+          </p:cNvPr>
+          <p:cNvSpPr/>
+          <p:nvPr/>
+        </p:nvSpPr>
+        <p:spPr>
+          <a:xfrm>
+            <a:off x="3339548" y="6364356"/>
+            <a:ext cx="178904" cy="188843"/>
+          </a:xfrm>
+          <a:prstGeom prst="rect">
+            <a:avLst/>
+          </a:prstGeom>
+          <a:solidFill>
+            <a:srgbClr val="F6F5F5"/>
+          </a:solidFill>
+          <a:ln>
+            <a:noFill/>
+          </a:ln>
+        </p:spPr>
+        <p:style>
+          <a:lnRef idx="2">
+            <a:schemeClr val="accent1">
+              <a:shade val="15000"/>
+            </a:schemeClr>
+          </a:lnRef>
+          <a:fillRef idx="1">
+            <a:schemeClr val="accent1"/>
+          </a:fillRef>
+          <a:effectRef idx="0">
+            <a:schemeClr val="accent1"/>
+          </a:effectRef>
+          <a:fontRef idx="minor">
+            <a:schemeClr val="lt1"/>
+          </a:fontRef>
+        </p:style>
+        <p:txBody>
+          <a:bodyPr rtlCol="0" anchor="ctr"/>
+          <a:lstStyle/>
+          <a:p>
+            <a:pPr algn="ctr"/>
+            <a:endParaRPr lang="en-US"/>
+          </a:p>
+        </p:txBody>
+      </p:sp>
     </p:spTree>
     <p:extLst>
       <p:ext uri="{BB962C8B-B14F-4D97-AF65-F5344CB8AC3E}">
@@ -11576,6 +11765,12 @@
             <a:r>
               <a:rPr lang="en-US" dirty="0"/>
               <a:t>Encourages more detailed comments/explanation of code</a:t>
+            </a:r>
+          </a:p>
+          <a:p>
+            <a:r>
+              <a:rPr lang="en-US" dirty="0"/>
+              <a:t>Differentiates between comments as a scientist and comments as a coder</a:t>
             </a:r>
           </a:p>
           <a:p>
@@ -11876,8 +12071,8 @@
         </p:nvSpPr>
         <p:spPr>
           <a:xfrm>
-            <a:off x="838200" y="1321904"/>
-            <a:ext cx="10515600" cy="5416826"/>
+            <a:off x="838200" y="1690688"/>
+            <a:ext cx="10515600" cy="5048042"/>
           </a:xfrm>
         </p:spPr>
         <p:txBody>
@@ -11904,7 +12099,7 @@
           <a:p>
             <a:r>
               <a:rPr lang="en-US" dirty="0"/>
-              <a:t>Add the following elements to your R Markdown with headers for each section and following coding best practices</a:t>
+              <a:t>Add the following elements to your R Markdown with headers for each section, comments, and following coding best practices</a:t>
             </a:r>
           </a:p>
           <a:p>
@@ -11925,7 +12120,7 @@
             <a:pPr lvl="1"/>
             <a:r>
               <a:rPr lang="en-US" dirty="0"/>
-              <a:t>Code chunk that won’t be run when knit that installs packages (</a:t>
+              <a:t>A code chunk that won’t be run when knit that installs packages (</a:t>
             </a:r>
             <a:r>
               <a:rPr lang="en-US" dirty="0" err="1"/>
@@ -11941,13 +12136,6 @@
             <a:r>
               <a:rPr lang="en-US" dirty="0"/>
               <a:t>Code chunk that won’t display messages when knit that loads the installed libraries</a:t>
-            </a:r>
-          </a:p>
-          <a:p>
-            <a:pPr lvl="1"/>
-            <a:r>
-              <a:rPr lang="en-US" dirty="0"/>
-              <a:t>Read in _____ data in tidy format</a:t>
             </a:r>
           </a:p>
           <a:p>
@@ -11991,6 +12179,131 @@
           <p:cNvPr id="2" name="Title 1">
             <a:extLst>
               <a:ext uri="{FF2B5EF4-FFF2-40B4-BE49-F238E27FC236}">
+                <a16:creationId xmlns:a16="http://schemas.microsoft.com/office/drawing/2014/main" id="{C5BAC05A-6527-CA81-91E5-1D04237C7816}"/>
+              </a:ext>
+            </a:extLst>
+          </p:cNvPr>
+          <p:cNvSpPr>
+            <a:spLocks noGrp="1"/>
+          </p:cNvSpPr>
+          <p:nvPr>
+            <p:ph type="title"/>
+          </p:nvPr>
+        </p:nvSpPr>
+        <p:spPr/>
+        <p:txBody>
+          <a:bodyPr/>
+          <a:lstStyle/>
+          <a:p>
+            <a:pPr algn="ctr"/>
+            <a:r>
+              <a:rPr lang="en-US" dirty="0"/>
+              <a:t>Practice with R Markdown continued…</a:t>
+            </a:r>
+          </a:p>
+        </p:txBody>
+      </p:sp>
+      <p:sp>
+        <p:nvSpPr>
+          <p:cNvPr id="3" name="Content Placeholder 2">
+            <a:extLst>
+              <a:ext uri="{FF2B5EF4-FFF2-40B4-BE49-F238E27FC236}">
+                <a16:creationId xmlns:a16="http://schemas.microsoft.com/office/drawing/2014/main" id="{BE2F525D-138B-AE13-2C29-EB77E52C19F0}"/>
+              </a:ext>
+            </a:extLst>
+          </p:cNvPr>
+          <p:cNvSpPr>
+            <a:spLocks noGrp="1"/>
+          </p:cNvSpPr>
+          <p:nvPr>
+            <p:ph idx="1"/>
+          </p:nvPr>
+        </p:nvSpPr>
+        <p:spPr/>
+        <p:txBody>
+          <a:bodyPr>
+            <a:normAutofit/>
+          </a:bodyPr>
+          <a:lstStyle/>
+          <a:p>
+            <a:r>
+              <a:rPr lang="en-US" sz="2400" dirty="0"/>
+              <a:t>Read in _____ data in tidy format</a:t>
+            </a:r>
+          </a:p>
+          <a:p>
+            <a:r>
+              <a:rPr lang="en-US" sz="2400" dirty="0"/>
+              <a:t>Explore the data a bit using functions you are familiar with, </a:t>
+            </a:r>
+            <a:r>
+              <a:rPr lang="en-US" sz="2400" i="1" dirty="0"/>
+              <a:t>or if you are new to R use online resources or a neighbor to look up some functions that provide information about a data frame.</a:t>
+            </a:r>
+          </a:p>
+          <a:p>
+            <a:r>
+              <a:rPr lang="en-US" sz="2400" dirty="0"/>
+              <a:t>Generate a plot with the data</a:t>
+            </a:r>
+          </a:p>
+          <a:p>
+            <a:r>
+              <a:rPr lang="en-US" sz="2400" dirty="0"/>
+              <a:t>Do some data manipulation and save the new data to your environment AND to the data folder</a:t>
+            </a:r>
+          </a:p>
+          <a:p>
+            <a:r>
+              <a:rPr lang="en-US" sz="2400" dirty="0"/>
+              <a:t>Knit your .</a:t>
+            </a:r>
+            <a:r>
+              <a:rPr lang="en-US" sz="2400" dirty="0" err="1"/>
+              <a:t>rmd</a:t>
+            </a:r>
+            <a:r>
+              <a:rPr lang="en-US" sz="2400" dirty="0"/>
+              <a:t> file as a .html and .pdf</a:t>
+            </a:r>
+          </a:p>
+        </p:txBody>
+      </p:sp>
+    </p:spTree>
+    <p:extLst>
+      <p:ext uri="{BB962C8B-B14F-4D97-AF65-F5344CB8AC3E}">
+        <p14:creationId xmlns:p14="http://schemas.microsoft.com/office/powerpoint/2010/main" val="2328182124"/>
+      </p:ext>
+    </p:extLst>
+  </p:cSld>
+  <p:clrMapOvr>
+    <a:masterClrMapping/>
+  </p:clrMapOvr>
+</p:sld>
+</file>
+
+<file path=ppt/slides/slide19.xml><?xml version="1.0" encoding="utf-8"?>
+<p:sld xmlns:a="http://schemas.openxmlformats.org/drawingml/2006/main" xmlns:r="http://schemas.openxmlformats.org/officeDocument/2006/relationships" xmlns:p="http://schemas.openxmlformats.org/presentationml/2006/main">
+  <p:cSld>
+    <p:spTree>
+      <p:nvGrpSpPr>
+        <p:cNvPr id="1" name=""/>
+        <p:cNvGrpSpPr/>
+        <p:nvPr/>
+      </p:nvGrpSpPr>
+      <p:grpSpPr>
+        <a:xfrm>
+          <a:off x="0" y="0"/>
+          <a:ext cx="0" cy="0"/>
+          <a:chOff x="0" y="0"/>
+          <a:chExt cx="0" cy="0"/>
+        </a:xfrm>
+      </p:grpSpPr>
+      <p:sp>
+        <p:nvSpPr>
+          <p:cNvPr id="2" name="Title 1">
+            <a:extLst>
+              <a:ext uri="{FF2B5EF4-FFF2-40B4-BE49-F238E27FC236}">
                 <a16:creationId xmlns:a16="http://schemas.microsoft.com/office/drawing/2014/main" id="{A70CA71A-FB99-10F1-BB03-3ABDD9901DE1}"/>
               </a:ext>
             </a:extLst>
@@ -12072,7 +12385,247 @@
 </p:sld>
 </file>
 
-<file path=ppt/slides/slide19.xml><?xml version="1.0" encoding="utf-8"?>
+<file path=ppt/slides/slide2.xml><?xml version="1.0" encoding="utf-8"?>
+<p:sld xmlns:a="http://schemas.openxmlformats.org/drawingml/2006/main" xmlns:r="http://schemas.openxmlformats.org/officeDocument/2006/relationships" xmlns:p="http://schemas.openxmlformats.org/presentationml/2006/main">
+  <p:cSld>
+    <p:spTree>
+      <p:nvGrpSpPr>
+        <p:cNvPr id="1" name=""/>
+        <p:cNvGrpSpPr/>
+        <p:nvPr/>
+      </p:nvGrpSpPr>
+      <p:grpSpPr>
+        <a:xfrm>
+          <a:off x="0" y="0"/>
+          <a:ext cx="0" cy="0"/>
+          <a:chOff x="0" y="0"/>
+          <a:chExt cx="0" cy="0"/>
+        </a:xfrm>
+      </p:grpSpPr>
+      <p:sp>
+        <p:nvSpPr>
+          <p:cNvPr id="2" name="Title 1">
+            <a:extLst>
+              <a:ext uri="{FF2B5EF4-FFF2-40B4-BE49-F238E27FC236}">
+                <a16:creationId xmlns:a16="http://schemas.microsoft.com/office/drawing/2014/main" id="{C502AA43-05D2-9F91-20E3-7EF6EAD8D125}"/>
+              </a:ext>
+            </a:extLst>
+          </p:cNvPr>
+          <p:cNvSpPr>
+            <a:spLocks noGrp="1"/>
+          </p:cNvSpPr>
+          <p:nvPr>
+            <p:ph type="title"/>
+          </p:nvPr>
+        </p:nvSpPr>
+        <p:spPr>
+          <a:xfrm>
+            <a:off x="838200" y="134865"/>
+            <a:ext cx="10515600" cy="704268"/>
+          </a:xfrm>
+        </p:spPr>
+        <p:txBody>
+          <a:bodyPr/>
+          <a:lstStyle/>
+          <a:p>
+            <a:pPr algn="ctr"/>
+            <a:r>
+              <a:rPr lang="en-US" dirty="0"/>
+              <a:t>Instructors</a:t>
+            </a:r>
+          </a:p>
+        </p:txBody>
+      </p:sp>
+      <p:sp>
+        <p:nvSpPr>
+          <p:cNvPr id="3" name="Content Placeholder 2">
+            <a:extLst>
+              <a:ext uri="{FF2B5EF4-FFF2-40B4-BE49-F238E27FC236}">
+                <a16:creationId xmlns:a16="http://schemas.microsoft.com/office/drawing/2014/main" id="{FA668741-CD59-72EE-0171-3F1515385326}"/>
+              </a:ext>
+            </a:extLst>
+          </p:cNvPr>
+          <p:cNvSpPr>
+            <a:spLocks noGrp="1"/>
+          </p:cNvSpPr>
+          <p:nvPr>
+            <p:ph idx="1"/>
+          </p:nvPr>
+        </p:nvSpPr>
+        <p:spPr>
+          <a:xfrm>
+            <a:off x="339632" y="1282912"/>
+            <a:ext cx="9483990" cy="4351338"/>
+          </a:xfrm>
+        </p:spPr>
+        <p:txBody>
+          <a:bodyPr/>
+          <a:lstStyle/>
+          <a:p>
+            <a:r>
+              <a:rPr lang="en-US" dirty="0"/>
+              <a:t>Dr. Marissa Dyck (she/her) – </a:t>
+            </a:r>
+            <a:r>
+              <a:rPr lang="en-US" dirty="0">
+                <a:hlinkClick r:id="rId2"/>
+              </a:rPr>
+              <a:t>marissadyck17@gmail.com</a:t>
+            </a:r>
+            <a:endParaRPr lang="en-US" dirty="0"/>
+          </a:p>
+          <a:p>
+            <a:pPr marL="457200" lvl="1" indent="0">
+              <a:buNone/>
+            </a:pPr>
+            <a:r>
+              <a:rPr lang="en-US" dirty="0"/>
+              <a:t>Postdoctoral Research Fellow</a:t>
+            </a:r>
+          </a:p>
+          <a:p>
+            <a:pPr marL="457200" lvl="1" indent="0">
+              <a:buNone/>
+            </a:pPr>
+            <a:r>
+              <a:rPr lang="en-US" dirty="0"/>
+              <a:t>University of Victoria</a:t>
+            </a:r>
+          </a:p>
+          <a:p>
+            <a:pPr marL="457200" lvl="1" indent="0">
+              <a:buNone/>
+            </a:pPr>
+            <a:r>
+              <a:rPr lang="en-US" dirty="0"/>
+              <a:t>Victoria, BC, Canada</a:t>
+            </a:r>
+          </a:p>
+          <a:p>
+            <a:pPr marL="457200" lvl="1" indent="0">
+              <a:buNone/>
+            </a:pPr>
+            <a:endParaRPr lang="en-US" dirty="0"/>
+          </a:p>
+          <a:p>
+            <a:r>
+              <a:rPr lang="en-US" dirty="0"/>
+              <a:t>Dr. Erika Barthelmess (she/her) – </a:t>
+            </a:r>
+            <a:r>
+              <a:rPr lang="en-US" dirty="0">
+                <a:hlinkClick r:id="rId3"/>
+              </a:rPr>
+              <a:t>barthelmess@stlawu.edu</a:t>
+            </a:r>
+            <a:r>
+              <a:rPr lang="en-US" dirty="0"/>
+              <a:t> </a:t>
+            </a:r>
+          </a:p>
+          <a:p>
+            <a:pPr marL="457200" lvl="1" indent="0">
+              <a:buNone/>
+            </a:pPr>
+            <a:r>
+              <a:rPr lang="en-US" dirty="0"/>
+              <a:t>Professor of Biology</a:t>
+            </a:r>
+          </a:p>
+          <a:p>
+            <a:pPr marL="457200" lvl="1" indent="0">
+              <a:buNone/>
+            </a:pPr>
+            <a:r>
+              <a:rPr lang="en-US" dirty="0"/>
+              <a:t>St. Lawrence University</a:t>
+            </a:r>
+          </a:p>
+          <a:p>
+            <a:pPr marL="457200" lvl="1" indent="0">
+              <a:buNone/>
+            </a:pPr>
+            <a:r>
+              <a:rPr lang="en-US" dirty="0"/>
+              <a:t>Canton, NY, USA</a:t>
+            </a:r>
+          </a:p>
+        </p:txBody>
+      </p:sp>
+      <p:pic>
+        <p:nvPicPr>
+          <p:cNvPr id="5" name="Picture 4" descr="A person wearing a hat and a jacket&#10;&#10;AI-generated content may be incorrect.">
+            <a:extLst>
+              <a:ext uri="{FF2B5EF4-FFF2-40B4-BE49-F238E27FC236}">
+                <a16:creationId xmlns:a16="http://schemas.microsoft.com/office/drawing/2014/main" id="{9E00D801-AE36-DBA5-810B-9435260862E8}"/>
+              </a:ext>
+            </a:extLst>
+          </p:cNvPr>
+          <p:cNvPicPr>
+            <a:picLocks noChangeAspect="1"/>
+          </p:cNvPicPr>
+          <p:nvPr/>
+        </p:nvPicPr>
+        <p:blipFill>
+          <a:blip r:embed="rId4"/>
+          <a:stretch>
+            <a:fillRect/>
+          </a:stretch>
+        </p:blipFill>
+        <p:spPr>
+          <a:xfrm>
+            <a:off x="9553303" y="1112466"/>
+            <a:ext cx="2143526" cy="2145762"/>
+          </a:xfrm>
+          <a:prstGeom prst="rect">
+            <a:avLst/>
+          </a:prstGeom>
+        </p:spPr>
+      </p:pic>
+      <p:pic>
+        <p:nvPicPr>
+          <p:cNvPr id="6" name="Picture 5" descr="A person wearing a hat and sunglasses&#10;&#10;AI-generated content may be incorrect.">
+            <a:extLst>
+              <a:ext uri="{FF2B5EF4-FFF2-40B4-BE49-F238E27FC236}">
+                <a16:creationId xmlns:a16="http://schemas.microsoft.com/office/drawing/2014/main" id="{933DE1D7-3726-9AED-D9AB-26F0E87F4FE7}"/>
+              </a:ext>
+            </a:extLst>
+          </p:cNvPr>
+          <p:cNvPicPr>
+            <a:picLocks noChangeAspect="1"/>
+          </p:cNvPicPr>
+          <p:nvPr/>
+        </p:nvPicPr>
+        <p:blipFill>
+          <a:blip r:embed="rId5"/>
+          <a:stretch>
+            <a:fillRect/>
+          </a:stretch>
+        </p:blipFill>
+        <p:spPr>
+          <a:xfrm>
+            <a:off x="9553303" y="3939337"/>
+            <a:ext cx="2145762" cy="2145762"/>
+          </a:xfrm>
+          <a:prstGeom prst="rect">
+            <a:avLst/>
+          </a:prstGeom>
+        </p:spPr>
+      </p:pic>
+    </p:spTree>
+    <p:extLst>
+      <p:ext uri="{BB962C8B-B14F-4D97-AF65-F5344CB8AC3E}">
+        <p14:creationId xmlns:p14="http://schemas.microsoft.com/office/powerpoint/2010/main" val="2081615761"/>
+      </p:ext>
+    </p:extLst>
+  </p:cSld>
+  <p:clrMapOvr>
+    <a:masterClrMapping/>
+  </p:clrMapOvr>
+</p:sld>
+</file>
+
+<file path=ppt/slides/slide20.xml><?xml version="1.0" encoding="utf-8"?>
 <p:sld xmlns:a="http://schemas.openxmlformats.org/drawingml/2006/main" xmlns:r="http://schemas.openxmlformats.org/officeDocument/2006/relationships" xmlns:p="http://schemas.openxmlformats.org/presentationml/2006/main">
   <p:cSld>
     <p:spTree>
@@ -13340,251 +13893,7 @@
 </p:sld>
 </file>
 
-<file path=ppt/slides/slide2.xml><?xml version="1.0" encoding="utf-8"?>
-<p:sld xmlns:a="http://schemas.openxmlformats.org/drawingml/2006/main" xmlns:r="http://schemas.openxmlformats.org/officeDocument/2006/relationships" xmlns:p="http://schemas.openxmlformats.org/presentationml/2006/main">
-  <p:cSld>
-    <p:spTree>
-      <p:nvGrpSpPr>
-        <p:cNvPr id="1" name=""/>
-        <p:cNvGrpSpPr/>
-        <p:nvPr/>
-      </p:nvGrpSpPr>
-      <p:grpSpPr>
-        <a:xfrm>
-          <a:off x="0" y="0"/>
-          <a:ext cx="0" cy="0"/>
-          <a:chOff x="0" y="0"/>
-          <a:chExt cx="0" cy="0"/>
-        </a:xfrm>
-      </p:grpSpPr>
-      <p:sp>
-        <p:nvSpPr>
-          <p:cNvPr id="2" name="Title 1">
-            <a:extLst>
-              <a:ext uri="{FF2B5EF4-FFF2-40B4-BE49-F238E27FC236}">
-                <a16:creationId xmlns:a16="http://schemas.microsoft.com/office/drawing/2014/main" id="{C502AA43-05D2-9F91-20E3-7EF6EAD8D125}"/>
-              </a:ext>
-            </a:extLst>
-          </p:cNvPr>
-          <p:cNvSpPr>
-            <a:spLocks noGrp="1"/>
-          </p:cNvSpPr>
-          <p:nvPr>
-            <p:ph type="title"/>
-          </p:nvPr>
-        </p:nvSpPr>
-        <p:spPr>
-          <a:xfrm>
-            <a:off x="838200" y="134865"/>
-            <a:ext cx="10515600" cy="704268"/>
-          </a:xfrm>
-        </p:spPr>
-        <p:txBody>
-          <a:bodyPr/>
-          <a:lstStyle/>
-          <a:p>
-            <a:pPr algn="ctr"/>
-            <a:r>
-              <a:rPr lang="en-US" dirty="0"/>
-              <a:t>Instructors</a:t>
-            </a:r>
-          </a:p>
-        </p:txBody>
-      </p:sp>
-      <p:sp>
-        <p:nvSpPr>
-          <p:cNvPr id="3" name="Content Placeholder 2">
-            <a:extLst>
-              <a:ext uri="{FF2B5EF4-FFF2-40B4-BE49-F238E27FC236}">
-                <a16:creationId xmlns:a16="http://schemas.microsoft.com/office/drawing/2014/main" id="{FA668741-CD59-72EE-0171-3F1515385326}"/>
-              </a:ext>
-            </a:extLst>
-          </p:cNvPr>
-          <p:cNvSpPr>
-            <a:spLocks noGrp="1"/>
-          </p:cNvSpPr>
-          <p:nvPr>
-            <p:ph idx="1"/>
-          </p:nvPr>
-        </p:nvSpPr>
-        <p:spPr>
-          <a:xfrm>
-            <a:off x="339632" y="1282912"/>
-            <a:ext cx="9483990" cy="4351338"/>
-          </a:xfrm>
-        </p:spPr>
-        <p:txBody>
-          <a:bodyPr/>
-          <a:lstStyle/>
-          <a:p>
-            <a:r>
-              <a:rPr lang="en-US" dirty="0"/>
-              <a:t>Dr. Marissa Dyck (she/her) – </a:t>
-            </a:r>
-            <a:r>
-              <a:rPr lang="en-US" dirty="0">
-                <a:hlinkClick r:id="rId2"/>
-              </a:rPr>
-              <a:t>marissadyck17@gmail.com</a:t>
-            </a:r>
-            <a:endParaRPr lang="en-US" dirty="0"/>
-          </a:p>
-          <a:p>
-            <a:pPr marL="457200" lvl="1" indent="0">
-              <a:buNone/>
-            </a:pPr>
-            <a:r>
-              <a:rPr lang="en-US" dirty="0"/>
-              <a:t>Postdoctoral Research Fellow</a:t>
-            </a:r>
-          </a:p>
-          <a:p>
-            <a:pPr marL="457200" lvl="1" indent="0">
-              <a:buNone/>
-            </a:pPr>
-            <a:r>
-              <a:rPr lang="en-US" dirty="0"/>
-              <a:t>University of Victoria</a:t>
-            </a:r>
-          </a:p>
-          <a:p>
-            <a:pPr marL="457200" lvl="1" indent="0">
-              <a:buNone/>
-            </a:pPr>
-            <a:r>
-              <a:rPr lang="en-US" dirty="0"/>
-              <a:t>Victoria, BC, Canada</a:t>
-            </a:r>
-          </a:p>
-          <a:p>
-            <a:pPr marL="457200" lvl="1" indent="0">
-              <a:buNone/>
-            </a:pPr>
-            <a:endParaRPr lang="en-US" dirty="0"/>
-          </a:p>
-          <a:p>
-            <a:r>
-              <a:rPr lang="en-US" dirty="0"/>
-              <a:t>Dr. Erika Barthelmess (she/her) – </a:t>
-            </a:r>
-            <a:r>
-              <a:rPr lang="en-US" dirty="0" err="1"/>
-              <a:t>b</a:t>
-            </a:r>
-            <a:r>
-              <a:rPr lang="en-US" dirty="0" err="1">
-                <a:hlinkClick r:id="rId3"/>
-              </a:rPr>
-              <a:t>arthelmess@stlawu.edu</a:t>
-            </a:r>
-            <a:r>
-              <a:rPr lang="en-US" dirty="0"/>
-              <a:t> </a:t>
-            </a:r>
-          </a:p>
-          <a:p>
-            <a:pPr marL="457200" lvl="1" indent="0">
-              <a:buNone/>
-            </a:pPr>
-            <a:r>
-              <a:rPr lang="en-US" dirty="0"/>
-              <a:t>Professor of Biology</a:t>
-            </a:r>
-          </a:p>
-          <a:p>
-            <a:pPr marL="457200" lvl="1" indent="0">
-              <a:buNone/>
-            </a:pPr>
-            <a:r>
-              <a:rPr lang="en-US" dirty="0"/>
-              <a:t>St. Lawrence University</a:t>
-            </a:r>
-          </a:p>
-          <a:p>
-            <a:pPr marL="457200" lvl="1" indent="0">
-              <a:buNone/>
-            </a:pPr>
-            <a:r>
-              <a:rPr lang="en-US" dirty="0"/>
-              <a:t>Canton, NY, USA</a:t>
-            </a:r>
-          </a:p>
-        </p:txBody>
-      </p:sp>
-      <p:pic>
-        <p:nvPicPr>
-          <p:cNvPr id="5" name="Picture 4" descr="A person wearing a hat and a jacket&#10;&#10;AI-generated content may be incorrect.">
-            <a:extLst>
-              <a:ext uri="{FF2B5EF4-FFF2-40B4-BE49-F238E27FC236}">
-                <a16:creationId xmlns:a16="http://schemas.microsoft.com/office/drawing/2014/main" id="{9E00D801-AE36-DBA5-810B-9435260862E8}"/>
-              </a:ext>
-            </a:extLst>
-          </p:cNvPr>
-          <p:cNvPicPr>
-            <a:picLocks noChangeAspect="1"/>
-          </p:cNvPicPr>
-          <p:nvPr/>
-        </p:nvPicPr>
-        <p:blipFill>
-          <a:blip r:embed="rId4"/>
-          <a:stretch>
-            <a:fillRect/>
-          </a:stretch>
-        </p:blipFill>
-        <p:spPr>
-          <a:xfrm>
-            <a:off x="9553303" y="1112466"/>
-            <a:ext cx="2143526" cy="2145762"/>
-          </a:xfrm>
-          <a:prstGeom prst="rect">
-            <a:avLst/>
-          </a:prstGeom>
-        </p:spPr>
-      </p:pic>
-      <p:pic>
-        <p:nvPicPr>
-          <p:cNvPr id="6" name="Picture 5" descr="A person wearing a hat and sunglasses&#10;&#10;AI-generated content may be incorrect.">
-            <a:extLst>
-              <a:ext uri="{FF2B5EF4-FFF2-40B4-BE49-F238E27FC236}">
-                <a16:creationId xmlns:a16="http://schemas.microsoft.com/office/drawing/2014/main" id="{933DE1D7-3726-9AED-D9AB-26F0E87F4FE7}"/>
-              </a:ext>
-            </a:extLst>
-          </p:cNvPr>
-          <p:cNvPicPr>
-            <a:picLocks noChangeAspect="1"/>
-          </p:cNvPicPr>
-          <p:nvPr/>
-        </p:nvPicPr>
-        <p:blipFill>
-          <a:blip r:embed="rId5"/>
-          <a:stretch>
-            <a:fillRect/>
-          </a:stretch>
-        </p:blipFill>
-        <p:spPr>
-          <a:xfrm>
-            <a:off x="9553303" y="3939337"/>
-            <a:ext cx="2145762" cy="2145762"/>
-          </a:xfrm>
-          <a:prstGeom prst="rect">
-            <a:avLst/>
-          </a:prstGeom>
-        </p:spPr>
-      </p:pic>
-    </p:spTree>
-    <p:extLst>
-      <p:ext uri="{BB962C8B-B14F-4D97-AF65-F5344CB8AC3E}">
-        <p14:creationId xmlns:p14="http://schemas.microsoft.com/office/powerpoint/2010/main" val="2081615761"/>
-      </p:ext>
-    </p:extLst>
-  </p:cSld>
-  <p:clrMapOvr>
-    <a:masterClrMapping/>
-  </p:clrMapOvr>
-</p:sld>
-</file>
-
-<file path=ppt/slides/slide20.xml><?xml version="1.0" encoding="utf-8"?>
+<file path=ppt/slides/slide21.xml><?xml version="1.0" encoding="utf-8"?>
 <p:sld xmlns:a="http://schemas.openxmlformats.org/drawingml/2006/main" xmlns:r="http://schemas.openxmlformats.org/officeDocument/2006/relationships" xmlns:p="http://schemas.openxmlformats.org/presentationml/2006/main">
   <p:cSld>
     <p:spTree>
@@ -14496,7 +14805,7 @@
 </p:sld>
 </file>
 
-<file path=ppt/slides/slide21.xml><?xml version="1.0" encoding="utf-8"?>
+<file path=ppt/slides/slide22.xml><?xml version="1.0" encoding="utf-8"?>
 <p:sld xmlns:a="http://schemas.openxmlformats.org/drawingml/2006/main" xmlns:r="http://schemas.openxmlformats.org/officeDocument/2006/relationships" xmlns:p="http://schemas.openxmlformats.org/presentationml/2006/main">
   <p:cSld>
     <p:spTree>
@@ -15572,7 +15881,7 @@
 </p:sld>
 </file>
 
-<file path=ppt/slides/slide22.xml><?xml version="1.0" encoding="utf-8"?>
+<file path=ppt/slides/slide23.xml><?xml version="1.0" encoding="utf-8"?>
 <p:sld xmlns:a="http://schemas.openxmlformats.org/drawingml/2006/main" xmlns:r="http://schemas.openxmlformats.org/officeDocument/2006/relationships" xmlns:p="http://schemas.openxmlformats.org/presentationml/2006/main">
   <p:cSld>
     <p:spTree>
@@ -15859,7 +16168,6 @@
           <a:bodyPr/>
           <a:lstStyle/>
           <a:p>
-            <a:pPr algn="ctr"/>
             <a:r>
               <a:rPr lang="en-US" dirty="0"/>
               <a:t>Agenda</a:t>
@@ -15889,7 +16197,7 @@
           <a:lstStyle/>
           <a:p>
             <a:pPr lvl="1"/>
-            <a:endParaRPr lang="en-US" dirty="0"/>
+            <a:endParaRPr lang="en-US"/>
           </a:p>
           <a:p>
             <a:pPr marL="571500" indent="-571500">
@@ -15897,7 +16205,7 @@
               <a:buAutoNum type="romanUcPeriod"/>
             </a:pPr>
             <a:r>
-              <a:rPr lang="en-US" dirty="0"/>
+              <a:rPr lang="en-US"/>
               <a:t>R Overview</a:t>
             </a:r>
           </a:p>
@@ -15907,8 +16215,17 @@
               <a:buAutoNum type="romanUcPeriod"/>
             </a:pPr>
             <a:r>
-              <a:rPr lang="en-US" dirty="0"/>
+              <a:rPr lang="en-US"/>
               <a:t>R Markdown</a:t>
+            </a:r>
+          </a:p>
+          <a:p>
+            <a:pPr marL="0" indent="0">
+              <a:buNone/>
+            </a:pPr>
+            <a:r>
+              <a:rPr lang="en-US"/>
+              <a:t>- Break -</a:t>
             </a:r>
           </a:p>
           <a:p>
@@ -15917,7 +16234,7 @@
               <a:buAutoNum type="romanUcPeriod"/>
             </a:pPr>
             <a:r>
-              <a:rPr lang="en-US" dirty="0"/>
+              <a:rPr lang="en-US"/>
               <a:t>Git/GitHub</a:t>
             </a:r>
           </a:p>
@@ -15927,7 +16244,7 @@
               <a:buAutoNum type="romanUcPeriod"/>
             </a:pPr>
             <a:r>
-              <a:rPr lang="en-US" dirty="0"/>
+              <a:rPr lang="en-US"/>
               <a:t>Tidy data </a:t>
             </a:r>
           </a:p>
@@ -15940,6 +16257,36 @@
           </a:p>
         </p:txBody>
       </p:sp>
+      <p:pic>
+        <p:nvPicPr>
+          <p:cNvPr id="5" name="Picture 4" descr="A bear standing in the woods&#10;&#10;AI-generated content may be incorrect.">
+            <a:extLst>
+              <a:ext uri="{FF2B5EF4-FFF2-40B4-BE49-F238E27FC236}">
+                <a16:creationId xmlns:a16="http://schemas.microsoft.com/office/drawing/2014/main" id="{A4EDA278-CCFC-12D9-E905-55B780FD866B}"/>
+              </a:ext>
+            </a:extLst>
+          </p:cNvPr>
+          <p:cNvPicPr>
+            <a:picLocks noChangeAspect="1"/>
+          </p:cNvPicPr>
+          <p:nvPr/>
+        </p:nvPicPr>
+        <p:blipFill>
+          <a:blip r:embed="rId2"/>
+          <a:stretch>
+            <a:fillRect/>
+          </a:stretch>
+        </p:blipFill>
+        <p:spPr>
+          <a:xfrm>
+            <a:off x="4842933" y="1690688"/>
+            <a:ext cx="7349067" cy="5167312"/>
+          </a:xfrm>
+          <a:prstGeom prst="rect">
+            <a:avLst/>
+          </a:prstGeom>
+        </p:spPr>
+      </p:pic>
     </p:spTree>
     <p:extLst>
       <p:ext uri="{BB962C8B-B14F-4D97-AF65-F5344CB8AC3E}">
@@ -16529,7 +16876,7 @@
             </a:pPr>
             <a:r>
               <a:rPr lang="en-US" dirty="0"/>
-              <a:t>Easily understood by someone from any field</a:t>
+              <a:t>Folder names are succinct and easily understood by someone from any field</a:t>
             </a:r>
           </a:p>
           <a:p>
@@ -16539,7 +16886,7 @@
             </a:pPr>
             <a:r>
               <a:rPr lang="en-US" dirty="0"/>
-              <a:t>Short names, all lowercase, use _ for spaces</a:t>
+              <a:t>Short names, all lowercase, avoid special characters, use _ for spaces</a:t>
             </a:r>
           </a:p>
           <a:p>

</xml_diff>

<commit_message>
updating git github stuff
</commit_message>
<xml_diff>
--- a/docs/Reproducible research in R.pptx
+++ b/docs/Reproducible research in R.pptx
@@ -5,7 +5,7 @@
     <p:sldMasterId id="2147483648" r:id="rId1"/>
   </p:sldMasterIdLst>
   <p:notesMasterIdLst>
-    <p:notesMasterId r:id="rId25"/>
+    <p:notesMasterId r:id="rId27"/>
   </p:notesMasterIdLst>
   <p:sldIdLst>
     <p:sldId id="256" r:id="rId2"/>
@@ -26,11 +26,13 @@
     <p:sldId id="273" r:id="rId17"/>
     <p:sldId id="279" r:id="rId18"/>
     <p:sldId id="280" r:id="rId19"/>
-    <p:sldId id="259" r:id="rId20"/>
-    <p:sldId id="276" r:id="rId21"/>
-    <p:sldId id="277" r:id="rId22"/>
-    <p:sldId id="278" r:id="rId23"/>
-    <p:sldId id="274" r:id="rId24"/>
+    <p:sldId id="281" r:id="rId20"/>
+    <p:sldId id="282" r:id="rId21"/>
+    <p:sldId id="259" r:id="rId22"/>
+    <p:sldId id="276" r:id="rId23"/>
+    <p:sldId id="277" r:id="rId24"/>
+    <p:sldId id="278" r:id="rId25"/>
+    <p:sldId id="274" r:id="rId26"/>
   </p:sldIdLst>
   <p:sldSz cx="12192000" cy="6858000"/>
   <p:notesSz cx="6858000" cy="9144000"/>
@@ -5729,7 +5731,7 @@
           <a:p>
             <a:fld id="{6435B03D-516F-5A44-9365-C1C2D3DF7245}" type="datetimeFigureOut">
               <a:rPr lang="en-US" smtClean="0"/>
-              <a:t>6/22/25</a:t>
+              <a:t>6/24/25</a:t>
             </a:fld>
             <a:endParaRPr lang="en-US"/>
           </a:p>
@@ -7808,7 +7810,7 @@
           <a:p>
             <a:fld id="{3DFC7523-4903-EA42-A253-0F84EF8D8793}" type="datetimeFigureOut">
               <a:rPr lang="en-US" smtClean="0"/>
-              <a:t>6/22/25</a:t>
+              <a:t>6/24/25</a:t>
             </a:fld>
             <a:endParaRPr lang="en-US"/>
           </a:p>
@@ -8006,7 +8008,7 @@
           <a:p>
             <a:fld id="{3DFC7523-4903-EA42-A253-0F84EF8D8793}" type="datetimeFigureOut">
               <a:rPr lang="en-US" smtClean="0"/>
-              <a:t>6/22/25</a:t>
+              <a:t>6/24/25</a:t>
             </a:fld>
             <a:endParaRPr lang="en-US"/>
           </a:p>
@@ -8214,7 +8216,7 @@
           <a:p>
             <a:fld id="{3DFC7523-4903-EA42-A253-0F84EF8D8793}" type="datetimeFigureOut">
               <a:rPr lang="en-US" smtClean="0"/>
-              <a:t>6/22/25</a:t>
+              <a:t>6/24/25</a:t>
             </a:fld>
             <a:endParaRPr lang="en-US"/>
           </a:p>
@@ -8412,7 +8414,7 @@
           <a:p>
             <a:fld id="{3DFC7523-4903-EA42-A253-0F84EF8D8793}" type="datetimeFigureOut">
               <a:rPr lang="en-US" smtClean="0"/>
-              <a:t>6/22/25</a:t>
+              <a:t>6/24/25</a:t>
             </a:fld>
             <a:endParaRPr lang="en-US"/>
           </a:p>
@@ -8687,7 +8689,7 @@
           <a:p>
             <a:fld id="{3DFC7523-4903-EA42-A253-0F84EF8D8793}" type="datetimeFigureOut">
               <a:rPr lang="en-US" smtClean="0"/>
-              <a:t>6/22/25</a:t>
+              <a:t>6/24/25</a:t>
             </a:fld>
             <a:endParaRPr lang="en-US"/>
           </a:p>
@@ -8952,7 +8954,7 @@
           <a:p>
             <a:fld id="{3DFC7523-4903-EA42-A253-0F84EF8D8793}" type="datetimeFigureOut">
               <a:rPr lang="en-US" smtClean="0"/>
-              <a:t>6/22/25</a:t>
+              <a:t>6/24/25</a:t>
             </a:fld>
             <a:endParaRPr lang="en-US"/>
           </a:p>
@@ -9364,7 +9366,7 @@
           <a:p>
             <a:fld id="{3DFC7523-4903-EA42-A253-0F84EF8D8793}" type="datetimeFigureOut">
               <a:rPr lang="en-US" smtClean="0"/>
-              <a:t>6/22/25</a:t>
+              <a:t>6/24/25</a:t>
             </a:fld>
             <a:endParaRPr lang="en-US"/>
           </a:p>
@@ -9505,7 +9507,7 @@
           <a:p>
             <a:fld id="{3DFC7523-4903-EA42-A253-0F84EF8D8793}" type="datetimeFigureOut">
               <a:rPr lang="en-US" smtClean="0"/>
-              <a:t>6/22/25</a:t>
+              <a:t>6/24/25</a:t>
             </a:fld>
             <a:endParaRPr lang="en-US"/>
           </a:p>
@@ -9618,7 +9620,7 @@
           <a:p>
             <a:fld id="{3DFC7523-4903-EA42-A253-0F84EF8D8793}" type="datetimeFigureOut">
               <a:rPr lang="en-US" smtClean="0"/>
-              <a:t>6/22/25</a:t>
+              <a:t>6/24/25</a:t>
             </a:fld>
             <a:endParaRPr lang="en-US"/>
           </a:p>
@@ -9929,7 +9931,7 @@
           <a:p>
             <a:fld id="{3DFC7523-4903-EA42-A253-0F84EF8D8793}" type="datetimeFigureOut">
               <a:rPr lang="en-US" smtClean="0"/>
-              <a:t>6/22/25</a:t>
+              <a:t>6/24/25</a:t>
             </a:fld>
             <a:endParaRPr lang="en-US"/>
           </a:p>
@@ -10217,7 +10219,7 @@
           <a:p>
             <a:fld id="{3DFC7523-4903-EA42-A253-0F84EF8D8793}" type="datetimeFigureOut">
               <a:rPr lang="en-US" smtClean="0"/>
-              <a:t>6/22/25</a:t>
+              <a:t>6/24/25</a:t>
             </a:fld>
             <a:endParaRPr lang="en-US"/>
           </a:p>
@@ -10458,7 +10460,7 @@
           <a:p>
             <a:fld id="{3DFC7523-4903-EA42-A253-0F84EF8D8793}" type="datetimeFigureOut">
               <a:rPr lang="en-US" smtClean="0"/>
-              <a:t>6/22/25</a:t>
+              <a:t>6/24/25</a:t>
             </a:fld>
             <a:endParaRPr lang="en-US"/>
           </a:p>
@@ -12304,7 +12306,7 @@
           <p:cNvPr id="2" name="Title 1">
             <a:extLst>
               <a:ext uri="{FF2B5EF4-FFF2-40B4-BE49-F238E27FC236}">
-                <a16:creationId xmlns:a16="http://schemas.microsoft.com/office/drawing/2014/main" id="{A70CA71A-FB99-10F1-BB03-3ABDD9901DE1}"/>
+                <a16:creationId xmlns:a16="http://schemas.microsoft.com/office/drawing/2014/main" id="{2BAEB4D5-B097-3091-B722-4D59949F7437}"/>
               </a:ext>
             </a:extLst>
           </p:cNvPr>
@@ -12320,11 +12322,7 @@
           <a:bodyPr/>
           <a:lstStyle/>
           <a:p>
-            <a:pPr algn="ctr"/>
-            <a:r>
-              <a:rPr lang="en-US" dirty="0"/>
-              <a:t>Git/GitHub</a:t>
-            </a:r>
+            <a:endParaRPr lang="en-US"/>
           </a:p>
         </p:txBody>
       </p:sp>
@@ -12333,7 +12331,7 @@
           <p:cNvPr id="3" name="Content Placeholder 2">
             <a:extLst>
               <a:ext uri="{FF2B5EF4-FFF2-40B4-BE49-F238E27FC236}">
-                <a16:creationId xmlns:a16="http://schemas.microsoft.com/office/drawing/2014/main" id="{803DF030-8B38-00AD-9B11-ED480FB2EDCB}"/>
+                <a16:creationId xmlns:a16="http://schemas.microsoft.com/office/drawing/2014/main" id="{D8FF07BC-90D8-F843-5D18-108EE883E456}"/>
               </a:ext>
             </a:extLst>
           </p:cNvPr>
@@ -12349,33 +12347,14 @@
           <a:bodyPr/>
           <a:lstStyle/>
           <a:p>
-            <a:r>
-              <a:rPr lang="en-US" dirty="0"/>
-              <a:t>I think the git/</a:t>
-            </a:r>
-            <a:r>
-              <a:rPr lang="en-US" dirty="0" err="1"/>
-              <a:t>github</a:t>
-            </a:r>
-            <a:r>
-              <a:rPr lang="en-US" dirty="0"/>
-              <a:t> piece would be much better in the 2</a:t>
-            </a:r>
-            <a:r>
-              <a:rPr lang="en-US" baseline="30000" dirty="0"/>
-              <a:t>nd</a:t>
-            </a:r>
-            <a:r>
-              <a:rPr lang="en-US" dirty="0"/>
-              <a:t> half of the workshop.</a:t>
-            </a:r>
+            <a:endParaRPr lang="en-US"/>
           </a:p>
         </p:txBody>
       </p:sp>
     </p:spTree>
     <p:extLst>
       <p:ext uri="{BB962C8B-B14F-4D97-AF65-F5344CB8AC3E}">
-        <p14:creationId xmlns:p14="http://schemas.microsoft.com/office/powerpoint/2010/main" val="3324382596"/>
+        <p14:creationId xmlns:p14="http://schemas.microsoft.com/office/powerpoint/2010/main" val="2482741089"/>
       </p:ext>
     </p:extLst>
   </p:cSld>
@@ -12626,6 +12605,186 @@
 </file>
 
 <file path=ppt/slides/slide20.xml><?xml version="1.0" encoding="utf-8"?>
+<p:sld xmlns:a="http://schemas.openxmlformats.org/drawingml/2006/main" xmlns:r="http://schemas.openxmlformats.org/officeDocument/2006/relationships" xmlns:p="http://schemas.openxmlformats.org/presentationml/2006/main">
+  <p:cSld>
+    <p:spTree>
+      <p:nvGrpSpPr>
+        <p:cNvPr id="1" name=""/>
+        <p:cNvGrpSpPr/>
+        <p:nvPr/>
+      </p:nvGrpSpPr>
+      <p:grpSpPr>
+        <a:xfrm>
+          <a:off x="0" y="0"/>
+          <a:ext cx="0" cy="0"/>
+          <a:chOff x="0" y="0"/>
+          <a:chExt cx="0" cy="0"/>
+        </a:xfrm>
+      </p:grpSpPr>
+      <p:pic>
+        <p:nvPicPr>
+          <p:cNvPr id="3" name="Picture 2" descr="A cat lying on its back on the sand&#10;&#10;AI-generated content may be incorrect.">
+            <a:extLst>
+              <a:ext uri="{FF2B5EF4-FFF2-40B4-BE49-F238E27FC236}">
+                <a16:creationId xmlns:a16="http://schemas.microsoft.com/office/drawing/2014/main" id="{43FDC808-53AE-8068-2FBD-2832D9297721}"/>
+              </a:ext>
+            </a:extLst>
+          </p:cNvPr>
+          <p:cNvPicPr>
+            <a:picLocks noChangeAspect="1"/>
+          </p:cNvPicPr>
+          <p:nvPr/>
+        </p:nvPicPr>
+        <p:blipFill>
+          <a:blip r:embed="rId2"/>
+          <a:stretch>
+            <a:fillRect/>
+          </a:stretch>
+        </p:blipFill>
+        <p:spPr>
+          <a:xfrm>
+            <a:off x="1551030" y="784654"/>
+            <a:ext cx="9089940" cy="5288692"/>
+          </a:xfrm>
+          <a:prstGeom prst="rect">
+            <a:avLst/>
+          </a:prstGeom>
+        </p:spPr>
+      </p:pic>
+    </p:spTree>
+    <p:extLst>
+      <p:ext uri="{BB962C8B-B14F-4D97-AF65-F5344CB8AC3E}">
+        <p14:creationId xmlns:p14="http://schemas.microsoft.com/office/powerpoint/2010/main" val="824936908"/>
+      </p:ext>
+    </p:extLst>
+  </p:cSld>
+  <p:clrMapOvr>
+    <a:masterClrMapping/>
+  </p:clrMapOvr>
+</p:sld>
+</file>
+
+<file path=ppt/slides/slide21.xml><?xml version="1.0" encoding="utf-8"?>
+<p:sld xmlns:a="http://schemas.openxmlformats.org/drawingml/2006/main" xmlns:r="http://schemas.openxmlformats.org/officeDocument/2006/relationships" xmlns:p="http://schemas.openxmlformats.org/presentationml/2006/main">
+  <p:cSld>
+    <p:spTree>
+      <p:nvGrpSpPr>
+        <p:cNvPr id="1" name=""/>
+        <p:cNvGrpSpPr/>
+        <p:nvPr/>
+      </p:nvGrpSpPr>
+      <p:grpSpPr>
+        <a:xfrm>
+          <a:off x="0" y="0"/>
+          <a:ext cx="0" cy="0"/>
+          <a:chOff x="0" y="0"/>
+          <a:chExt cx="0" cy="0"/>
+        </a:xfrm>
+      </p:grpSpPr>
+      <p:sp>
+        <p:nvSpPr>
+          <p:cNvPr id="2" name="Title 1">
+            <a:extLst>
+              <a:ext uri="{FF2B5EF4-FFF2-40B4-BE49-F238E27FC236}">
+                <a16:creationId xmlns:a16="http://schemas.microsoft.com/office/drawing/2014/main" id="{A70CA71A-FB99-10F1-BB03-3ABDD9901DE1}"/>
+              </a:ext>
+            </a:extLst>
+          </p:cNvPr>
+          <p:cNvSpPr>
+            <a:spLocks noGrp="1"/>
+          </p:cNvSpPr>
+          <p:nvPr>
+            <p:ph type="title"/>
+          </p:nvPr>
+        </p:nvSpPr>
+        <p:spPr>
+          <a:xfrm>
+            <a:off x="182880" y="365126"/>
+            <a:ext cx="11692128" cy="734626"/>
+          </a:xfrm>
+        </p:spPr>
+        <p:txBody>
+          <a:bodyPr>
+            <a:noAutofit/>
+          </a:bodyPr>
+          <a:lstStyle/>
+          <a:p>
+            <a:pPr algn="ctr"/>
+            <a:r>
+              <a:rPr lang="en-US" sz="3600" dirty="0"/>
+              <a:t>Reproducible Research Part 2 – Git/Github and tidying data</a:t>
+            </a:r>
+          </a:p>
+        </p:txBody>
+      </p:sp>
+      <p:sp>
+        <p:nvSpPr>
+          <p:cNvPr id="3" name="Content Placeholder 2">
+            <a:extLst>
+              <a:ext uri="{FF2B5EF4-FFF2-40B4-BE49-F238E27FC236}">
+                <a16:creationId xmlns:a16="http://schemas.microsoft.com/office/drawing/2014/main" id="{803DF030-8B38-00AD-9B11-ED480FB2EDCB}"/>
+              </a:ext>
+            </a:extLst>
+          </p:cNvPr>
+          <p:cNvSpPr>
+            <a:spLocks noGrp="1"/>
+          </p:cNvSpPr>
+          <p:nvPr>
+            <p:ph idx="1"/>
+          </p:nvPr>
+        </p:nvSpPr>
+        <p:spPr/>
+        <p:txBody>
+          <a:bodyPr/>
+          <a:lstStyle/>
+          <a:p>
+            <a:r>
+              <a:rPr lang="en-US" dirty="0"/>
+              <a:t>Where we’ve been</a:t>
+            </a:r>
+          </a:p>
+          <a:p>
+            <a:r>
+              <a:rPr lang="en-US" dirty="0"/>
+              <a:t>Git/Github overview</a:t>
+            </a:r>
+          </a:p>
+          <a:p>
+            <a:r>
+              <a:rPr lang="en-US" dirty="0"/>
+              <a:t>Git/Github practice</a:t>
+            </a:r>
+          </a:p>
+          <a:p>
+            <a:r>
+              <a:rPr lang="en-US" dirty="0"/>
+              <a:t>Tidying data and practicing the git/</a:t>
+            </a:r>
+            <a:r>
+              <a:rPr lang="en-US" dirty="0" err="1"/>
+              <a:t>github</a:t>
+            </a:r>
+            <a:r>
+              <a:rPr lang="en-US" dirty="0"/>
+              <a:t> workflow</a:t>
+            </a:r>
+          </a:p>
+        </p:txBody>
+      </p:sp>
+    </p:spTree>
+    <p:extLst>
+      <p:ext uri="{BB962C8B-B14F-4D97-AF65-F5344CB8AC3E}">
+        <p14:creationId xmlns:p14="http://schemas.microsoft.com/office/powerpoint/2010/main" val="3324382596"/>
+      </p:ext>
+    </p:extLst>
+  </p:cSld>
+  <p:clrMapOvr>
+    <a:masterClrMapping/>
+  </p:clrMapOvr>
+</p:sld>
+</file>
+
+<file path=ppt/slides/slide22.xml><?xml version="1.0" encoding="utf-8"?>
 <p:sld xmlns:a="http://schemas.openxmlformats.org/drawingml/2006/main" xmlns:r="http://schemas.openxmlformats.org/officeDocument/2006/relationships" xmlns:p="http://schemas.openxmlformats.org/presentationml/2006/main">
   <p:cSld>
     <p:spTree>
@@ -13893,7 +14052,7 @@
 </p:sld>
 </file>
 
-<file path=ppt/slides/slide21.xml><?xml version="1.0" encoding="utf-8"?>
+<file path=ppt/slides/slide23.xml><?xml version="1.0" encoding="utf-8"?>
 <p:sld xmlns:a="http://schemas.openxmlformats.org/drawingml/2006/main" xmlns:r="http://schemas.openxmlformats.org/officeDocument/2006/relationships" xmlns:p="http://schemas.openxmlformats.org/presentationml/2006/main">
   <p:cSld>
     <p:spTree>
@@ -14805,7 +14964,7 @@
 </p:sld>
 </file>
 
-<file path=ppt/slides/slide22.xml><?xml version="1.0" encoding="utf-8"?>
+<file path=ppt/slides/slide24.xml><?xml version="1.0" encoding="utf-8"?>
 <p:sld xmlns:a="http://schemas.openxmlformats.org/drawingml/2006/main" xmlns:r="http://schemas.openxmlformats.org/officeDocument/2006/relationships" xmlns:p="http://schemas.openxmlformats.org/presentationml/2006/main">
   <p:cSld>
     <p:spTree>
@@ -15881,7 +16040,7 @@
 </p:sld>
 </file>
 
-<file path=ppt/slides/slide23.xml><?xml version="1.0" encoding="utf-8"?>
+<file path=ppt/slides/slide25.xml><?xml version="1.0" encoding="utf-8"?>
 <p:sld xmlns:a="http://schemas.openxmlformats.org/drawingml/2006/main" xmlns:r="http://schemas.openxmlformats.org/officeDocument/2006/relationships" xmlns:p="http://schemas.openxmlformats.org/presentationml/2006/main">
   <p:cSld>
     <p:spTree>

</xml_diff>

<commit_message>
added folder to zipl files
</commit_message>
<xml_diff>
--- a/docs/Reproducible research in R.pptx
+++ b/docs/Reproducible research in R.pptx
@@ -5,7 +5,7 @@
     <p:sldMasterId id="2147483648" r:id="rId1"/>
   </p:sldMasterIdLst>
   <p:notesMasterIdLst>
-    <p:notesMasterId r:id="rId35"/>
+    <p:notesMasterId r:id="rId34"/>
   </p:notesMasterIdLst>
   <p:sldIdLst>
     <p:sldId id="256" r:id="rId2"/>
@@ -26,21 +26,20 @@
     <p:sldId id="273" r:id="rId17"/>
     <p:sldId id="279" r:id="rId18"/>
     <p:sldId id="280" r:id="rId19"/>
-    <p:sldId id="281" r:id="rId20"/>
-    <p:sldId id="282" r:id="rId21"/>
-    <p:sldId id="259" r:id="rId22"/>
-    <p:sldId id="276" r:id="rId23"/>
-    <p:sldId id="277" r:id="rId24"/>
-    <p:sldId id="278" r:id="rId25"/>
-    <p:sldId id="283" r:id="rId26"/>
-    <p:sldId id="274" r:id="rId27"/>
-    <p:sldId id="285" r:id="rId28"/>
-    <p:sldId id="284" r:id="rId29"/>
-    <p:sldId id="286" r:id="rId30"/>
-    <p:sldId id="288" r:id="rId31"/>
-    <p:sldId id="287" r:id="rId32"/>
-    <p:sldId id="289" r:id="rId33"/>
-    <p:sldId id="290" r:id="rId34"/>
+    <p:sldId id="282" r:id="rId20"/>
+    <p:sldId id="259" r:id="rId21"/>
+    <p:sldId id="276" r:id="rId22"/>
+    <p:sldId id="277" r:id="rId23"/>
+    <p:sldId id="278" r:id="rId24"/>
+    <p:sldId id="283" r:id="rId25"/>
+    <p:sldId id="274" r:id="rId26"/>
+    <p:sldId id="285" r:id="rId27"/>
+    <p:sldId id="284" r:id="rId28"/>
+    <p:sldId id="286" r:id="rId29"/>
+    <p:sldId id="288" r:id="rId30"/>
+    <p:sldId id="287" r:id="rId31"/>
+    <p:sldId id="289" r:id="rId32"/>
+    <p:sldId id="290" r:id="rId33"/>
   </p:sldIdLst>
   <p:sldSz cx="12192000" cy="6858000"/>
   <p:notesSz cx="6858000" cy="9144000"/>
@@ -12130,7 +12129,7 @@
             <a:pPr lvl="1"/>
             <a:r>
               <a:rPr lang="en-US" dirty="0"/>
-              <a:t>A code chunk that won’t be run when knit that installs packages (</a:t>
+              <a:t>A code chunk that won’t be run when knit that installs the </a:t>
             </a:r>
             <a:r>
               <a:rPr lang="en-US" dirty="0" err="1"/>
@@ -12138,7 +12137,15 @@
             </a:r>
             <a:r>
               <a:rPr lang="en-US" dirty="0"/>
-              <a:t>, )</a:t>
+              <a:t> package ( </a:t>
+            </a:r>
+            <a:r>
+              <a:rPr lang="en-US" i="1" dirty="0"/>
+              <a:t>you can install other packages if you wish</a:t>
+            </a:r>
+            <a:r>
+              <a:rPr lang="en-US" dirty="0"/>
+              <a:t>)</a:t>
             </a:r>
           </a:p>
           <a:p>
@@ -12238,7 +12245,19 @@
           <a:p>
             <a:r>
               <a:rPr lang="en-US" sz="2400" dirty="0"/>
-              <a:t>Read in _____ data </a:t>
+              <a:t>Read in the </a:t>
+            </a:r>
+            <a:r>
+              <a:rPr lang="en-US" sz="2400" i="1" dirty="0" err="1"/>
+              <a:t>trapping_data.csv</a:t>
+            </a:r>
+            <a:r>
+              <a:rPr lang="en-US" sz="2400" i="1" dirty="0"/>
+              <a:t> </a:t>
+            </a:r>
+            <a:r>
+              <a:rPr lang="en-US" sz="2400" dirty="0"/>
+              <a:t>data file</a:t>
             </a:r>
           </a:p>
           <a:p>
@@ -12309,60 +12328,40 @@
           <a:chExt cx="0" cy="0"/>
         </a:xfrm>
       </p:grpSpPr>
-      <p:sp>
-        <p:nvSpPr>
-          <p:cNvPr id="2" name="Title 1">
+      <p:pic>
+        <p:nvPicPr>
+          <p:cNvPr id="3" name="Picture 2" descr="A cat lying on its back on the sand&#10;&#10;AI-generated content may be incorrect.">
             <a:extLst>
               <a:ext uri="{FF2B5EF4-FFF2-40B4-BE49-F238E27FC236}">
-                <a16:creationId xmlns:a16="http://schemas.microsoft.com/office/drawing/2014/main" id="{2BAEB4D5-B097-3091-B722-4D59949F7437}"/>
+                <a16:creationId xmlns:a16="http://schemas.microsoft.com/office/drawing/2014/main" id="{43FDC808-53AE-8068-2FBD-2832D9297721}"/>
               </a:ext>
             </a:extLst>
           </p:cNvPr>
-          <p:cNvSpPr>
-            <a:spLocks noGrp="1"/>
-          </p:cNvSpPr>
-          <p:nvPr>
-            <p:ph type="title"/>
-          </p:nvPr>
-        </p:nvSpPr>
-        <p:spPr/>
-        <p:txBody>
-          <a:bodyPr/>
-          <a:lstStyle/>
-          <a:p>
-            <a:endParaRPr lang="en-US"/>
-          </a:p>
-        </p:txBody>
-      </p:sp>
-      <p:sp>
-        <p:nvSpPr>
-          <p:cNvPr id="3" name="Content Placeholder 2">
-            <a:extLst>
-              <a:ext uri="{FF2B5EF4-FFF2-40B4-BE49-F238E27FC236}">
-                <a16:creationId xmlns:a16="http://schemas.microsoft.com/office/drawing/2014/main" id="{D8FF07BC-90D8-F843-5D18-108EE883E456}"/>
-              </a:ext>
-            </a:extLst>
-          </p:cNvPr>
-          <p:cNvSpPr>
-            <a:spLocks noGrp="1"/>
-          </p:cNvSpPr>
-          <p:nvPr>
-            <p:ph idx="1"/>
-          </p:nvPr>
-        </p:nvSpPr>
-        <p:spPr/>
-        <p:txBody>
-          <a:bodyPr/>
-          <a:lstStyle/>
-          <a:p>
-            <a:endParaRPr lang="en-US"/>
-          </a:p>
-        </p:txBody>
-      </p:sp>
+          <p:cNvPicPr>
+            <a:picLocks noChangeAspect="1"/>
+          </p:cNvPicPr>
+          <p:nvPr/>
+        </p:nvPicPr>
+        <p:blipFill>
+          <a:blip r:embed="rId2"/>
+          <a:stretch>
+            <a:fillRect/>
+          </a:stretch>
+        </p:blipFill>
+        <p:spPr>
+          <a:xfrm>
+            <a:off x="1551030" y="784654"/>
+            <a:ext cx="9089940" cy="5288692"/>
+          </a:xfrm>
+          <a:prstGeom prst="rect">
+            <a:avLst/>
+          </a:prstGeom>
+        </p:spPr>
+      </p:pic>
     </p:spTree>
     <p:extLst>
       <p:ext uri="{BB962C8B-B14F-4D97-AF65-F5344CB8AC3E}">
-        <p14:creationId xmlns:p14="http://schemas.microsoft.com/office/powerpoint/2010/main" val="2482741089"/>
+        <p14:creationId xmlns:p14="http://schemas.microsoft.com/office/powerpoint/2010/main" val="824936908"/>
       </p:ext>
     </p:extLst>
   </p:cSld>
@@ -12629,66 +12628,6 @@
           <a:chExt cx="0" cy="0"/>
         </a:xfrm>
       </p:grpSpPr>
-      <p:pic>
-        <p:nvPicPr>
-          <p:cNvPr id="3" name="Picture 2" descr="A cat lying on its back on the sand&#10;&#10;AI-generated content may be incorrect.">
-            <a:extLst>
-              <a:ext uri="{FF2B5EF4-FFF2-40B4-BE49-F238E27FC236}">
-                <a16:creationId xmlns:a16="http://schemas.microsoft.com/office/drawing/2014/main" id="{43FDC808-53AE-8068-2FBD-2832D9297721}"/>
-              </a:ext>
-            </a:extLst>
-          </p:cNvPr>
-          <p:cNvPicPr>
-            <a:picLocks noChangeAspect="1"/>
-          </p:cNvPicPr>
-          <p:nvPr/>
-        </p:nvPicPr>
-        <p:blipFill>
-          <a:blip r:embed="rId2"/>
-          <a:stretch>
-            <a:fillRect/>
-          </a:stretch>
-        </p:blipFill>
-        <p:spPr>
-          <a:xfrm>
-            <a:off x="1551030" y="784654"/>
-            <a:ext cx="9089940" cy="5288692"/>
-          </a:xfrm>
-          <a:prstGeom prst="rect">
-            <a:avLst/>
-          </a:prstGeom>
-        </p:spPr>
-      </p:pic>
-    </p:spTree>
-    <p:extLst>
-      <p:ext uri="{BB962C8B-B14F-4D97-AF65-F5344CB8AC3E}">
-        <p14:creationId xmlns:p14="http://schemas.microsoft.com/office/powerpoint/2010/main" val="824936908"/>
-      </p:ext>
-    </p:extLst>
-  </p:cSld>
-  <p:clrMapOvr>
-    <a:masterClrMapping/>
-  </p:clrMapOvr>
-</p:sld>
-</file>
-
-<file path=ppt/slides/slide21.xml><?xml version="1.0" encoding="utf-8"?>
-<p:sld xmlns:a="http://schemas.openxmlformats.org/drawingml/2006/main" xmlns:r="http://schemas.openxmlformats.org/officeDocument/2006/relationships" xmlns:p="http://schemas.openxmlformats.org/presentationml/2006/main">
-  <p:cSld>
-    <p:spTree>
-      <p:nvGrpSpPr>
-        <p:cNvPr id="1" name=""/>
-        <p:cNvGrpSpPr/>
-        <p:nvPr/>
-      </p:nvGrpSpPr>
-      <p:grpSpPr>
-        <a:xfrm>
-          <a:off x="0" y="0"/>
-          <a:ext cx="0" cy="0"/>
-          <a:chOff x="0" y="0"/>
-          <a:chExt cx="0" cy="0"/>
-        </a:xfrm>
-      </p:grpSpPr>
       <p:sp>
         <p:nvSpPr>
           <p:cNvPr id="2" name="Title 1">
@@ -12792,7 +12731,7 @@
 </p:sld>
 </file>
 
-<file path=ppt/slides/slide22.xml><?xml version="1.0" encoding="utf-8"?>
+<file path=ppt/slides/slide21.xml><?xml version="1.0" encoding="utf-8"?>
 <p:sld xmlns:a="http://schemas.openxmlformats.org/drawingml/2006/main" xmlns:r="http://schemas.openxmlformats.org/officeDocument/2006/relationships" xmlns:p="http://schemas.openxmlformats.org/presentationml/2006/main">
   <p:cSld>
     <p:spTree>
@@ -13965,7 +13904,7 @@
 </p:sld>
 </file>
 
-<file path=ppt/slides/slide23.xml><?xml version="1.0" encoding="utf-8"?>
+<file path=ppt/slides/slide22.xml><?xml version="1.0" encoding="utf-8"?>
 <p:sld xmlns:a="http://schemas.openxmlformats.org/drawingml/2006/main" xmlns:r="http://schemas.openxmlformats.org/officeDocument/2006/relationships" xmlns:p="http://schemas.openxmlformats.org/presentationml/2006/main">
   <p:cSld>
     <p:spTree>
@@ -15039,7 +14978,7 @@
 </p:sld>
 </file>
 
-<file path=ppt/slides/slide24.xml><?xml version="1.0" encoding="utf-8"?>
+<file path=ppt/slides/slide23.xml><?xml version="1.0" encoding="utf-8"?>
 <p:sld xmlns:a="http://schemas.openxmlformats.org/drawingml/2006/main" xmlns:r="http://schemas.openxmlformats.org/officeDocument/2006/relationships" xmlns:p="http://schemas.openxmlformats.org/presentationml/2006/main">
   <p:cSld>
     <p:spTree>
@@ -16259,7 +16198,7 @@
 </p:sld>
 </file>
 
-<file path=ppt/slides/slide25.xml><?xml version="1.0" encoding="utf-8"?>
+<file path=ppt/slides/slide24.xml><?xml version="1.0" encoding="utf-8"?>
 <p:sld xmlns:a="http://schemas.openxmlformats.org/drawingml/2006/main" xmlns:r="http://schemas.openxmlformats.org/officeDocument/2006/relationships" xmlns:p="http://schemas.openxmlformats.org/presentationml/2006/main">
   <p:cSld>
     <p:spTree>
@@ -17657,7 +17596,7 @@
 </p:sld>
 </file>
 
-<file path=ppt/slides/slide26.xml><?xml version="1.0" encoding="utf-8"?>
+<file path=ppt/slides/slide25.xml><?xml version="1.0" encoding="utf-8"?>
 <p:sld xmlns:a="http://schemas.openxmlformats.org/drawingml/2006/main" xmlns:r="http://schemas.openxmlformats.org/officeDocument/2006/relationships" xmlns:p="http://schemas.openxmlformats.org/presentationml/2006/main">
   <p:cSld>
     <p:spTree>
@@ -17774,7 +17713,7 @@
 </p:sld>
 </file>
 
-<file path=ppt/slides/slide27.xml><?xml version="1.0" encoding="utf-8"?>
+<file path=ppt/slides/slide26.xml><?xml version="1.0" encoding="utf-8"?>
 <p:sld xmlns:a="http://schemas.openxmlformats.org/drawingml/2006/main" xmlns:r="http://schemas.openxmlformats.org/officeDocument/2006/relationships" xmlns:p="http://schemas.openxmlformats.org/presentationml/2006/main">
   <p:cSld>
     <p:spTree>
@@ -18005,7 +17944,7 @@
 </p:sld>
 </file>
 
-<file path=ppt/slides/slide28.xml><?xml version="1.0" encoding="utf-8"?>
+<file path=ppt/slides/slide27.xml><?xml version="1.0" encoding="utf-8"?>
 <p:sld xmlns:a="http://schemas.openxmlformats.org/drawingml/2006/main" xmlns:r="http://schemas.openxmlformats.org/officeDocument/2006/relationships" xmlns:p="http://schemas.openxmlformats.org/presentationml/2006/main">
   <p:cSld>
     <p:spTree>
@@ -18159,7 +18098,7 @@
 </p:sld>
 </file>
 
-<file path=ppt/slides/slide29.xml><?xml version="1.0" encoding="utf-8"?>
+<file path=ppt/slides/slide28.xml><?xml version="1.0" encoding="utf-8"?>
 <p:sld xmlns:a="http://schemas.openxmlformats.org/drawingml/2006/main" xmlns:r="http://schemas.openxmlformats.org/officeDocument/2006/relationships" xmlns:p="http://schemas.openxmlformats.org/presentationml/2006/main">
   <p:cSld>
     <p:spTree>
@@ -18488,169 +18427,7 @@
 </p:sld>
 </file>
 
-<file path=ppt/slides/slide3.xml><?xml version="1.0" encoding="utf-8"?>
-<p:sld xmlns:a="http://schemas.openxmlformats.org/drawingml/2006/main" xmlns:r="http://schemas.openxmlformats.org/officeDocument/2006/relationships" xmlns:p="http://schemas.openxmlformats.org/presentationml/2006/main">
-  <p:cSld>
-    <p:spTree>
-      <p:nvGrpSpPr>
-        <p:cNvPr id="1" name=""/>
-        <p:cNvGrpSpPr/>
-        <p:nvPr/>
-      </p:nvGrpSpPr>
-      <p:grpSpPr>
-        <a:xfrm>
-          <a:off x="0" y="0"/>
-          <a:ext cx="0" cy="0"/>
-          <a:chOff x="0" y="0"/>
-          <a:chExt cx="0" cy="0"/>
-        </a:xfrm>
-      </p:grpSpPr>
-      <p:sp>
-        <p:nvSpPr>
-          <p:cNvPr id="2" name="Title 1">
-            <a:extLst>
-              <a:ext uri="{FF2B5EF4-FFF2-40B4-BE49-F238E27FC236}">
-                <a16:creationId xmlns:a16="http://schemas.microsoft.com/office/drawing/2014/main" id="{3F79B21A-F1F7-1CA5-C645-5D2A5E3FA2D8}"/>
-              </a:ext>
-            </a:extLst>
-          </p:cNvPr>
-          <p:cNvSpPr>
-            <a:spLocks noGrp="1"/>
-          </p:cNvSpPr>
-          <p:nvPr>
-            <p:ph type="title"/>
-          </p:nvPr>
-        </p:nvSpPr>
-        <p:spPr/>
-        <p:txBody>
-          <a:bodyPr/>
-          <a:lstStyle/>
-          <a:p>
-            <a:pPr algn="ctr"/>
-            <a:r>
-              <a:rPr lang="en-US" dirty="0"/>
-              <a:t>Free Intro to R Workshop</a:t>
-            </a:r>
-          </a:p>
-        </p:txBody>
-      </p:sp>
-      <p:pic>
-        <p:nvPicPr>
-          <p:cNvPr id="5" name="Content Placeholder 4" descr="A screenshot of a computer&#10;&#10;AI-generated content may be incorrect.">
-            <a:extLst>
-              <a:ext uri="{FF2B5EF4-FFF2-40B4-BE49-F238E27FC236}">
-                <a16:creationId xmlns:a16="http://schemas.microsoft.com/office/drawing/2014/main" id="{827F1506-1EE9-8B88-F560-BBFFBA4DA69F}"/>
-              </a:ext>
-            </a:extLst>
-          </p:cNvPr>
-          <p:cNvPicPr>
-            <a:picLocks noGrp="1" noChangeAspect="1"/>
-          </p:cNvPicPr>
-          <p:nvPr>
-            <p:ph idx="1"/>
-          </p:nvPr>
-        </p:nvPicPr>
-        <p:blipFill>
-          <a:blip r:embed="rId2"/>
-          <a:stretch>
-            <a:fillRect/>
-          </a:stretch>
-        </p:blipFill>
-        <p:spPr>
-          <a:xfrm>
-            <a:off x="1441194" y="1825625"/>
-            <a:ext cx="9309611" cy="4351338"/>
-          </a:xfrm>
-        </p:spPr>
-      </p:pic>
-      <p:sp>
-        <p:nvSpPr>
-          <p:cNvPr id="6" name="TextBox 5">
-            <a:extLst>
-              <a:ext uri="{FF2B5EF4-FFF2-40B4-BE49-F238E27FC236}">
-                <a16:creationId xmlns:a16="http://schemas.microsoft.com/office/drawing/2014/main" id="{57967576-7FCE-D75D-7AE6-456EAB67DB97}"/>
-              </a:ext>
-            </a:extLst>
-          </p:cNvPr>
-          <p:cNvSpPr txBox="1"/>
-          <p:nvPr/>
-        </p:nvSpPr>
-        <p:spPr>
-          <a:xfrm>
-            <a:off x="115707" y="6311900"/>
-            <a:ext cx="3099816" cy="369332"/>
-          </a:xfrm>
-          <a:prstGeom prst="rect">
-            <a:avLst/>
-          </a:prstGeom>
-          <a:noFill/>
-        </p:spPr>
-        <p:txBody>
-          <a:bodyPr wrap="square" rtlCol="0">
-            <a:spAutoFit/>
-          </a:bodyPr>
-          <a:lstStyle/>
-          <a:p>
-            <a:r>
-              <a:rPr lang="en-US" dirty="0">
-                <a:hlinkClick r:id="rId3"/>
-              </a:rPr>
-              <a:t>R Crash Course GitHub Link</a:t>
-            </a:r>
-            <a:endParaRPr lang="en-US" dirty="0"/>
-          </a:p>
-        </p:txBody>
-      </p:sp>
-      <p:pic>
-        <p:nvPicPr>
-          <p:cNvPr id="8" name="Picture 7" descr="A cartoon of a person with two animals&#10;&#10;AI-generated content may be incorrect.">
-            <a:extLst>
-              <a:ext uri="{FF2B5EF4-FFF2-40B4-BE49-F238E27FC236}">
-                <a16:creationId xmlns:a16="http://schemas.microsoft.com/office/drawing/2014/main" id="{DA3F16ED-CA57-193D-1E29-08AE95AB9B7C}"/>
-              </a:ext>
-            </a:extLst>
-          </p:cNvPr>
-          <p:cNvPicPr>
-            <a:picLocks noChangeAspect="1"/>
-          </p:cNvPicPr>
-          <p:nvPr/>
-        </p:nvPicPr>
-        <p:blipFill>
-          <a:blip r:embed="rId4"/>
-          <a:stretch>
-            <a:fillRect/>
-          </a:stretch>
-        </p:blipFill>
-        <p:spPr>
-          <a:xfrm>
-            <a:off x="499958" y="4441978"/>
-            <a:ext cx="1882471" cy="1869922"/>
-          </a:xfrm>
-          <a:prstGeom prst="ellipse">
-            <a:avLst/>
-          </a:prstGeom>
-          <a:ln>
-            <a:noFill/>
-          </a:ln>
-          <a:effectLst>
-            <a:softEdge rad="112500"/>
-          </a:effectLst>
-        </p:spPr>
-      </p:pic>
-    </p:spTree>
-    <p:extLst>
-      <p:ext uri="{BB962C8B-B14F-4D97-AF65-F5344CB8AC3E}">
-        <p14:creationId xmlns:p14="http://schemas.microsoft.com/office/powerpoint/2010/main" val="1877543471"/>
-      </p:ext>
-    </p:extLst>
-  </p:cSld>
-  <p:clrMapOvr>
-    <a:masterClrMapping/>
-  </p:clrMapOvr>
-</p:sld>
-</file>
-
-<file path=ppt/slides/slide30.xml><?xml version="1.0" encoding="utf-8"?>
+<file path=ppt/slides/slide29.xml><?xml version="1.0" encoding="utf-8"?>
 <p:sld xmlns:a="http://schemas.openxmlformats.org/drawingml/2006/main" xmlns:r="http://schemas.openxmlformats.org/officeDocument/2006/relationships" xmlns:p="http://schemas.openxmlformats.org/presentationml/2006/main">
   <p:cSld>
     <p:spTree>
@@ -19821,7 +19598,169 @@
 </p:sld>
 </file>
 
-<file path=ppt/slides/slide31.xml><?xml version="1.0" encoding="utf-8"?>
+<file path=ppt/slides/slide3.xml><?xml version="1.0" encoding="utf-8"?>
+<p:sld xmlns:a="http://schemas.openxmlformats.org/drawingml/2006/main" xmlns:r="http://schemas.openxmlformats.org/officeDocument/2006/relationships" xmlns:p="http://schemas.openxmlformats.org/presentationml/2006/main">
+  <p:cSld>
+    <p:spTree>
+      <p:nvGrpSpPr>
+        <p:cNvPr id="1" name=""/>
+        <p:cNvGrpSpPr/>
+        <p:nvPr/>
+      </p:nvGrpSpPr>
+      <p:grpSpPr>
+        <a:xfrm>
+          <a:off x="0" y="0"/>
+          <a:ext cx="0" cy="0"/>
+          <a:chOff x="0" y="0"/>
+          <a:chExt cx="0" cy="0"/>
+        </a:xfrm>
+      </p:grpSpPr>
+      <p:sp>
+        <p:nvSpPr>
+          <p:cNvPr id="2" name="Title 1">
+            <a:extLst>
+              <a:ext uri="{FF2B5EF4-FFF2-40B4-BE49-F238E27FC236}">
+                <a16:creationId xmlns:a16="http://schemas.microsoft.com/office/drawing/2014/main" id="{3F79B21A-F1F7-1CA5-C645-5D2A5E3FA2D8}"/>
+              </a:ext>
+            </a:extLst>
+          </p:cNvPr>
+          <p:cNvSpPr>
+            <a:spLocks noGrp="1"/>
+          </p:cNvSpPr>
+          <p:nvPr>
+            <p:ph type="title"/>
+          </p:nvPr>
+        </p:nvSpPr>
+        <p:spPr/>
+        <p:txBody>
+          <a:bodyPr/>
+          <a:lstStyle/>
+          <a:p>
+            <a:pPr algn="ctr"/>
+            <a:r>
+              <a:rPr lang="en-US" dirty="0"/>
+              <a:t>Free Intro to R Workshop</a:t>
+            </a:r>
+          </a:p>
+        </p:txBody>
+      </p:sp>
+      <p:pic>
+        <p:nvPicPr>
+          <p:cNvPr id="5" name="Content Placeholder 4" descr="A screenshot of a computer&#10;&#10;AI-generated content may be incorrect.">
+            <a:extLst>
+              <a:ext uri="{FF2B5EF4-FFF2-40B4-BE49-F238E27FC236}">
+                <a16:creationId xmlns:a16="http://schemas.microsoft.com/office/drawing/2014/main" id="{827F1506-1EE9-8B88-F560-BBFFBA4DA69F}"/>
+              </a:ext>
+            </a:extLst>
+          </p:cNvPr>
+          <p:cNvPicPr>
+            <a:picLocks noGrp="1" noChangeAspect="1"/>
+          </p:cNvPicPr>
+          <p:nvPr>
+            <p:ph idx="1"/>
+          </p:nvPr>
+        </p:nvPicPr>
+        <p:blipFill>
+          <a:blip r:embed="rId2"/>
+          <a:stretch>
+            <a:fillRect/>
+          </a:stretch>
+        </p:blipFill>
+        <p:spPr>
+          <a:xfrm>
+            <a:off x="1441194" y="1825625"/>
+            <a:ext cx="9309611" cy="4351338"/>
+          </a:xfrm>
+        </p:spPr>
+      </p:pic>
+      <p:sp>
+        <p:nvSpPr>
+          <p:cNvPr id="6" name="TextBox 5">
+            <a:extLst>
+              <a:ext uri="{FF2B5EF4-FFF2-40B4-BE49-F238E27FC236}">
+                <a16:creationId xmlns:a16="http://schemas.microsoft.com/office/drawing/2014/main" id="{57967576-7FCE-D75D-7AE6-456EAB67DB97}"/>
+              </a:ext>
+            </a:extLst>
+          </p:cNvPr>
+          <p:cNvSpPr txBox="1"/>
+          <p:nvPr/>
+        </p:nvSpPr>
+        <p:spPr>
+          <a:xfrm>
+            <a:off x="115707" y="6311900"/>
+            <a:ext cx="3099816" cy="369332"/>
+          </a:xfrm>
+          <a:prstGeom prst="rect">
+            <a:avLst/>
+          </a:prstGeom>
+          <a:noFill/>
+        </p:spPr>
+        <p:txBody>
+          <a:bodyPr wrap="square" rtlCol="0">
+            <a:spAutoFit/>
+          </a:bodyPr>
+          <a:lstStyle/>
+          <a:p>
+            <a:r>
+              <a:rPr lang="en-US" dirty="0">
+                <a:hlinkClick r:id="rId3"/>
+              </a:rPr>
+              <a:t>R Crash Course GitHub Link</a:t>
+            </a:r>
+            <a:endParaRPr lang="en-US" dirty="0"/>
+          </a:p>
+        </p:txBody>
+      </p:sp>
+      <p:pic>
+        <p:nvPicPr>
+          <p:cNvPr id="8" name="Picture 7" descr="A cartoon of a person with two animals&#10;&#10;AI-generated content may be incorrect.">
+            <a:extLst>
+              <a:ext uri="{FF2B5EF4-FFF2-40B4-BE49-F238E27FC236}">
+                <a16:creationId xmlns:a16="http://schemas.microsoft.com/office/drawing/2014/main" id="{DA3F16ED-CA57-193D-1E29-08AE95AB9B7C}"/>
+              </a:ext>
+            </a:extLst>
+          </p:cNvPr>
+          <p:cNvPicPr>
+            <a:picLocks noChangeAspect="1"/>
+          </p:cNvPicPr>
+          <p:nvPr/>
+        </p:nvPicPr>
+        <p:blipFill>
+          <a:blip r:embed="rId4"/>
+          <a:stretch>
+            <a:fillRect/>
+          </a:stretch>
+        </p:blipFill>
+        <p:spPr>
+          <a:xfrm>
+            <a:off x="499958" y="4441978"/>
+            <a:ext cx="1882471" cy="1869922"/>
+          </a:xfrm>
+          <a:prstGeom prst="ellipse">
+            <a:avLst/>
+          </a:prstGeom>
+          <a:ln>
+            <a:noFill/>
+          </a:ln>
+          <a:effectLst>
+            <a:softEdge rad="112500"/>
+          </a:effectLst>
+        </p:spPr>
+      </p:pic>
+    </p:spTree>
+    <p:extLst>
+      <p:ext uri="{BB962C8B-B14F-4D97-AF65-F5344CB8AC3E}">
+        <p14:creationId xmlns:p14="http://schemas.microsoft.com/office/powerpoint/2010/main" val="1877543471"/>
+      </p:ext>
+    </p:extLst>
+  </p:cSld>
+  <p:clrMapOvr>
+    <a:masterClrMapping/>
+  </p:clrMapOvr>
+</p:sld>
+</file>
+
+<file path=ppt/slides/slide30.xml><?xml version="1.0" encoding="utf-8"?>
 <p:sld xmlns:a="http://schemas.openxmlformats.org/drawingml/2006/main" xmlns:r="http://schemas.openxmlformats.org/officeDocument/2006/relationships" xmlns:p="http://schemas.openxmlformats.org/presentationml/2006/main">
   <p:cSld>
     <p:spTree>
@@ -20923,7 +20862,7 @@
 </p:sld>
 </file>
 
-<file path=ppt/slides/slide32.xml><?xml version="1.0" encoding="utf-8"?>
+<file path=ppt/slides/slide31.xml><?xml version="1.0" encoding="utf-8"?>
 <p:sld xmlns:a="http://schemas.openxmlformats.org/drawingml/2006/main" xmlns:r="http://schemas.openxmlformats.org/officeDocument/2006/relationships" xmlns:p="http://schemas.openxmlformats.org/presentationml/2006/main">
   <p:cSld>
     <p:spTree>
@@ -21127,7 +21066,7 @@
 </p:sld>
 </file>
 
-<file path=ppt/slides/slide33.xml><?xml version="1.0" encoding="utf-8"?>
+<file path=ppt/slides/slide32.xml><?xml version="1.0" encoding="utf-8"?>
 <p:sld xmlns:a="http://schemas.openxmlformats.org/drawingml/2006/main" xmlns:r="http://schemas.openxmlformats.org/officeDocument/2006/relationships" xmlns:p="http://schemas.openxmlformats.org/presentationml/2006/main">
   <p:cSld>
     <p:spTree>

</xml_diff>